<commit_message>
Added Connect 4 tests
</commit_message>
<xml_diff>
--- a/And Now Seleniums Watch is Ended.pptx
+++ b/And Now Seleniums Watch is Ended.pptx
@@ -5,7 +5,7 @@
     <p:sldMasterId id="2147483648" r:id="rId1"/>
   </p:sldMasterIdLst>
   <p:notesMasterIdLst>
-    <p:notesMasterId r:id="rId23"/>
+    <p:notesMasterId r:id="rId22"/>
   </p:notesMasterIdLst>
   <p:sldIdLst>
     <p:sldId id="276" r:id="rId2"/>
@@ -14,21 +14,20 @@
     <p:sldId id="258" r:id="rId5"/>
     <p:sldId id="262" r:id="rId6"/>
     <p:sldId id="283" r:id="rId7"/>
-    <p:sldId id="285" r:id="rId8"/>
-    <p:sldId id="319" r:id="rId9"/>
+    <p:sldId id="329" r:id="rId8"/>
+    <p:sldId id="285" r:id="rId9"/>
     <p:sldId id="320" r:id="rId10"/>
-    <p:sldId id="321" r:id="rId11"/>
-    <p:sldId id="323" r:id="rId12"/>
-    <p:sldId id="322" r:id="rId13"/>
-    <p:sldId id="324" r:id="rId14"/>
-    <p:sldId id="325" r:id="rId15"/>
-    <p:sldId id="326" r:id="rId16"/>
-    <p:sldId id="313" r:id="rId17"/>
+    <p:sldId id="327" r:id="rId11"/>
+    <p:sldId id="328" r:id="rId12"/>
+    <p:sldId id="321" r:id="rId13"/>
+    <p:sldId id="323" r:id="rId14"/>
+    <p:sldId id="322" r:id="rId15"/>
+    <p:sldId id="324" r:id="rId16"/>
+    <p:sldId id="325" r:id="rId17"/>
     <p:sldId id="292" r:id="rId18"/>
     <p:sldId id="312" r:id="rId19"/>
-    <p:sldId id="314" r:id="rId20"/>
-    <p:sldId id="316" r:id="rId21"/>
-    <p:sldId id="315" r:id="rId22"/>
+    <p:sldId id="313" r:id="rId20"/>
+    <p:sldId id="315" r:id="rId21"/>
   </p:sldIdLst>
   <p:sldSz cx="12192000" cy="6858000"/>
   <p:notesSz cx="6858000" cy="9144000"/>
@@ -434,7 +433,7 @@
           <a:p>
             <a:fld id="{CEC7C4CE-0BA7-46C7-910C-86236A29B096}" type="datetimeFigureOut">
               <a:rPr lang="en-US" smtClean="0"/>
-              <a:t>9/9/2019</a:t>
+              <a:t>9/11/19</a:t>
             </a:fld>
             <a:endParaRPr lang="en-US"/>
           </a:p>
@@ -1016,7 +1015,7 @@
           <a:p>
             <a:r>
               <a:rPr lang="en-US" dirty="0"/>
-              <a:t>Behavior Driven Development is a methodology that encapsulates a lot but one of the core tenants is having a representative from product, dev, and test get together and come up with acceptance tests that flush out a feature.  Today we are going to start writing our app with a failing acceptance test that when passing signifies that we have implemented the functionality that the product owner requested.</a:t>
+              <a:t>Today I am going to focus on three separate types of tests: UI, Integration (Service), and Unit Tests.  The picture you see is of the automated testing pyramid.  It describes the composition of tests that you would like to have make up your automated test suite.  We will get more into what these different tests mean in a little bit but the important takeaway is that UI tests are extremely slow and expensive while unit tests are very quick and cheap.  Money is a representation of time to write and time to maintain  Some of you might be wondering why is it called a pyramid when it is clearly a triangle?  Well that’s a great question… but googling for testing pyramid will give you a lot of great results on the types and ratios of automated tests you should write.  My guess is they want the ratio to have some depth to it.  Like your unit tests physically support your integration and UI tests.</a:t>
             </a:r>
           </a:p>
         </p:txBody>
@@ -1047,7 +1046,7 @@
     </p:spTree>
     <p:extLst>
       <p:ext uri="{BB962C8B-B14F-4D97-AF65-F5344CB8AC3E}">
-        <p14:creationId xmlns:p14="http://schemas.microsoft.com/office/powerpoint/2010/main" val="2284139863"/>
+        <p14:creationId xmlns:p14="http://schemas.microsoft.com/office/powerpoint/2010/main" val="802031046"/>
       </p:ext>
     </p:extLst>
   </p:cSld>
@@ -1103,19 +1102,7 @@
           <a:p>
             <a:r>
               <a:rPr lang="en-US" dirty="0"/>
-              <a:t>Where you can start.</a:t>
-            </a:r>
-          </a:p>
-          <a:p>
-            <a:r>
-              <a:rPr lang="en-US" dirty="0"/>
-              <a:t>How will we know what we’ve made changes correctly?</a:t>
-            </a:r>
-          </a:p>
-          <a:p>
-            <a:r>
-              <a:rPr lang="en-US" dirty="0"/>
-              <a:t>How will we know that we haven’t broken anything?</a:t>
+              <a:t>Behavior Driven Development is a methodology that encapsulates a lot but one of the core tenants is having a representative from product, dev, and test get together and come up with acceptance tests that flush out a feature.  Today we are going to start writing our app with a failing acceptance test that when passing signifies that we have implemented the functionality that the product owner requested.</a:t>
             </a:r>
           </a:p>
         </p:txBody>
@@ -1137,7 +1124,7 @@
           <a:p>
             <a:fld id="{D06C7275-F3C5-4EE7-8C54-771BE2CF8BB4}" type="slidenum">
               <a:rPr lang="en-US" smtClean="0"/>
-              <a:t>17</a:t>
+              <a:t>8</a:t>
             </a:fld>
             <a:endParaRPr lang="en-US"/>
           </a:p>
@@ -1146,7 +1133,7 @@
     </p:spTree>
     <p:extLst>
       <p:ext uri="{BB962C8B-B14F-4D97-AF65-F5344CB8AC3E}">
-        <p14:creationId xmlns:p14="http://schemas.microsoft.com/office/powerpoint/2010/main" val="2974243069"/>
+        <p14:creationId xmlns:p14="http://schemas.microsoft.com/office/powerpoint/2010/main" val="2284139863"/>
       </p:ext>
     </p:extLst>
   </p:cSld>
@@ -1202,21 +1189,20 @@
           <a:p>
             <a:r>
               <a:rPr lang="en-US" dirty="0"/>
-              <a:t>You only write the code that you need to </a:t>
-            </a:r>
-            <a:r>
-              <a:rPr lang="en-US" dirty="0" err="1"/>
-              <a:t>dulfill</a:t>
-            </a:r>
+              <a:t>Where you can start.</a:t>
+            </a:r>
+          </a:p>
+          <a:p>
             <a:r>
               <a:rPr lang="en-US" dirty="0"/>
-              <a:t> </a:t>
-            </a:r>
-            <a:r>
-              <a:rPr lang="en-US" dirty="0" err="1"/>
-              <a:t>th</a:t>
-            </a:r>
-            <a:endParaRPr lang="en-US" dirty="0"/>
+              <a:t>How will we know what we’ve made changes correctly?</a:t>
+            </a:r>
+          </a:p>
+          <a:p>
+            <a:r>
+              <a:rPr lang="en-US" dirty="0"/>
+              <a:t>How will we know that we haven’t broken anything?</a:t>
+            </a:r>
           </a:p>
         </p:txBody>
       </p:sp>
@@ -1237,7 +1223,7 @@
           <a:p>
             <a:fld id="{D06C7275-F3C5-4EE7-8C54-771BE2CF8BB4}" type="slidenum">
               <a:rPr lang="en-US" smtClean="0"/>
-              <a:t>18</a:t>
+              <a:t>17</a:t>
             </a:fld>
             <a:endParaRPr lang="en-US"/>
           </a:p>
@@ -1246,7 +1232,7 @@
     </p:spTree>
     <p:extLst>
       <p:ext uri="{BB962C8B-B14F-4D97-AF65-F5344CB8AC3E}">
-        <p14:creationId xmlns:p14="http://schemas.microsoft.com/office/powerpoint/2010/main" val="1583858752"/>
+        <p14:creationId xmlns:p14="http://schemas.microsoft.com/office/powerpoint/2010/main" val="2974243069"/>
       </p:ext>
     </p:extLst>
   </p:cSld>
@@ -1300,6 +1286,22 @@
           <a:bodyPr/>
           <a:lstStyle/>
           <a:p>
+            <a:r>
+              <a:rPr lang="en-US" dirty="0"/>
+              <a:t>You only write the code that you need to </a:t>
+            </a:r>
+            <a:r>
+              <a:rPr lang="en-US" dirty="0" err="1"/>
+              <a:t>dulfill</a:t>
+            </a:r>
+            <a:r>
+              <a:rPr lang="en-US" dirty="0"/>
+              <a:t> </a:t>
+            </a:r>
+            <a:r>
+              <a:rPr lang="en-US" dirty="0" err="1"/>
+              <a:t>th</a:t>
+            </a:r>
             <a:endParaRPr lang="en-US" dirty="0"/>
           </a:p>
         </p:txBody>
@@ -1321,7 +1323,7 @@
           <a:p>
             <a:fld id="{D06C7275-F3C5-4EE7-8C54-771BE2CF8BB4}" type="slidenum">
               <a:rPr lang="en-US" smtClean="0"/>
-              <a:t>20</a:t>
+              <a:t>18</a:t>
             </a:fld>
             <a:endParaRPr lang="en-US"/>
           </a:p>
@@ -1330,7 +1332,7 @@
     </p:spTree>
     <p:extLst>
       <p:ext uri="{BB962C8B-B14F-4D97-AF65-F5344CB8AC3E}">
-        <p14:creationId xmlns:p14="http://schemas.microsoft.com/office/powerpoint/2010/main" val="3930562506"/>
+        <p14:creationId xmlns:p14="http://schemas.microsoft.com/office/powerpoint/2010/main" val="1583858752"/>
       </p:ext>
     </p:extLst>
   </p:cSld>
@@ -2464,7 +2466,7 @@
           <a:p>
             <a:fld id="{24452B38-B5B8-4C56-ADC3-B86414DDCBC8}" type="datetimeFigureOut">
               <a:rPr lang="en-US" smtClean="0"/>
-              <a:t>9/9/2019</a:t>
+              <a:t>9/11/19</a:t>
             </a:fld>
             <a:endParaRPr lang="en-US"/>
           </a:p>
@@ -2516,101 +2518,6 @@
     <p:extLst>
       <p:ext uri="{BB962C8B-B14F-4D97-AF65-F5344CB8AC3E}">
         <p14:creationId xmlns:p14="http://schemas.microsoft.com/office/powerpoint/2010/main" val="1404004356"/>
-      </p:ext>
-    </p:extLst>
-  </p:cSld>
-  <p:clrMapOvr>
-    <a:masterClrMapping/>
-  </p:clrMapOvr>
-</p:sldLayout>
-</file>
-
-<file path=ppt/slideLayouts/slideLayout7.xml><?xml version="1.0" encoding="utf-8"?>
-<p:sldLayout xmlns:a="http://schemas.openxmlformats.org/drawingml/2006/main" xmlns:r="http://schemas.openxmlformats.org/officeDocument/2006/relationships" xmlns:p="http://schemas.openxmlformats.org/presentationml/2006/main" type="blank">
-  <p:cSld name="Blank">
-    <p:spTree>
-      <p:nvGrpSpPr>
-        <p:cNvPr id="1" name=""/>
-        <p:cNvGrpSpPr/>
-        <p:nvPr/>
-      </p:nvGrpSpPr>
-      <p:grpSpPr>
-        <a:xfrm>
-          <a:off x="0" y="0"/>
-          <a:ext cx="0" cy="0"/>
-          <a:chOff x="0" y="0"/>
-          <a:chExt cx="0" cy="0"/>
-        </a:xfrm>
-      </p:grpSpPr>
-      <p:sp>
-        <p:nvSpPr>
-          <p:cNvPr id="2" name="Date Placeholder 1"/>
-          <p:cNvSpPr>
-            <a:spLocks noGrp="1"/>
-          </p:cNvSpPr>
-          <p:nvPr>
-            <p:ph type="dt" sz="half" idx="10"/>
-          </p:nvPr>
-        </p:nvSpPr>
-        <p:spPr/>
-        <p:txBody>
-          <a:bodyPr/>
-          <a:lstStyle/>
-          <a:p>
-            <a:fld id="{24452B38-B5B8-4C56-ADC3-B86414DDCBC8}" type="datetimeFigureOut">
-              <a:rPr lang="en-US" smtClean="0"/>
-              <a:t>9/9/2019</a:t>
-            </a:fld>
-            <a:endParaRPr lang="en-US"/>
-          </a:p>
-        </p:txBody>
-      </p:sp>
-      <p:sp>
-        <p:nvSpPr>
-          <p:cNvPr id="3" name="Footer Placeholder 2"/>
-          <p:cNvSpPr>
-            <a:spLocks noGrp="1"/>
-          </p:cNvSpPr>
-          <p:nvPr>
-            <p:ph type="ftr" sz="quarter" idx="11"/>
-          </p:nvPr>
-        </p:nvSpPr>
-        <p:spPr/>
-        <p:txBody>
-          <a:bodyPr/>
-          <a:lstStyle/>
-          <a:p>
-            <a:endParaRPr lang="en-US"/>
-          </a:p>
-        </p:txBody>
-      </p:sp>
-      <p:sp>
-        <p:nvSpPr>
-          <p:cNvPr id="4" name="Slide Number Placeholder 3"/>
-          <p:cNvSpPr>
-            <a:spLocks noGrp="1"/>
-          </p:cNvSpPr>
-          <p:nvPr>
-            <p:ph type="sldNum" sz="quarter" idx="12"/>
-          </p:nvPr>
-        </p:nvSpPr>
-        <p:spPr/>
-        <p:txBody>
-          <a:bodyPr/>
-          <a:lstStyle/>
-          <a:p>
-            <a:fld id="{7A379D00-2031-4A85-9562-4E0B9A64419F}" type="slidenum">
-              <a:rPr lang="en-US" smtClean="0"/>
-              <a:t>‹#›</a:t>
-            </a:fld>
-            <a:endParaRPr lang="en-US"/>
-          </a:p>
-        </p:txBody>
-      </p:sp>
-    </p:spTree>
-    <p:extLst>
-      <p:ext uri="{BB962C8B-B14F-4D97-AF65-F5344CB8AC3E}">
-        <p14:creationId xmlns:p14="http://schemas.microsoft.com/office/powerpoint/2010/main" val="1519739203"/>
       </p:ext>
     </p:extLst>
   </p:cSld>
@@ -2668,7 +2575,7 @@
           </a:ln>
           <a:extLst>
             <a:ext uri="{C572A759-6A51-4108-AA02-DFA0A04FC94B}">
-              <ma14:wrappingTextBoxFlag xmlns="" xmlns:ma14="http://schemas.microsoft.com/office/mac/drawingml/2011/main" val="1"/>
+              <ma14:wrappingTextBoxFlag xmlns:ma14="http://schemas.microsoft.com/office/mac/drawingml/2011/main" xmlns="" val="1"/>
             </a:ext>
           </a:extLst>
         </p:spPr>
@@ -2707,7 +2614,7 @@
           </a:ln>
           <a:extLst>
             <a:ext uri="{C572A759-6A51-4108-AA02-DFA0A04FC94B}">
-              <ma14:wrappingTextBoxFlag xmlns="" xmlns:ma14="http://schemas.microsoft.com/office/mac/drawingml/2011/main" val="1"/>
+              <ma14:wrappingTextBoxFlag xmlns:ma14="http://schemas.microsoft.com/office/mac/drawingml/2011/main" xmlns="" val="1"/>
             </a:ext>
           </a:extLst>
         </p:spPr>
@@ -2790,7 +2697,7 @@
           <p:nvPr/>
         </p:nvPicPr>
         <p:blipFill>
-          <a:blip r:embed="rId9"/>
+          <a:blip r:embed="rId8"/>
           <a:srcRect/>
           <a:stretch>
             <a:fillRect/>
@@ -2862,7 +2769,6 @@
     <p:sldLayoutId id="2147483651" r:id="rId4"/>
     <p:sldLayoutId id="2147483655" r:id="rId5"/>
     <p:sldLayoutId id="2147483658" r:id="rId6"/>
-    <p:sldLayoutId id="2147483660" r:id="rId7"/>
   </p:sldLayoutIdLst>
   <p:transition spd="med"/>
   <p:txStyles>
@@ -4040,10 +3946,10 @@
       </p:grpSpPr>
       <p:sp>
         <p:nvSpPr>
-          <p:cNvPr id="2" name="Title 1">
+          <p:cNvPr id="4" name="Title 3">
             <a:extLst>
               <a:ext uri="{FF2B5EF4-FFF2-40B4-BE49-F238E27FC236}">
-                <a16:creationId xmlns:a16="http://schemas.microsoft.com/office/drawing/2014/main" id="{E2434B61-3C88-48E2-9F2A-D87C7F5DE3B1}"/>
+                <a16:creationId xmlns:a16="http://schemas.microsoft.com/office/drawing/2014/main" id="{8F253787-B872-BB4E-BDA5-A814060D59DA}"/>
               </a:ext>
             </a:extLst>
           </p:cNvPr>
@@ -4061,15 +3967,76 @@
           <a:p>
             <a:r>
               <a:rPr lang="en-US" dirty="0"/>
-              <a:t>Intro to Cypress</a:t>
-            </a:r>
+              <a:t>Project’s Selenium Test Suite</a:t>
+            </a:r>
+          </a:p>
+        </p:txBody>
+      </p:sp>
+      <p:sp>
+        <p:nvSpPr>
+          <p:cNvPr id="5" name="Text Placeholder 4">
+            <a:extLst>
+              <a:ext uri="{FF2B5EF4-FFF2-40B4-BE49-F238E27FC236}">
+                <a16:creationId xmlns:a16="http://schemas.microsoft.com/office/drawing/2014/main" id="{B8F4FBC8-7525-9A41-B436-151A524A45D2}"/>
+              </a:ext>
+            </a:extLst>
+          </p:cNvPr>
+          <p:cNvSpPr>
+            <a:spLocks noGrp="1"/>
+          </p:cNvSpPr>
+          <p:nvPr>
+            <p:ph type="body" idx="1"/>
+          </p:nvPr>
+        </p:nvSpPr>
+        <p:spPr/>
+        <p:txBody>
+          <a:bodyPr/>
+          <a:lstStyle/>
+          <a:p>
+            <a:r>
+              <a:rPr lang="en-US" dirty="0"/>
+              <a:t>Tests were flaky</a:t>
+            </a:r>
+          </a:p>
+          <a:p>
+            <a:r>
+              <a:rPr lang="en-US" dirty="0"/>
+              <a:t>Tests were difficult to debug when they broke</a:t>
+            </a:r>
+          </a:p>
+          <a:p>
+            <a:r>
+              <a:rPr lang="en-US" dirty="0"/>
+              <a:t>Very difficult to discover what went wrong if failed in CI</a:t>
+            </a:r>
+          </a:p>
+          <a:p>
+            <a:r>
+              <a:rPr lang="en-US" dirty="0"/>
+              <a:t>Writing a new test took a fair amount of time</a:t>
+            </a:r>
+          </a:p>
+          <a:p>
+            <a:r>
+              <a:rPr lang="en-US" dirty="0"/>
+              <a:t>UI/E2E Test suite ran in about 18 minutes</a:t>
+            </a:r>
+          </a:p>
+          <a:p>
+            <a:r>
+              <a:rPr lang="en-US" dirty="0"/>
+              <a:t>Could use Port on machine to verify emailed information</a:t>
+            </a:r>
+          </a:p>
+          <a:p>
+            <a:endParaRPr lang="en-US" dirty="0"/>
           </a:p>
         </p:txBody>
       </p:sp>
     </p:spTree>
     <p:extLst>
       <p:ext uri="{BB962C8B-B14F-4D97-AF65-F5344CB8AC3E}">
-        <p14:creationId xmlns:p14="http://schemas.microsoft.com/office/powerpoint/2010/main" val="2794894354"/>
+        <p14:creationId xmlns:p14="http://schemas.microsoft.com/office/powerpoint/2010/main" val="2846291696"/>
       </p:ext>
     </p:extLst>
   </p:cSld>
@@ -4099,10 +4066,10 @@
       </p:grpSpPr>
       <p:sp>
         <p:nvSpPr>
-          <p:cNvPr id="2" name="Title 1">
+          <p:cNvPr id="4" name="Title 3">
             <a:extLst>
               <a:ext uri="{FF2B5EF4-FFF2-40B4-BE49-F238E27FC236}">
-                <a16:creationId xmlns:a16="http://schemas.microsoft.com/office/drawing/2014/main" id="{4F41E0CD-F6EB-49C5-B95B-D275D1C03465}"/>
+                <a16:creationId xmlns:a16="http://schemas.microsoft.com/office/drawing/2014/main" id="{8F253787-B872-BB4E-BDA5-A814060D59DA}"/>
               </a:ext>
             </a:extLst>
           </p:cNvPr>
@@ -4120,17 +4087,17 @@
           <a:p>
             <a:r>
               <a:rPr lang="en-US" dirty="0"/>
-              <a:t>Why not to use Cypress</a:t>
+              <a:t>Project’s Cypress Test Suite</a:t>
             </a:r>
           </a:p>
         </p:txBody>
       </p:sp>
       <p:sp>
         <p:nvSpPr>
-          <p:cNvPr id="4" name="Text Placeholder 3">
+          <p:cNvPr id="5" name="Text Placeholder 4">
             <a:extLst>
               <a:ext uri="{FF2B5EF4-FFF2-40B4-BE49-F238E27FC236}">
-                <a16:creationId xmlns:a16="http://schemas.microsoft.com/office/drawing/2014/main" id="{CDBF154A-3F70-4D8B-85AC-7B0E2F4B3B61}"/>
+                <a16:creationId xmlns:a16="http://schemas.microsoft.com/office/drawing/2014/main" id="{B8F4FBC8-7525-9A41-B436-151A524A45D2}"/>
               </a:ext>
             </a:extLst>
           </p:cNvPr>
@@ -4148,36 +4115,45 @@
           <a:p>
             <a:r>
               <a:rPr lang="en-US" dirty="0"/>
-              <a:t>Firefox, Safari, and Edge</a:t>
+              <a:t>Tests are a lot less flaky </a:t>
             </a:r>
           </a:p>
           <a:p>
             <a:r>
               <a:rPr lang="en-US" dirty="0"/>
-              <a:t>Use ports on the machine its running on</a:t>
+              <a:t>Finding out why a test failed is a lot easier (pictures, videos, DOM snapshot)</a:t>
             </a:r>
           </a:p>
           <a:p>
             <a:r>
               <a:rPr lang="en-US" dirty="0"/>
-              <a:t>Has been out of beta less than 1 year</a:t>
+              <a:t>Much easier to diagnose failures in CI</a:t>
             </a:r>
           </a:p>
           <a:p>
             <a:r>
               <a:rPr lang="en-US" dirty="0"/>
-              <a:t>No JavaScript UI</a:t>
-            </a:r>
-          </a:p>
-          <a:p>
-            <a:endParaRPr lang="en-US" dirty="0"/>
+              <a:t>Writing new tests did not take as long</a:t>
+            </a:r>
+          </a:p>
+          <a:p>
+            <a:r>
+              <a:rPr lang="en-US" dirty="0"/>
+              <a:t>UI/E2E Test suite ran in about 10 minutes (vs ~18 for Selenium)</a:t>
+            </a:r>
+          </a:p>
+          <a:p>
+            <a:r>
+              <a:rPr lang="en-US" dirty="0"/>
+              <a:t>Could no longer use port to verify information sent over email</a:t>
+            </a:r>
           </a:p>
         </p:txBody>
       </p:sp>
     </p:spTree>
     <p:extLst>
       <p:ext uri="{BB962C8B-B14F-4D97-AF65-F5344CB8AC3E}">
-        <p14:creationId xmlns:p14="http://schemas.microsoft.com/office/powerpoint/2010/main" val="2435944940"/>
+        <p14:creationId xmlns:p14="http://schemas.microsoft.com/office/powerpoint/2010/main" val="931449595"/>
       </p:ext>
     </p:extLst>
   </p:cSld>
@@ -4210,7 +4186,7 @@
           <p:cNvPr id="2" name="Title 1">
             <a:extLst>
               <a:ext uri="{FF2B5EF4-FFF2-40B4-BE49-F238E27FC236}">
-                <a16:creationId xmlns:a16="http://schemas.microsoft.com/office/drawing/2014/main" id="{2A104A68-77E3-4BBB-AE19-2C2FD5F373F7}"/>
+                <a16:creationId xmlns:a16="http://schemas.microsoft.com/office/drawing/2014/main" id="{E2434B61-3C88-48E2-9F2A-D87C7F5DE3B1}"/>
               </a:ext>
             </a:extLst>
           </p:cNvPr>
@@ -4228,7 +4204,7 @@
           <a:p>
             <a:r>
               <a:rPr lang="en-US" dirty="0"/>
-              <a:t>Write some tests against code camp website</a:t>
+              <a:t>Intro to Cypress</a:t>
             </a:r>
           </a:p>
         </p:txBody>
@@ -4236,7 +4212,7 @@
     </p:spTree>
     <p:extLst>
       <p:ext uri="{BB962C8B-B14F-4D97-AF65-F5344CB8AC3E}">
-        <p14:creationId xmlns:p14="http://schemas.microsoft.com/office/powerpoint/2010/main" val="3676571930"/>
+        <p14:creationId xmlns:p14="http://schemas.microsoft.com/office/powerpoint/2010/main" val="2794894354"/>
       </p:ext>
     </p:extLst>
   </p:cSld>
@@ -4269,7 +4245,7 @@
           <p:cNvPr id="2" name="Title 1">
             <a:extLst>
               <a:ext uri="{FF2B5EF4-FFF2-40B4-BE49-F238E27FC236}">
-                <a16:creationId xmlns:a16="http://schemas.microsoft.com/office/drawing/2014/main" id="{76FEB4EF-B74A-4B1C-B2E6-C03667CEEB89}"/>
+                <a16:creationId xmlns:a16="http://schemas.microsoft.com/office/drawing/2014/main" id="{4F41E0CD-F6EB-49C5-B95B-D275D1C03465}"/>
               </a:ext>
             </a:extLst>
           </p:cNvPr>
@@ -4287,7 +4263,47 @@
           <a:p>
             <a:r>
               <a:rPr lang="en-US" dirty="0"/>
-              <a:t>Write some tests against Connect Four</a:t>
+              <a:t>Why not to use Cypress</a:t>
+            </a:r>
+          </a:p>
+        </p:txBody>
+      </p:sp>
+      <p:sp>
+        <p:nvSpPr>
+          <p:cNvPr id="4" name="Text Placeholder 3">
+            <a:extLst>
+              <a:ext uri="{FF2B5EF4-FFF2-40B4-BE49-F238E27FC236}">
+                <a16:creationId xmlns:a16="http://schemas.microsoft.com/office/drawing/2014/main" id="{CDBF154A-3F70-4D8B-85AC-7B0E2F4B3B61}"/>
+              </a:ext>
+            </a:extLst>
+          </p:cNvPr>
+          <p:cNvSpPr>
+            <a:spLocks noGrp="1"/>
+          </p:cNvSpPr>
+          <p:nvPr>
+            <p:ph type="body" idx="1"/>
+          </p:nvPr>
+        </p:nvSpPr>
+        <p:spPr/>
+        <p:txBody>
+          <a:bodyPr/>
+          <a:lstStyle/>
+          <a:p>
+            <a:r>
+              <a:rPr lang="en-US" dirty="0"/>
+              <a:t>Firefox, Safari, and Edge</a:t>
+            </a:r>
+          </a:p>
+          <a:p>
+            <a:r>
+              <a:rPr lang="en-US" dirty="0"/>
+              <a:t>Use non browser ports on the machine its running on</a:t>
+            </a:r>
+          </a:p>
+          <a:p>
+            <a:r>
+              <a:rPr lang="en-US" dirty="0"/>
+              <a:t>Has been out of beta less than 1 year</a:t>
             </a:r>
           </a:p>
         </p:txBody>
@@ -4295,7 +4311,7 @@
     </p:spTree>
     <p:extLst>
       <p:ext uri="{BB962C8B-B14F-4D97-AF65-F5344CB8AC3E}">
-        <p14:creationId xmlns:p14="http://schemas.microsoft.com/office/powerpoint/2010/main" val="2652840151"/>
+        <p14:creationId xmlns:p14="http://schemas.microsoft.com/office/powerpoint/2010/main" val="2435944940"/>
       </p:ext>
     </p:extLst>
   </p:cSld>
@@ -4328,7 +4344,7 @@
           <p:cNvPr id="2" name="Title 1">
             <a:extLst>
               <a:ext uri="{FF2B5EF4-FFF2-40B4-BE49-F238E27FC236}">
-                <a16:creationId xmlns:a16="http://schemas.microsoft.com/office/drawing/2014/main" id="{AB138742-26DD-4BE6-AC23-F01062826A85}"/>
+                <a16:creationId xmlns:a16="http://schemas.microsoft.com/office/drawing/2014/main" id="{2A104A68-77E3-4BBB-AE19-2C2FD5F373F7}"/>
               </a:ext>
             </a:extLst>
           </p:cNvPr>
@@ -4341,12 +4357,14 @@
         </p:nvSpPr>
         <p:spPr/>
         <p:txBody>
-          <a:bodyPr/>
+          <a:bodyPr>
+            <a:normAutofit fontScale="90000"/>
+          </a:bodyPr>
           <a:lstStyle/>
           <a:p>
             <a:r>
               <a:rPr lang="en-US" dirty="0"/>
-              <a:t>Page Object Pattern</a:t>
+              <a:t>Write some tests against code camp website</a:t>
             </a:r>
           </a:p>
         </p:txBody>
@@ -4354,7 +4372,7 @@
     </p:spTree>
     <p:extLst>
       <p:ext uri="{BB962C8B-B14F-4D97-AF65-F5344CB8AC3E}">
-        <p14:creationId xmlns:p14="http://schemas.microsoft.com/office/powerpoint/2010/main" val="387887261"/>
+        <p14:creationId xmlns:p14="http://schemas.microsoft.com/office/powerpoint/2010/main" val="3676571930"/>
       </p:ext>
     </p:extLst>
   </p:cSld>
@@ -4387,7 +4405,7 @@
           <p:cNvPr id="2" name="Title 1">
             <a:extLst>
               <a:ext uri="{FF2B5EF4-FFF2-40B4-BE49-F238E27FC236}">
-                <a16:creationId xmlns:a16="http://schemas.microsoft.com/office/drawing/2014/main" id="{272D2AE6-859B-4568-953F-51753720F698}"/>
+                <a16:creationId xmlns:a16="http://schemas.microsoft.com/office/drawing/2014/main" id="{76FEB4EF-B74A-4B1C-B2E6-C03667CEEB89}"/>
               </a:ext>
             </a:extLst>
           </p:cNvPr>
@@ -4405,7 +4423,7 @@
           <a:p>
             <a:r>
               <a:rPr lang="en-US" dirty="0"/>
-              <a:t>Image comparison</a:t>
+              <a:t>Write some tests against Connect Four</a:t>
             </a:r>
           </a:p>
         </p:txBody>
@@ -4413,7 +4431,7 @@
     </p:spTree>
     <p:extLst>
       <p:ext uri="{BB962C8B-B14F-4D97-AF65-F5344CB8AC3E}">
-        <p14:creationId xmlns:p14="http://schemas.microsoft.com/office/powerpoint/2010/main" val="970919098"/>
+        <p14:creationId xmlns:p14="http://schemas.microsoft.com/office/powerpoint/2010/main" val="2652840151"/>
       </p:ext>
     </p:extLst>
   </p:cSld>
@@ -4443,10 +4461,10 @@
       </p:grpSpPr>
       <p:sp>
         <p:nvSpPr>
-          <p:cNvPr id="4" name="Title 3">
+          <p:cNvPr id="2" name="Title 1">
             <a:extLst>
               <a:ext uri="{FF2B5EF4-FFF2-40B4-BE49-F238E27FC236}">
-                <a16:creationId xmlns:a16="http://schemas.microsoft.com/office/drawing/2014/main" id="{BBBD5C05-DC4D-44CE-A7E4-8A907DAA3D0D}"/>
+                <a16:creationId xmlns:a16="http://schemas.microsoft.com/office/drawing/2014/main" id="{AB138742-26DD-4BE6-AC23-F01062826A85}"/>
               </a:ext>
             </a:extLst>
           </p:cNvPr>
@@ -4464,40 +4482,15 @@
           <a:p>
             <a:r>
               <a:rPr lang="en-US" dirty="0"/>
-              <a:t>Conclusions</a:t>
-            </a:r>
-          </a:p>
-        </p:txBody>
-      </p:sp>
-      <p:sp>
-        <p:nvSpPr>
-          <p:cNvPr id="5" name="Text Placeholder 4">
-            <a:extLst>
-              <a:ext uri="{FF2B5EF4-FFF2-40B4-BE49-F238E27FC236}">
-                <a16:creationId xmlns:a16="http://schemas.microsoft.com/office/drawing/2014/main" id="{39968A23-F06C-4E06-98FA-62FD58DB913E}"/>
-              </a:ext>
-            </a:extLst>
-          </p:cNvPr>
-          <p:cNvSpPr>
-            <a:spLocks noGrp="1"/>
-          </p:cNvSpPr>
-          <p:nvPr>
-            <p:ph type="body" sz="quarter" idx="1"/>
-          </p:nvPr>
-        </p:nvSpPr>
-        <p:spPr/>
-        <p:txBody>
-          <a:bodyPr/>
-          <a:lstStyle/>
-          <a:p>
-            <a:endParaRPr lang="en-US"/>
+              <a:t>Page Object Pattern</a:t>
+            </a:r>
           </a:p>
         </p:txBody>
       </p:sp>
     </p:spTree>
     <p:extLst>
       <p:ext uri="{BB962C8B-B14F-4D97-AF65-F5344CB8AC3E}">
-        <p14:creationId xmlns:p14="http://schemas.microsoft.com/office/powerpoint/2010/main" val="3906384395"/>
+        <p14:creationId xmlns:p14="http://schemas.microsoft.com/office/powerpoint/2010/main" val="387887261"/>
       </p:ext>
     </p:extLst>
   </p:cSld>
@@ -4652,10 +4645,63 @@
           <a:chExt cx="0" cy="0"/>
         </a:xfrm>
       </p:grpSpPr>
+      <p:sp>
+        <p:nvSpPr>
+          <p:cNvPr id="4" name="Title 3">
+            <a:extLst>
+              <a:ext uri="{FF2B5EF4-FFF2-40B4-BE49-F238E27FC236}">
+                <a16:creationId xmlns:a16="http://schemas.microsoft.com/office/drawing/2014/main" id="{BBBD5C05-DC4D-44CE-A7E4-8A907DAA3D0D}"/>
+              </a:ext>
+            </a:extLst>
+          </p:cNvPr>
+          <p:cNvSpPr>
+            <a:spLocks noGrp="1"/>
+          </p:cNvSpPr>
+          <p:nvPr>
+            <p:ph type="title"/>
+          </p:nvPr>
+        </p:nvSpPr>
+        <p:spPr/>
+        <p:txBody>
+          <a:bodyPr/>
+          <a:lstStyle/>
+          <a:p>
+            <a:r>
+              <a:rPr lang="en-US" dirty="0"/>
+              <a:t>Conclusions</a:t>
+            </a:r>
+          </a:p>
+        </p:txBody>
+      </p:sp>
+      <p:sp>
+        <p:nvSpPr>
+          <p:cNvPr id="5" name="Text Placeholder 4">
+            <a:extLst>
+              <a:ext uri="{FF2B5EF4-FFF2-40B4-BE49-F238E27FC236}">
+                <a16:creationId xmlns:a16="http://schemas.microsoft.com/office/drawing/2014/main" id="{39968A23-F06C-4E06-98FA-62FD58DB913E}"/>
+              </a:ext>
+            </a:extLst>
+          </p:cNvPr>
+          <p:cNvSpPr>
+            <a:spLocks noGrp="1"/>
+          </p:cNvSpPr>
+          <p:nvPr>
+            <p:ph type="body" sz="quarter" idx="1"/>
+          </p:nvPr>
+        </p:nvSpPr>
+        <p:spPr/>
+        <p:txBody>
+          <a:bodyPr/>
+          <a:lstStyle/>
+          <a:p>
+            <a:endParaRPr lang="en-US"/>
+          </a:p>
+        </p:txBody>
+      </p:sp>
     </p:spTree>
     <p:extLst>
       <p:ext uri="{BB962C8B-B14F-4D97-AF65-F5344CB8AC3E}">
-        <p14:creationId xmlns:p14="http://schemas.microsoft.com/office/powerpoint/2010/main" val="3190203085"/>
+        <p14:creationId xmlns:p14="http://schemas.microsoft.com/office/powerpoint/2010/main" val="3906384395"/>
       </p:ext>
     </p:extLst>
   </p:cSld>
@@ -4709,8 +4755,8 @@
         </p:nvSpPr>
         <p:spPr>
           <a:xfrm>
-            <a:off x="1476935" y="349624"/>
-            <a:ext cx="9144000" cy="968469"/>
+            <a:off x="1239579" y="427115"/>
+            <a:ext cx="9712841" cy="968469"/>
           </a:xfrm>
         </p:spPr>
         <p:txBody>
@@ -4798,73 +4844,6 @@
           <a:chExt cx="0" cy="0"/>
         </a:xfrm>
       </p:grpSpPr>
-      <p:pic>
-        <p:nvPicPr>
-          <p:cNvPr id="6" name="Picture 5">
-            <a:extLst>
-              <a:ext uri="{FF2B5EF4-FFF2-40B4-BE49-F238E27FC236}">
-                <a16:creationId xmlns:a16="http://schemas.microsoft.com/office/drawing/2014/main" id="{635D875F-0B8D-455E-83E5-C42E5543BFA2}"/>
-              </a:ext>
-            </a:extLst>
-          </p:cNvPr>
-          <p:cNvPicPr>
-            <a:picLocks noChangeAspect="1"/>
-          </p:cNvPicPr>
-          <p:nvPr/>
-        </p:nvPicPr>
-        <p:blipFill>
-          <a:blip r:embed="rId3">
-            <a:extLst>
-              <a:ext uri="{28A0092B-C50C-407E-A947-70E740481C1C}">
-                <a14:useLocalDpi xmlns:a14="http://schemas.microsoft.com/office/drawing/2010/main" val="0"/>
-              </a:ext>
-            </a:extLst>
-          </a:blip>
-          <a:stretch>
-            <a:fillRect/>
-          </a:stretch>
-        </p:blipFill>
-        <p:spPr>
-          <a:xfrm>
-            <a:off x="309282" y="327074"/>
-            <a:ext cx="4960595" cy="6203852"/>
-          </a:xfrm>
-          <a:prstGeom prst="rect">
-            <a:avLst/>
-          </a:prstGeom>
-        </p:spPr>
-      </p:pic>
-    </p:spTree>
-    <p:extLst>
-      <p:ext uri="{BB962C8B-B14F-4D97-AF65-F5344CB8AC3E}">
-        <p14:creationId xmlns:p14="http://schemas.microsoft.com/office/powerpoint/2010/main" val="51904395"/>
-      </p:ext>
-    </p:extLst>
-  </p:cSld>
-  <p:clrMapOvr>
-    <a:masterClrMapping/>
-  </p:clrMapOvr>
-  <p:transition spd="med"/>
-</p:sld>
-</file>
-
-<file path=ppt/slides/slide21.xml><?xml version="1.0" encoding="utf-8"?>
-<p:sld xmlns:a="http://schemas.openxmlformats.org/drawingml/2006/main" xmlns:r="http://schemas.openxmlformats.org/officeDocument/2006/relationships" xmlns:p="http://schemas.openxmlformats.org/presentationml/2006/main">
-  <p:cSld>
-    <p:spTree>
-      <p:nvGrpSpPr>
-        <p:cNvPr id="1" name=""/>
-        <p:cNvGrpSpPr/>
-        <p:nvPr/>
-      </p:nvGrpSpPr>
-      <p:grpSpPr>
-        <a:xfrm>
-          <a:off x="0" y="0"/>
-          <a:ext cx="0" cy="0"/>
-          <a:chOff x="0" y="0"/>
-          <a:chExt cx="0" cy="0"/>
-        </a:xfrm>
-      </p:grpSpPr>
       <p:sp>
         <p:nvSpPr>
           <p:cNvPr id="2" name="Title 1">
@@ -5029,7 +5008,7 @@
           <a:p>
             <a:r>
               <a:rPr lang="en-US" dirty="0"/>
-              <a:t>The current state of testing with Selenium</a:t>
+              <a:t>Testing with Selenium</a:t>
             </a:r>
           </a:p>
           <a:p>
@@ -5558,7 +5537,7 @@
         </p:blipFill>
         <p:spPr>
           <a:xfrm>
-            <a:off x="1093766" y="170139"/>
+            <a:off x="1093766" y="182014"/>
             <a:ext cx="10004467" cy="5511347"/>
           </a:xfrm>
           <a:prstGeom prst="rect">
@@ -5576,7 +5555,14 @@
   <p:clrMapOvr>
     <a:masterClrMapping/>
   </p:clrMapOvr>
-  <p:transition spd="med"/>
+  <mc:AlternateContent xmlns:mc="http://schemas.openxmlformats.org/markup-compatibility/2006">
+    <mc:Choice xmlns:p14="http://schemas.microsoft.com/office/powerpoint/2010/main" Requires="p14">
+      <p:transition p14:dur="0"/>
+    </mc:Choice>
+    <mc:Fallback>
+      <p:transition/>
+    </mc:Fallback>
+  </mc:AlternateContent>
 </p:sld>
 </file>
 
@@ -5599,133 +5585,211 @@
       </p:grpSpPr>
       <p:sp>
         <p:nvSpPr>
-          <p:cNvPr id="2" name="Title 1">
+          <p:cNvPr id="6" name="TextBox 5">
             <a:extLst>
               <a:ext uri="{FF2B5EF4-FFF2-40B4-BE49-F238E27FC236}">
-                <a16:creationId xmlns:a16="http://schemas.microsoft.com/office/drawing/2014/main" id="{BB68DF0E-C183-4AE6-A001-5A6BFA6787BF}"/>
+                <a16:creationId xmlns:a16="http://schemas.microsoft.com/office/drawing/2014/main" id="{4F72577C-69D8-4A20-8D34-854D8C9F70F1}"/>
               </a:ext>
             </a:extLst>
           </p:cNvPr>
-          <p:cNvSpPr>
-            <a:spLocks noGrp="1"/>
-          </p:cNvSpPr>
-          <p:nvPr>
-            <p:ph type="title"/>
-          </p:nvPr>
-        </p:nvSpPr>
-        <p:spPr/>
+          <p:cNvSpPr txBox="1"/>
+          <p:nvPr/>
+        </p:nvSpPr>
+        <p:spPr>
+          <a:xfrm>
+            <a:off x="156881" y="6394076"/>
+            <a:ext cx="4901454" cy="369330"/>
+          </a:xfrm>
+          <a:prstGeom prst="rect">
+            <a:avLst/>
+          </a:prstGeom>
+          <a:noFill/>
+          <a:ln w="12700" cap="flat">
+            <a:noFill/>
+            <a:miter lim="400000"/>
+          </a:ln>
+          <a:effectLst/>
+          <a:sp3d/>
+        </p:spPr>
+        <p:style>
+          <a:lnRef idx="0">
+            <a:scrgbClr r="0" g="0" b="0"/>
+          </a:lnRef>
+          <a:fillRef idx="0">
+            <a:scrgbClr r="0" g="0" b="0"/>
+          </a:fillRef>
+          <a:effectRef idx="0">
+            <a:scrgbClr r="0" g="0" b="0"/>
+          </a:effectRef>
+          <a:fontRef idx="none"/>
+        </p:style>
         <p:txBody>
-          <a:bodyPr>
-            <a:normAutofit/>
+          <a:bodyPr rot="0" spcFirstLastPara="1" vertOverflow="overflow" horzOverflow="overflow" vert="horz" wrap="square" lIns="45719" tIns="45719" rIns="45719" bIns="45719" numCol="1" spcCol="38100" rtlCol="0" anchor="t">
+            <a:spAutoFit/>
           </a:bodyPr>
           <a:lstStyle/>
           <a:p>
             <a:r>
-              <a:rPr lang="en-US" baseline="0" dirty="0"/>
-              <a:t>UI Tests</a:t>
-            </a:r>
-            <a:endParaRPr lang="en-US" dirty="0"/>
+              <a:rPr lang="en-US" dirty="0"/>
+              <a:t>https://martinfowler.com/bliki/TestPyramid.html</a:t>
+            </a:r>
+            <a:endParaRPr kumimoji="0" lang="en-US" sz="1800" b="0" i="0" u="none" strike="noStrike" cap="none" spc="0" normalizeH="0" baseline="0" dirty="0">
+              <a:ln>
+                <a:noFill/>
+              </a:ln>
+              <a:solidFill>
+                <a:srgbClr val="000000"/>
+              </a:solidFill>
+              <a:effectLst/>
+              <a:uFillTx/>
+              <a:latin typeface="+mn-lt"/>
+              <a:ea typeface="+mn-ea"/>
+              <a:cs typeface="+mn-cs"/>
+              <a:sym typeface="Calibri"/>
+            </a:endParaRPr>
           </a:p>
         </p:txBody>
       </p:sp>
-      <p:sp>
-        <p:nvSpPr>
-          <p:cNvPr id="3" name="Text Placeholder 2">
+      <p:pic>
+        <p:nvPicPr>
+          <p:cNvPr id="13" name="Picture 12">
             <a:extLst>
               <a:ext uri="{FF2B5EF4-FFF2-40B4-BE49-F238E27FC236}">
-                <a16:creationId xmlns:a16="http://schemas.microsoft.com/office/drawing/2014/main" id="{EA099495-3DDC-4597-86F3-962F18F58923}"/>
+                <a16:creationId xmlns:a16="http://schemas.microsoft.com/office/drawing/2014/main" id="{FF298ACB-AC98-40B8-AAC6-766657FCC977}"/>
               </a:ext>
             </a:extLst>
           </p:cNvPr>
-          <p:cNvSpPr>
-            <a:spLocks noGrp="1"/>
-          </p:cNvSpPr>
-          <p:nvPr>
-            <p:ph type="body" idx="1"/>
-          </p:nvPr>
-        </p:nvSpPr>
-        <p:spPr/>
+          <p:cNvPicPr>
+            <a:picLocks noChangeAspect="1"/>
+          </p:cNvPicPr>
+          <p:nvPr/>
+        </p:nvPicPr>
+        <p:blipFill>
+          <a:blip r:embed="rId3">
+            <a:extLst>
+              <a:ext uri="{28A0092B-C50C-407E-A947-70E740481C1C}">
+                <a14:useLocalDpi xmlns:a14="http://schemas.microsoft.com/office/drawing/2010/main" val="0"/>
+              </a:ext>
+            </a:extLst>
+          </a:blip>
+          <a:stretch>
+            <a:fillRect/>
+          </a:stretch>
+        </p:blipFill>
+        <p:spPr>
+          <a:xfrm>
+            <a:off x="1093766" y="182014"/>
+            <a:ext cx="10004467" cy="5511347"/>
+          </a:xfrm>
+          <a:prstGeom prst="rect">
+            <a:avLst/>
+          </a:prstGeom>
+        </p:spPr>
+      </p:pic>
+      <p:sp>
+        <p:nvSpPr>
+          <p:cNvPr id="5" name="Oval 4">
+            <a:extLst>
+              <a:ext uri="{FF2B5EF4-FFF2-40B4-BE49-F238E27FC236}">
+                <a16:creationId xmlns:a16="http://schemas.microsoft.com/office/drawing/2014/main" id="{B1FDCFFE-5526-3644-9B2D-C98F9CD6B9C9}"/>
+              </a:ext>
+            </a:extLst>
+          </p:cNvPr>
+          <p:cNvSpPr/>
+          <p:nvPr/>
+        </p:nvSpPr>
+        <p:spPr>
+          <a:xfrm>
+            <a:off x="4120738" y="0"/>
+            <a:ext cx="3883231" cy="1923803"/>
+          </a:xfrm>
+          <a:prstGeom prst="ellipse">
+            <a:avLst/>
+          </a:prstGeom>
+          <a:noFill/>
+          <a:ln w="38100" cap="flat">
+            <a:solidFill>
+              <a:srgbClr val="FF0000"/>
+            </a:solidFill>
+            <a:prstDash val="solid"/>
+            <a:miter lim="800000"/>
+          </a:ln>
+          <a:effectLst/>
+          <a:sp3d/>
+        </p:spPr>
+        <p:style>
+          <a:lnRef idx="0">
+            <a:scrgbClr r="0" g="0" b="0"/>
+          </a:lnRef>
+          <a:fillRef idx="0">
+            <a:scrgbClr r="0" g="0" b="0"/>
+          </a:fillRef>
+          <a:effectRef idx="0">
+            <a:scrgbClr r="0" g="0" b="0"/>
+          </a:effectRef>
+          <a:fontRef idx="none"/>
+        </p:style>
         <p:txBody>
-          <a:bodyPr>
-            <a:normAutofit/>
+          <a:bodyPr rot="0" spcFirstLastPara="1" vertOverflow="overflow" horzOverflow="overflow" vert="horz" wrap="square" lIns="45719" tIns="45719" rIns="45719" bIns="45719" numCol="1" spcCol="38100" rtlCol="0" anchor="ctr">
+            <a:spAutoFit/>
           </a:bodyPr>
           <a:lstStyle/>
           <a:p>
-            <a:endParaRPr lang="en-US" dirty="0"/>
-          </a:p>
-          <a:p>
-            <a:pPr marL="342900" indent="-342900">
-              <a:buFont typeface="Arial" panose="020B0604020202020204" pitchFamily="34" charset="0"/>
-              <a:buChar char="•"/>
+            <a:pPr marL="0" marR="0" indent="0" algn="l" defTabSz="914400" rtl="0" fontAlgn="auto" latinLnBrk="0" hangingPunct="0">
+              <a:lnSpc>
+                <a:spcPct val="100000"/>
+              </a:lnSpc>
+              <a:spcBef>
+                <a:spcPts val="0"/>
+              </a:spcBef>
+              <a:spcAft>
+                <a:spcPts val="0"/>
+              </a:spcAft>
+              <a:buClrTx/>
+              <a:buSzTx/>
+              <a:buFontTx/>
+              <a:buNone/>
+              <a:tabLst/>
             </a:pPr>
-            <a:r>
-              <a:rPr lang="en-US" dirty="0"/>
-              <a:t>Exercise your code in a live or live like environment</a:t>
-            </a:r>
-          </a:p>
-          <a:p>
-            <a:pPr marL="342900" indent="-342900">
-              <a:buFont typeface="Arial" panose="020B0604020202020204" pitchFamily="34" charset="0"/>
-              <a:buChar char="•"/>
-            </a:pPr>
-            <a:r>
-              <a:rPr lang="en-US" dirty="0"/>
-              <a:t>Verify that all components are connected correctly</a:t>
-            </a:r>
-          </a:p>
-          <a:p>
-            <a:pPr marL="342900" indent="-342900">
-              <a:buFont typeface="Arial" panose="020B0604020202020204" pitchFamily="34" charset="0"/>
-              <a:buChar char="•"/>
-            </a:pPr>
-            <a:r>
-              <a:rPr lang="en-US" dirty="0"/>
-              <a:t>Human Readable</a:t>
-            </a:r>
-          </a:p>
-          <a:p>
-            <a:pPr marL="342900" indent="-342900">
-              <a:buFont typeface="Arial" panose="020B0604020202020204" pitchFamily="34" charset="0"/>
-              <a:buChar char="•"/>
-            </a:pPr>
-            <a:r>
-              <a:rPr lang="en-US" dirty="0"/>
-              <a:t>Behavior Driven Development (Dev/Product/Test)</a:t>
-            </a:r>
-          </a:p>
-          <a:p>
-            <a:pPr marL="342900" indent="-342900">
-              <a:buFont typeface="Arial" panose="020B0604020202020204" pitchFamily="34" charset="0"/>
-              <a:buChar char="•"/>
-            </a:pPr>
-            <a:r>
-              <a:rPr lang="en-US" dirty="0"/>
-              <a:t>Acceptance Test</a:t>
-            </a:r>
-          </a:p>
-          <a:p>
-            <a:pPr marL="342900" indent="-342900">
-              <a:buFont typeface="Arial" panose="020B0604020202020204" pitchFamily="34" charset="0"/>
-              <a:buChar char="•"/>
-            </a:pPr>
-            <a:r>
-              <a:rPr lang="en-US" dirty="0"/>
-              <a:t>Signifies completion of a feature</a:t>
-            </a:r>
+            <a:endParaRPr kumimoji="0" lang="en-US" sz="1800" b="0" i="0" u="none" strike="noStrike" cap="none" spc="0" normalizeH="0" baseline="0">
+              <a:ln>
+                <a:noFill/>
+              </a:ln>
+              <a:solidFill>
+                <a:srgbClr val="000000"/>
+              </a:solidFill>
+              <a:effectLst/>
+              <a:uFillTx/>
+              <a:latin typeface="+mn-lt"/>
+              <a:ea typeface="+mn-ea"/>
+              <a:cs typeface="+mn-cs"/>
+              <a:sym typeface="Calibri"/>
+            </a:endParaRPr>
           </a:p>
         </p:txBody>
       </p:sp>
     </p:spTree>
     <p:extLst>
       <p:ext uri="{BB962C8B-B14F-4D97-AF65-F5344CB8AC3E}">
-        <p14:creationId xmlns:p14="http://schemas.microsoft.com/office/powerpoint/2010/main" val="608842736"/>
+        <p14:creationId xmlns:p14="http://schemas.microsoft.com/office/powerpoint/2010/main" val="2378464855"/>
       </p:ext>
     </p:extLst>
   </p:cSld>
   <p:clrMapOvr>
     <a:masterClrMapping/>
   </p:clrMapOvr>
-  <p:transition spd="med"/>
+  <mc:AlternateContent xmlns:mc="http://schemas.openxmlformats.org/markup-compatibility/2006">
+    <mc:Choice xmlns:p159="http://schemas.microsoft.com/office/powerpoint/2015/09/main" Requires="p159">
+      <p:transition xmlns:p14="http://schemas.microsoft.com/office/powerpoint/2010/main" spd="slow" p14:dur="2000">
+        <p159:morph option="byObject"/>
+      </p:transition>
+    </mc:Choice>
+    <mc:Fallback>
+      <p:transition spd="slow">
+        <p:fade/>
+      </p:transition>
+    </mc:Fallback>
+  </mc:AlternateContent>
 </p:sld>
 </file>
 
@@ -5751,7 +5815,7 @@
           <p:cNvPr id="2" name="Title 1">
             <a:extLst>
               <a:ext uri="{FF2B5EF4-FFF2-40B4-BE49-F238E27FC236}">
-                <a16:creationId xmlns:a16="http://schemas.microsoft.com/office/drawing/2014/main" id="{259854C5-6354-461A-8A39-A34F8C90B0C1}"/>
+                <a16:creationId xmlns:a16="http://schemas.microsoft.com/office/drawing/2014/main" id="{BB68DF0E-C183-4AE6-A001-5A6BFA6787BF}"/>
               </a:ext>
             </a:extLst>
           </p:cNvPr>
@@ -5764,13 +5828,16 @@
         </p:nvSpPr>
         <p:spPr/>
         <p:txBody>
-          <a:bodyPr/>
+          <a:bodyPr>
+            <a:normAutofit/>
+          </a:bodyPr>
           <a:lstStyle/>
           <a:p>
             <a:r>
-              <a:rPr lang="en-US" dirty="0"/>
-              <a:t>Selenium Stuff</a:t>
-            </a:r>
+              <a:rPr lang="en-US" baseline="0" dirty="0"/>
+              <a:t>Why Write UI/E2E Tests</a:t>
+            </a:r>
+            <a:endParaRPr lang="en-US" dirty="0"/>
           </a:p>
         </p:txBody>
       </p:sp>
@@ -5779,7 +5846,7 @@
           <p:cNvPr id="3" name="Text Placeholder 2">
             <a:extLst>
               <a:ext uri="{FF2B5EF4-FFF2-40B4-BE49-F238E27FC236}">
-                <a16:creationId xmlns:a16="http://schemas.microsoft.com/office/drawing/2014/main" id="{7BD95311-6057-48BF-8AD9-C95EA92BEDAF}"/>
+                <a16:creationId xmlns:a16="http://schemas.microsoft.com/office/drawing/2014/main" id="{EA099495-3DDC-4597-86F3-962F18F58923}"/>
               </a:ext>
             </a:extLst>
           </p:cNvPr>
@@ -5792,17 +5859,89 @@
         </p:nvSpPr>
         <p:spPr/>
         <p:txBody>
-          <a:bodyPr/>
+          <a:bodyPr>
+            <a:normAutofit/>
+          </a:bodyPr>
           <a:lstStyle/>
           <a:p>
-            <a:endParaRPr lang="en-US"/>
+            <a:endParaRPr lang="en-US" dirty="0"/>
+          </a:p>
+          <a:p>
+            <a:pPr marL="342900" indent="-342900">
+              <a:buFont typeface="Arial" panose="020B0604020202020204" pitchFamily="34" charset="0"/>
+              <a:buChar char="•"/>
+            </a:pPr>
+            <a:r>
+              <a:rPr lang="en-US" dirty="0"/>
+              <a:t>Exercise your code in a live or live like environment</a:t>
+            </a:r>
+          </a:p>
+          <a:p>
+            <a:pPr marL="342900" indent="-342900">
+              <a:buFont typeface="Arial" panose="020B0604020202020204" pitchFamily="34" charset="0"/>
+              <a:buChar char="•"/>
+            </a:pPr>
+            <a:r>
+              <a:rPr lang="en-US" dirty="0"/>
+              <a:t>Verify that all components are connected correctly</a:t>
+            </a:r>
+          </a:p>
+          <a:p>
+            <a:pPr marL="342900" indent="-342900">
+              <a:buFont typeface="Arial" panose="020B0604020202020204" pitchFamily="34" charset="0"/>
+              <a:buChar char="•"/>
+            </a:pPr>
+            <a:r>
+              <a:rPr lang="en-US" dirty="0"/>
+              <a:t>Human Readable</a:t>
+            </a:r>
+          </a:p>
+          <a:p>
+            <a:pPr marL="342900" indent="-342900">
+              <a:buFont typeface="Arial" panose="020B0604020202020204" pitchFamily="34" charset="0"/>
+              <a:buChar char="•"/>
+            </a:pPr>
+            <a:r>
+              <a:rPr lang="en-US" dirty="0"/>
+              <a:t>Behavior Driven Development (Dev/Product/Test)</a:t>
+            </a:r>
+          </a:p>
+          <a:p>
+            <a:pPr marL="342900" indent="-342900">
+              <a:buFont typeface="Arial" panose="020B0604020202020204" pitchFamily="34" charset="0"/>
+              <a:buChar char="•"/>
+            </a:pPr>
+            <a:r>
+              <a:rPr lang="en-US" dirty="0"/>
+              <a:t>Acceptance Test</a:t>
+            </a:r>
+          </a:p>
+          <a:p>
+            <a:pPr marL="342900" indent="-342900">
+              <a:buFont typeface="Arial" panose="020B0604020202020204" pitchFamily="34" charset="0"/>
+              <a:buChar char="•"/>
+            </a:pPr>
+            <a:r>
+              <a:rPr lang="en-US" dirty="0"/>
+              <a:t>Signifies completion of a feature</a:t>
+            </a:r>
+          </a:p>
+          <a:p>
+            <a:pPr marL="342900" indent="-342900">
+              <a:buFont typeface="Arial" panose="020B0604020202020204" pitchFamily="34" charset="0"/>
+              <a:buChar char="•"/>
+            </a:pPr>
+            <a:r>
+              <a:rPr lang="en-US" dirty="0"/>
+              <a:t>Legacy code</a:t>
+            </a:r>
           </a:p>
         </p:txBody>
       </p:sp>
     </p:spTree>
     <p:extLst>
       <p:ext uri="{BB962C8B-B14F-4D97-AF65-F5344CB8AC3E}">
-        <p14:creationId xmlns:p14="http://schemas.microsoft.com/office/powerpoint/2010/main" val="313967177"/>
+        <p14:creationId xmlns:p14="http://schemas.microsoft.com/office/powerpoint/2010/main" val="608842736"/>
       </p:ext>
     </p:extLst>
   </p:cSld>
@@ -5853,7 +5992,7 @@
           <a:p>
             <a:r>
               <a:rPr lang="en-US" dirty="0"/>
-              <a:t>Selenium vs Cypress in our project</a:t>
+              <a:t>Selenium to Cypress in a project</a:t>
             </a:r>
           </a:p>
         </p:txBody>

</xml_diff>

<commit_message>
Almost done with slides
</commit_message>
<xml_diff>
--- a/And Now Seleniums Watch is Ended.pptx
+++ b/And Now Seleniums Watch is Ended.pptx
@@ -5,7 +5,7 @@
     <p:sldMasterId id="2147483648" r:id="rId1"/>
   </p:sldMasterIdLst>
   <p:notesMasterIdLst>
-    <p:notesMasterId r:id="rId22"/>
+    <p:notesMasterId r:id="rId29"/>
   </p:notesMasterIdLst>
   <p:sldIdLst>
     <p:sldId id="276" r:id="rId2"/>
@@ -16,18 +16,25 @@
     <p:sldId id="283" r:id="rId7"/>
     <p:sldId id="329" r:id="rId8"/>
     <p:sldId id="285" r:id="rId9"/>
-    <p:sldId id="320" r:id="rId10"/>
-    <p:sldId id="327" r:id="rId11"/>
-    <p:sldId id="328" r:id="rId12"/>
-    <p:sldId id="321" r:id="rId13"/>
-    <p:sldId id="323" r:id="rId14"/>
-    <p:sldId id="322" r:id="rId15"/>
-    <p:sldId id="324" r:id="rId16"/>
-    <p:sldId id="325" r:id="rId17"/>
-    <p:sldId id="292" r:id="rId18"/>
-    <p:sldId id="312" r:id="rId19"/>
-    <p:sldId id="313" r:id="rId20"/>
-    <p:sldId id="315" r:id="rId21"/>
+    <p:sldId id="332" r:id="rId10"/>
+    <p:sldId id="334" r:id="rId11"/>
+    <p:sldId id="320" r:id="rId12"/>
+    <p:sldId id="336" r:id="rId13"/>
+    <p:sldId id="337" r:id="rId14"/>
+    <p:sldId id="338" r:id="rId15"/>
+    <p:sldId id="339" r:id="rId16"/>
+    <p:sldId id="340" r:id="rId17"/>
+    <p:sldId id="341" r:id="rId18"/>
+    <p:sldId id="321" r:id="rId19"/>
+    <p:sldId id="323" r:id="rId20"/>
+    <p:sldId id="342" r:id="rId21"/>
+    <p:sldId id="343" r:id="rId22"/>
+    <p:sldId id="325" r:id="rId23"/>
+    <p:sldId id="344" r:id="rId24"/>
+    <p:sldId id="292" r:id="rId25"/>
+    <p:sldId id="345" r:id="rId26"/>
+    <p:sldId id="346" r:id="rId27"/>
+    <p:sldId id="315" r:id="rId28"/>
   </p:sldIdLst>
   <p:sldSz cx="12192000" cy="6858000"/>
   <p:notesSz cx="6858000" cy="9144000"/>
@@ -787,6 +794,684 @@
 </p:notes>
 </file>
 
+<file path=ppt/notesSlides/notesSlide10.xml><?xml version="1.0" encoding="utf-8"?>
+<p:notes xmlns:a="http://schemas.openxmlformats.org/drawingml/2006/main" xmlns:r="http://schemas.openxmlformats.org/officeDocument/2006/relationships" xmlns:p="http://schemas.openxmlformats.org/presentationml/2006/main">
+  <p:cSld>
+    <p:spTree>
+      <p:nvGrpSpPr>
+        <p:cNvPr id="1" name=""/>
+        <p:cNvGrpSpPr/>
+        <p:nvPr/>
+      </p:nvGrpSpPr>
+      <p:grpSpPr>
+        <a:xfrm>
+          <a:off x="0" y="0"/>
+          <a:ext cx="0" cy="0"/>
+          <a:chOff x="0" y="0"/>
+          <a:chExt cx="0" cy="0"/>
+        </a:xfrm>
+      </p:grpSpPr>
+      <p:sp>
+        <p:nvSpPr>
+          <p:cNvPr id="2" name="Slide Image Placeholder 1"/>
+          <p:cNvSpPr>
+            <a:spLocks noGrp="1" noRot="1" noChangeAspect="1"/>
+          </p:cNvSpPr>
+          <p:nvPr>
+            <p:ph type="sldImg"/>
+          </p:nvPr>
+        </p:nvSpPr>
+        <p:spPr/>
+      </p:sp>
+      <p:sp>
+        <p:nvSpPr>
+          <p:cNvPr id="3" name="Notes Placeholder 2"/>
+          <p:cNvSpPr>
+            <a:spLocks noGrp="1"/>
+          </p:cNvSpPr>
+          <p:nvPr>
+            <p:ph type="body" idx="1"/>
+          </p:nvPr>
+        </p:nvSpPr>
+        <p:spPr/>
+        <p:txBody>
+          <a:bodyPr/>
+          <a:lstStyle/>
+          <a:p>
+            <a:pPr marL="0" marR="0" lvl="0" indent="0" algn="l" defTabSz="914400" rtl="0" eaLnBrk="1" fontAlgn="auto" latinLnBrk="0" hangingPunct="1">
+              <a:lnSpc>
+                <a:spcPct val="100000"/>
+              </a:lnSpc>
+              <a:spcBef>
+                <a:spcPts val="0"/>
+              </a:spcBef>
+              <a:spcAft>
+                <a:spcPts val="0"/>
+              </a:spcAft>
+              <a:buClrTx/>
+              <a:buSzTx/>
+              <a:buFontTx/>
+              <a:buNone/>
+              <a:tabLst/>
+              <a:defRPr/>
+            </a:pPr>
+            <a:r>
+              <a:rPr lang="en-US" dirty="0"/>
+              <a:t>Writing new tests did not take as long</a:t>
+            </a:r>
+          </a:p>
+          <a:p>
+            <a:endParaRPr lang="en-US" dirty="0"/>
+          </a:p>
+        </p:txBody>
+      </p:sp>
+      <p:sp>
+        <p:nvSpPr>
+          <p:cNvPr id="4" name="Slide Number Placeholder 3"/>
+          <p:cNvSpPr>
+            <a:spLocks noGrp="1"/>
+          </p:cNvSpPr>
+          <p:nvPr>
+            <p:ph type="sldNum" sz="quarter" idx="5"/>
+          </p:nvPr>
+        </p:nvSpPr>
+        <p:spPr/>
+        <p:txBody>
+          <a:bodyPr/>
+          <a:lstStyle/>
+          <a:p>
+            <a:fld id="{D06C7275-F3C5-4EE7-8C54-771BE2CF8BB4}" type="slidenum">
+              <a:rPr lang="en-US" smtClean="0"/>
+              <a:t>15</a:t>
+            </a:fld>
+            <a:endParaRPr lang="en-US"/>
+          </a:p>
+        </p:txBody>
+      </p:sp>
+    </p:spTree>
+    <p:extLst>
+      <p:ext uri="{BB962C8B-B14F-4D97-AF65-F5344CB8AC3E}">
+        <p14:creationId xmlns:p14="http://schemas.microsoft.com/office/powerpoint/2010/main" val="4165935468"/>
+      </p:ext>
+    </p:extLst>
+  </p:cSld>
+  <p:clrMapOvr>
+    <a:masterClrMapping/>
+  </p:clrMapOvr>
+</p:notes>
+</file>
+
+<file path=ppt/notesSlides/notesSlide11.xml><?xml version="1.0" encoding="utf-8"?>
+<p:notes xmlns:a="http://schemas.openxmlformats.org/drawingml/2006/main" xmlns:r="http://schemas.openxmlformats.org/officeDocument/2006/relationships" xmlns:p="http://schemas.openxmlformats.org/presentationml/2006/main">
+  <p:cSld>
+    <p:spTree>
+      <p:nvGrpSpPr>
+        <p:cNvPr id="1" name=""/>
+        <p:cNvGrpSpPr/>
+        <p:nvPr/>
+      </p:nvGrpSpPr>
+      <p:grpSpPr>
+        <a:xfrm>
+          <a:off x="0" y="0"/>
+          <a:ext cx="0" cy="0"/>
+          <a:chOff x="0" y="0"/>
+          <a:chExt cx="0" cy="0"/>
+        </a:xfrm>
+      </p:grpSpPr>
+      <p:sp>
+        <p:nvSpPr>
+          <p:cNvPr id="2" name="Slide Image Placeholder 1"/>
+          <p:cNvSpPr>
+            <a:spLocks noGrp="1" noRot="1" noChangeAspect="1"/>
+          </p:cNvSpPr>
+          <p:nvPr>
+            <p:ph type="sldImg"/>
+          </p:nvPr>
+        </p:nvSpPr>
+        <p:spPr/>
+      </p:sp>
+      <p:sp>
+        <p:nvSpPr>
+          <p:cNvPr id="3" name="Notes Placeholder 2"/>
+          <p:cNvSpPr>
+            <a:spLocks noGrp="1"/>
+          </p:cNvSpPr>
+          <p:nvPr>
+            <p:ph type="body" idx="1"/>
+          </p:nvPr>
+        </p:nvSpPr>
+        <p:spPr/>
+        <p:txBody>
+          <a:bodyPr/>
+          <a:lstStyle/>
+          <a:p>
+            <a:pPr marL="0" marR="0" lvl="0" indent="0" algn="l" defTabSz="914400" rtl="0" eaLnBrk="1" fontAlgn="auto" latinLnBrk="0" hangingPunct="1">
+              <a:lnSpc>
+                <a:spcPct val="100000"/>
+              </a:lnSpc>
+              <a:spcBef>
+                <a:spcPts val="0"/>
+              </a:spcBef>
+              <a:spcAft>
+                <a:spcPts val="0"/>
+              </a:spcAft>
+              <a:buClrTx/>
+              <a:buSzTx/>
+              <a:buFontTx/>
+              <a:buNone/>
+              <a:tabLst/>
+              <a:defRPr/>
+            </a:pPr>
+            <a:r>
+              <a:rPr lang="en-US" dirty="0"/>
+              <a:t>Could no longer use port to verify information sent over email</a:t>
+            </a:r>
+          </a:p>
+          <a:p>
+            <a:r>
+              <a:rPr lang="en-US" dirty="0"/>
+              <a:t>File system issues</a:t>
+            </a:r>
+          </a:p>
+        </p:txBody>
+      </p:sp>
+      <p:sp>
+        <p:nvSpPr>
+          <p:cNvPr id="4" name="Slide Number Placeholder 3"/>
+          <p:cNvSpPr>
+            <a:spLocks noGrp="1"/>
+          </p:cNvSpPr>
+          <p:nvPr>
+            <p:ph type="sldNum" sz="quarter" idx="5"/>
+          </p:nvPr>
+        </p:nvSpPr>
+        <p:spPr/>
+        <p:txBody>
+          <a:bodyPr/>
+          <a:lstStyle/>
+          <a:p>
+            <a:fld id="{D06C7275-F3C5-4EE7-8C54-771BE2CF8BB4}" type="slidenum">
+              <a:rPr lang="en-US" smtClean="0"/>
+              <a:t>17</a:t>
+            </a:fld>
+            <a:endParaRPr lang="en-US"/>
+          </a:p>
+        </p:txBody>
+      </p:sp>
+    </p:spTree>
+    <p:extLst>
+      <p:ext uri="{BB962C8B-B14F-4D97-AF65-F5344CB8AC3E}">
+        <p14:creationId xmlns:p14="http://schemas.microsoft.com/office/powerpoint/2010/main" val="450504274"/>
+      </p:ext>
+    </p:extLst>
+  </p:cSld>
+  <p:clrMapOvr>
+    <a:masterClrMapping/>
+  </p:clrMapOvr>
+</p:notes>
+</file>
+
+<file path=ppt/notesSlides/notesSlide12.xml><?xml version="1.0" encoding="utf-8"?>
+<p:notes xmlns:a="http://schemas.openxmlformats.org/drawingml/2006/main" xmlns:r="http://schemas.openxmlformats.org/officeDocument/2006/relationships" xmlns:p="http://schemas.openxmlformats.org/presentationml/2006/main">
+  <p:cSld>
+    <p:spTree>
+      <p:nvGrpSpPr>
+        <p:cNvPr id="1" name=""/>
+        <p:cNvGrpSpPr/>
+        <p:nvPr/>
+      </p:nvGrpSpPr>
+      <p:grpSpPr>
+        <a:xfrm>
+          <a:off x="0" y="0"/>
+          <a:ext cx="0" cy="0"/>
+          <a:chOff x="0" y="0"/>
+          <a:chExt cx="0" cy="0"/>
+        </a:xfrm>
+      </p:grpSpPr>
+      <p:sp>
+        <p:nvSpPr>
+          <p:cNvPr id="2" name="Slide Image Placeholder 1"/>
+          <p:cNvSpPr>
+            <a:spLocks noGrp="1" noRot="1" noChangeAspect="1"/>
+          </p:cNvSpPr>
+          <p:nvPr>
+            <p:ph type="sldImg"/>
+          </p:nvPr>
+        </p:nvSpPr>
+        <p:spPr/>
+      </p:sp>
+      <p:sp>
+        <p:nvSpPr>
+          <p:cNvPr id="3" name="Notes Placeholder 2"/>
+          <p:cNvSpPr>
+            <a:spLocks noGrp="1"/>
+          </p:cNvSpPr>
+          <p:nvPr>
+            <p:ph type="body" idx="1"/>
+          </p:nvPr>
+        </p:nvSpPr>
+        <p:spPr/>
+        <p:txBody>
+          <a:bodyPr/>
+          <a:lstStyle/>
+          <a:p>
+            <a:r>
+              <a:rPr lang="en-US" dirty="0"/>
+              <a:t>Testing framework for web applications</a:t>
+            </a:r>
+          </a:p>
+          <a:p>
+            <a:r>
+              <a:rPr lang="en-US" dirty="0"/>
+              <a:t>It is already in the browser.  It knows </a:t>
+            </a:r>
+            <a:r>
+              <a:rPr lang="en-US" dirty="0" err="1"/>
+              <a:t>whats</a:t>
+            </a:r>
+            <a:r>
+              <a:rPr lang="en-US" dirty="0"/>
+              <a:t> going on in your application in browser.  Can wait for async requests to resolve.  As opposed to using a wait.</a:t>
+            </a:r>
+          </a:p>
+        </p:txBody>
+      </p:sp>
+      <p:sp>
+        <p:nvSpPr>
+          <p:cNvPr id="4" name="Slide Number Placeholder 3"/>
+          <p:cNvSpPr>
+            <a:spLocks noGrp="1"/>
+          </p:cNvSpPr>
+          <p:nvPr>
+            <p:ph type="sldNum" sz="quarter" idx="5"/>
+          </p:nvPr>
+        </p:nvSpPr>
+        <p:spPr/>
+        <p:txBody>
+          <a:bodyPr/>
+          <a:lstStyle/>
+          <a:p>
+            <a:fld id="{D06C7275-F3C5-4EE7-8C54-771BE2CF8BB4}" type="slidenum">
+              <a:rPr lang="en-US" smtClean="0"/>
+              <a:t>18</a:t>
+            </a:fld>
+            <a:endParaRPr lang="en-US"/>
+          </a:p>
+        </p:txBody>
+      </p:sp>
+    </p:spTree>
+    <p:extLst>
+      <p:ext uri="{BB962C8B-B14F-4D97-AF65-F5344CB8AC3E}">
+        <p14:creationId xmlns:p14="http://schemas.microsoft.com/office/powerpoint/2010/main" val="578138218"/>
+      </p:ext>
+    </p:extLst>
+  </p:cSld>
+  <p:clrMapOvr>
+    <a:masterClrMapping/>
+  </p:clrMapOvr>
+</p:notes>
+</file>
+
+<file path=ppt/notesSlides/notesSlide13.xml><?xml version="1.0" encoding="utf-8"?>
+<p:notes xmlns:a="http://schemas.openxmlformats.org/drawingml/2006/main" xmlns:r="http://schemas.openxmlformats.org/officeDocument/2006/relationships" xmlns:p="http://schemas.openxmlformats.org/presentationml/2006/main">
+  <p:cSld>
+    <p:spTree>
+      <p:nvGrpSpPr>
+        <p:cNvPr id="1" name=""/>
+        <p:cNvGrpSpPr/>
+        <p:nvPr/>
+      </p:nvGrpSpPr>
+      <p:grpSpPr>
+        <a:xfrm>
+          <a:off x="0" y="0"/>
+          <a:ext cx="0" cy="0"/>
+          <a:chOff x="0" y="0"/>
+          <a:chExt cx="0" cy="0"/>
+        </a:xfrm>
+      </p:grpSpPr>
+      <p:sp>
+        <p:nvSpPr>
+          <p:cNvPr id="2" name="Slide Image Placeholder 1"/>
+          <p:cNvSpPr>
+            <a:spLocks noGrp="1" noRot="1" noChangeAspect="1"/>
+          </p:cNvSpPr>
+          <p:nvPr>
+            <p:ph type="sldImg"/>
+          </p:nvPr>
+        </p:nvSpPr>
+        <p:spPr/>
+      </p:sp>
+      <p:sp>
+        <p:nvSpPr>
+          <p:cNvPr id="3" name="Notes Placeholder 2"/>
+          <p:cNvSpPr>
+            <a:spLocks noGrp="1"/>
+          </p:cNvSpPr>
+          <p:nvPr>
+            <p:ph type="body" idx="1"/>
+          </p:nvPr>
+        </p:nvSpPr>
+        <p:spPr/>
+        <p:txBody>
+          <a:bodyPr/>
+          <a:lstStyle/>
+          <a:p>
+            <a:r>
+              <a:rPr lang="en-US" dirty="0"/>
+              <a:t>Selenium is more like a real user of the product.</a:t>
+            </a:r>
+          </a:p>
+        </p:txBody>
+      </p:sp>
+      <p:sp>
+        <p:nvSpPr>
+          <p:cNvPr id="4" name="Slide Number Placeholder 3"/>
+          <p:cNvSpPr>
+            <a:spLocks noGrp="1"/>
+          </p:cNvSpPr>
+          <p:nvPr>
+            <p:ph type="sldNum" sz="quarter" idx="5"/>
+          </p:nvPr>
+        </p:nvSpPr>
+        <p:spPr/>
+        <p:txBody>
+          <a:bodyPr/>
+          <a:lstStyle/>
+          <a:p>
+            <a:fld id="{D06C7275-F3C5-4EE7-8C54-771BE2CF8BB4}" type="slidenum">
+              <a:rPr lang="en-US" smtClean="0"/>
+              <a:t>19</a:t>
+            </a:fld>
+            <a:endParaRPr lang="en-US"/>
+          </a:p>
+        </p:txBody>
+      </p:sp>
+    </p:spTree>
+    <p:extLst>
+      <p:ext uri="{BB962C8B-B14F-4D97-AF65-F5344CB8AC3E}">
+        <p14:creationId xmlns:p14="http://schemas.microsoft.com/office/powerpoint/2010/main" val="730539553"/>
+      </p:ext>
+    </p:extLst>
+  </p:cSld>
+  <p:clrMapOvr>
+    <a:masterClrMapping/>
+  </p:clrMapOvr>
+</p:notes>
+</file>
+
+<file path=ppt/notesSlides/notesSlide14.xml><?xml version="1.0" encoding="utf-8"?>
+<p:notes xmlns:a="http://schemas.openxmlformats.org/drawingml/2006/main" xmlns:r="http://schemas.openxmlformats.org/officeDocument/2006/relationships" xmlns:p="http://schemas.openxmlformats.org/presentationml/2006/main">
+  <p:cSld>
+    <p:spTree>
+      <p:nvGrpSpPr>
+        <p:cNvPr id="1" name=""/>
+        <p:cNvGrpSpPr/>
+        <p:nvPr/>
+      </p:nvGrpSpPr>
+      <p:grpSpPr>
+        <a:xfrm>
+          <a:off x="0" y="0"/>
+          <a:ext cx="0" cy="0"/>
+          <a:chOff x="0" y="0"/>
+          <a:chExt cx="0" cy="0"/>
+        </a:xfrm>
+      </p:grpSpPr>
+      <p:sp>
+        <p:nvSpPr>
+          <p:cNvPr id="2" name="Slide Image Placeholder 1"/>
+          <p:cNvSpPr>
+            <a:spLocks noGrp="1" noRot="1" noChangeAspect="1"/>
+          </p:cNvSpPr>
+          <p:nvPr>
+            <p:ph type="sldImg"/>
+          </p:nvPr>
+        </p:nvSpPr>
+        <p:spPr/>
+      </p:sp>
+      <p:sp>
+        <p:nvSpPr>
+          <p:cNvPr id="3" name="Notes Placeholder 2"/>
+          <p:cNvSpPr>
+            <a:spLocks noGrp="1"/>
+          </p:cNvSpPr>
+          <p:nvPr>
+            <p:ph type="body" idx="1"/>
+          </p:nvPr>
+        </p:nvSpPr>
+        <p:spPr/>
+        <p:txBody>
+          <a:bodyPr/>
+          <a:lstStyle/>
+          <a:p>
+            <a:r>
+              <a:rPr lang="en-US" dirty="0"/>
+              <a:t>Where you can start.</a:t>
+            </a:r>
+          </a:p>
+          <a:p>
+            <a:r>
+              <a:rPr lang="en-US" dirty="0"/>
+              <a:t>How will we know what we’ve made changes correctly?</a:t>
+            </a:r>
+          </a:p>
+          <a:p>
+            <a:r>
+              <a:rPr lang="en-US" dirty="0"/>
+              <a:t>How will we know that we haven’t broken anything?</a:t>
+            </a:r>
+          </a:p>
+        </p:txBody>
+      </p:sp>
+      <p:sp>
+        <p:nvSpPr>
+          <p:cNvPr id="4" name="Slide Number Placeholder 3"/>
+          <p:cNvSpPr>
+            <a:spLocks noGrp="1"/>
+          </p:cNvSpPr>
+          <p:nvPr>
+            <p:ph type="sldNum" sz="quarter" idx="5"/>
+          </p:nvPr>
+        </p:nvSpPr>
+        <p:spPr/>
+        <p:txBody>
+          <a:bodyPr/>
+          <a:lstStyle/>
+          <a:p>
+            <a:fld id="{D06C7275-F3C5-4EE7-8C54-771BE2CF8BB4}" type="slidenum">
+              <a:rPr lang="en-US" smtClean="0"/>
+              <a:t>24</a:t>
+            </a:fld>
+            <a:endParaRPr lang="en-US"/>
+          </a:p>
+        </p:txBody>
+      </p:sp>
+    </p:spTree>
+    <p:extLst>
+      <p:ext uri="{BB962C8B-B14F-4D97-AF65-F5344CB8AC3E}">
+        <p14:creationId xmlns:p14="http://schemas.microsoft.com/office/powerpoint/2010/main" val="2974243069"/>
+      </p:ext>
+    </p:extLst>
+  </p:cSld>
+  <p:clrMapOvr>
+    <a:masterClrMapping/>
+  </p:clrMapOvr>
+</p:notes>
+</file>
+
+<file path=ppt/notesSlides/notesSlide15.xml><?xml version="1.0" encoding="utf-8"?>
+<p:notes xmlns:a="http://schemas.openxmlformats.org/drawingml/2006/main" xmlns:r="http://schemas.openxmlformats.org/officeDocument/2006/relationships" xmlns:p="http://schemas.openxmlformats.org/presentationml/2006/main">
+  <p:cSld>
+    <p:spTree>
+      <p:nvGrpSpPr>
+        <p:cNvPr id="1" name=""/>
+        <p:cNvGrpSpPr/>
+        <p:nvPr/>
+      </p:nvGrpSpPr>
+      <p:grpSpPr>
+        <a:xfrm>
+          <a:off x="0" y="0"/>
+          <a:ext cx="0" cy="0"/>
+          <a:chOff x="0" y="0"/>
+          <a:chExt cx="0" cy="0"/>
+        </a:xfrm>
+      </p:grpSpPr>
+      <p:sp>
+        <p:nvSpPr>
+          <p:cNvPr id="2" name="Slide Image Placeholder 1"/>
+          <p:cNvSpPr>
+            <a:spLocks noGrp="1" noRot="1" noChangeAspect="1"/>
+          </p:cNvSpPr>
+          <p:nvPr>
+            <p:ph type="sldImg"/>
+          </p:nvPr>
+        </p:nvSpPr>
+        <p:spPr/>
+      </p:sp>
+      <p:sp>
+        <p:nvSpPr>
+          <p:cNvPr id="3" name="Notes Placeholder 2"/>
+          <p:cNvSpPr>
+            <a:spLocks noGrp="1"/>
+          </p:cNvSpPr>
+          <p:nvPr>
+            <p:ph type="body" idx="1"/>
+          </p:nvPr>
+        </p:nvSpPr>
+        <p:spPr/>
+        <p:txBody>
+          <a:bodyPr/>
+          <a:lstStyle/>
+          <a:p>
+            <a:r>
+              <a:rPr lang="en-US" dirty="0"/>
+              <a:t>We only had a chance to talk about the top</a:t>
+            </a:r>
+          </a:p>
+        </p:txBody>
+      </p:sp>
+      <p:sp>
+        <p:nvSpPr>
+          <p:cNvPr id="4" name="Slide Number Placeholder 3"/>
+          <p:cNvSpPr>
+            <a:spLocks noGrp="1"/>
+          </p:cNvSpPr>
+          <p:nvPr>
+            <p:ph type="sldNum" sz="quarter" idx="5"/>
+          </p:nvPr>
+        </p:nvSpPr>
+        <p:spPr/>
+        <p:txBody>
+          <a:bodyPr/>
+          <a:lstStyle/>
+          <a:p>
+            <a:fld id="{D06C7275-F3C5-4EE7-8C54-771BE2CF8BB4}" type="slidenum">
+              <a:rPr lang="en-US" smtClean="0"/>
+              <a:t>25</a:t>
+            </a:fld>
+            <a:endParaRPr lang="en-US"/>
+          </a:p>
+        </p:txBody>
+      </p:sp>
+    </p:spTree>
+    <p:extLst>
+      <p:ext uri="{BB962C8B-B14F-4D97-AF65-F5344CB8AC3E}">
+        <p14:creationId xmlns:p14="http://schemas.microsoft.com/office/powerpoint/2010/main" val="3208535621"/>
+      </p:ext>
+    </p:extLst>
+  </p:cSld>
+  <p:clrMapOvr>
+    <a:masterClrMapping/>
+  </p:clrMapOvr>
+</p:notes>
+</file>
+
+<file path=ppt/notesSlides/notesSlide16.xml><?xml version="1.0" encoding="utf-8"?>
+<p:notes xmlns:a="http://schemas.openxmlformats.org/drawingml/2006/main" xmlns:r="http://schemas.openxmlformats.org/officeDocument/2006/relationships" xmlns:p="http://schemas.openxmlformats.org/presentationml/2006/main">
+  <p:cSld>
+    <p:spTree>
+      <p:nvGrpSpPr>
+        <p:cNvPr id="1" name=""/>
+        <p:cNvGrpSpPr/>
+        <p:nvPr/>
+      </p:nvGrpSpPr>
+      <p:grpSpPr>
+        <a:xfrm>
+          <a:off x="0" y="0"/>
+          <a:ext cx="0" cy="0"/>
+          <a:chOff x="0" y="0"/>
+          <a:chExt cx="0" cy="0"/>
+        </a:xfrm>
+      </p:grpSpPr>
+      <p:sp>
+        <p:nvSpPr>
+          <p:cNvPr id="2" name="Slide Image Placeholder 1"/>
+          <p:cNvSpPr>
+            <a:spLocks noGrp="1" noRot="1" noChangeAspect="1"/>
+          </p:cNvSpPr>
+          <p:nvPr>
+            <p:ph type="sldImg"/>
+          </p:nvPr>
+        </p:nvSpPr>
+        <p:spPr/>
+      </p:sp>
+      <p:sp>
+        <p:nvSpPr>
+          <p:cNvPr id="3" name="Notes Placeholder 2"/>
+          <p:cNvSpPr>
+            <a:spLocks noGrp="1"/>
+          </p:cNvSpPr>
+          <p:nvPr>
+            <p:ph type="body" idx="1"/>
+          </p:nvPr>
+        </p:nvSpPr>
+        <p:spPr/>
+        <p:txBody>
+          <a:bodyPr/>
+          <a:lstStyle/>
+          <a:p>
+            <a:r>
+              <a:rPr lang="en-US" dirty="0"/>
+              <a:t>We only had a chance to talk about the top</a:t>
+            </a:r>
+          </a:p>
+        </p:txBody>
+      </p:sp>
+      <p:sp>
+        <p:nvSpPr>
+          <p:cNvPr id="4" name="Slide Number Placeholder 3"/>
+          <p:cNvSpPr>
+            <a:spLocks noGrp="1"/>
+          </p:cNvSpPr>
+          <p:nvPr>
+            <p:ph type="sldNum" sz="quarter" idx="5"/>
+          </p:nvPr>
+        </p:nvSpPr>
+        <p:spPr/>
+        <p:txBody>
+          <a:bodyPr/>
+          <a:lstStyle/>
+          <a:p>
+            <a:fld id="{D06C7275-F3C5-4EE7-8C54-771BE2CF8BB4}" type="slidenum">
+              <a:rPr lang="en-US" smtClean="0"/>
+              <a:t>26</a:t>
+            </a:fld>
+            <a:endParaRPr lang="en-US"/>
+          </a:p>
+        </p:txBody>
+      </p:sp>
+    </p:spTree>
+    <p:extLst>
+      <p:ext uri="{BB962C8B-B14F-4D97-AF65-F5344CB8AC3E}">
+        <p14:creationId xmlns:p14="http://schemas.microsoft.com/office/powerpoint/2010/main" val="4134969063"/>
+      </p:ext>
+    </p:extLst>
+  </p:cSld>
+  <p:clrMapOvr>
+    <a:masterClrMapping/>
+  </p:clrMapOvr>
+</p:notes>
+</file>
+
 <file path=ppt/notesSlides/notesSlide2.xml><?xml version="1.0" encoding="utf-8"?>
 <p:notes xmlns:a="http://schemas.openxmlformats.org/drawingml/2006/main" xmlns:r="http://schemas.openxmlformats.org/officeDocument/2006/relationships" xmlns:p="http://schemas.openxmlformats.org/presentationml/2006/main">
   <p:cSld>
@@ -1007,7 +1692,7 @@
           <a:p>
             <a:r>
               <a:rPr lang="en-US" dirty="0"/>
-              <a:t>Behavior Driven Development is a methodology that encapsulates a lot but one of the core tenants is having a representative from product, dev, and test get together and come up with acceptance tests that flush out a feature.  Today we are going to start writing our app with a failing acceptance test that when passing signifies that we have implemented the functionality that the product owner requested.</a:t>
+              <a:t>Does it integrate?  Are environment variables set correctly? Am I connected to correct database?</a:t>
             </a:r>
           </a:p>
         </p:txBody>
@@ -1094,19 +1779,7 @@
           <a:p>
             <a:r>
               <a:rPr lang="en-US" dirty="0"/>
-              <a:t>Where you can start.</a:t>
-            </a:r>
-          </a:p>
-          <a:p>
-            <a:r>
-              <a:rPr lang="en-US" dirty="0"/>
-              <a:t>How will we know what we’ve made changes correctly?</a:t>
-            </a:r>
-          </a:p>
-          <a:p>
-            <a:r>
-              <a:rPr lang="en-US" dirty="0"/>
-              <a:t>How will we know that we haven’t broken anything?</a:t>
+              <a:t>Behavior Driven Development is a methodology that encapsulates a lot but one of the core tenants is having a representative from product, dev, and test get together and come up with acceptance tests that flush out a feature.  Today we are going to start writing our app with a failing acceptance test that when passing signifies that we have implemented the functionality that the product owner requested.</a:t>
             </a:r>
           </a:p>
         </p:txBody>
@@ -1128,7 +1801,7 @@
           <a:p>
             <a:fld id="{D06C7275-F3C5-4EE7-8C54-771BE2CF8BB4}" type="slidenum">
               <a:rPr lang="en-US" smtClean="0"/>
-              <a:t>17</a:t>
+              <a:t>9</a:t>
             </a:fld>
             <a:endParaRPr lang="en-US"/>
           </a:p>
@@ -1137,7 +1810,7 @@
     </p:spTree>
     <p:extLst>
       <p:ext uri="{BB962C8B-B14F-4D97-AF65-F5344CB8AC3E}">
-        <p14:creationId xmlns:p14="http://schemas.microsoft.com/office/powerpoint/2010/main" val="2974243069"/>
+        <p14:creationId xmlns:p14="http://schemas.microsoft.com/office/powerpoint/2010/main" val="4063514019"/>
       </p:ext>
     </p:extLst>
   </p:cSld>
@@ -1193,21 +1866,8 @@
           <a:p>
             <a:r>
               <a:rPr lang="en-US" dirty="0"/>
-              <a:t>You only write the code that you need to </a:t>
-            </a:r>
-            <a:r>
-              <a:rPr lang="en-US" dirty="0" err="1"/>
-              <a:t>dulfill</a:t>
-            </a:r>
-            <a:r>
-              <a:rPr lang="en-US" dirty="0"/>
-              <a:t> </a:t>
-            </a:r>
-            <a:r>
-              <a:rPr lang="en-US" dirty="0" err="1"/>
-              <a:t>th</a:t>
-            </a:r>
-            <a:endParaRPr lang="en-US" dirty="0"/>
+              <a:t>Mike says Bridge!!!</a:t>
+            </a:r>
           </a:p>
         </p:txBody>
       </p:sp>
@@ -1228,7 +1888,7 @@
           <a:p>
             <a:fld id="{D06C7275-F3C5-4EE7-8C54-771BE2CF8BB4}" type="slidenum">
               <a:rPr lang="en-US" smtClean="0"/>
-              <a:t>18</a:t>
+              <a:t>10</a:t>
             </a:fld>
             <a:endParaRPr lang="en-US"/>
           </a:p>
@@ -1237,7 +1897,305 @@
     </p:spTree>
     <p:extLst>
       <p:ext uri="{BB962C8B-B14F-4D97-AF65-F5344CB8AC3E}">
-        <p14:creationId xmlns:p14="http://schemas.microsoft.com/office/powerpoint/2010/main" val="1583858752"/>
+        <p14:creationId xmlns:p14="http://schemas.microsoft.com/office/powerpoint/2010/main" val="3252497737"/>
+      </p:ext>
+    </p:extLst>
+  </p:cSld>
+  <p:clrMapOvr>
+    <a:masterClrMapping/>
+  </p:clrMapOvr>
+</p:notes>
+</file>
+
+<file path=ppt/notesSlides/notesSlide7.xml><?xml version="1.0" encoding="utf-8"?>
+<p:notes xmlns:a="http://schemas.openxmlformats.org/drawingml/2006/main" xmlns:r="http://schemas.openxmlformats.org/officeDocument/2006/relationships" xmlns:p="http://schemas.openxmlformats.org/presentationml/2006/main">
+  <p:cSld>
+    <p:spTree>
+      <p:nvGrpSpPr>
+        <p:cNvPr id="1" name=""/>
+        <p:cNvGrpSpPr/>
+        <p:nvPr/>
+      </p:nvGrpSpPr>
+      <p:grpSpPr>
+        <a:xfrm>
+          <a:off x="0" y="0"/>
+          <a:ext cx="0" cy="0"/>
+          <a:chOff x="0" y="0"/>
+          <a:chExt cx="0" cy="0"/>
+        </a:xfrm>
+      </p:grpSpPr>
+      <p:sp>
+        <p:nvSpPr>
+          <p:cNvPr id="2" name="Slide Image Placeholder 1"/>
+          <p:cNvSpPr>
+            <a:spLocks noGrp="1" noRot="1" noChangeAspect="1"/>
+          </p:cNvSpPr>
+          <p:nvPr>
+            <p:ph type="sldImg"/>
+          </p:nvPr>
+        </p:nvSpPr>
+        <p:spPr/>
+      </p:sp>
+      <p:sp>
+        <p:nvSpPr>
+          <p:cNvPr id="3" name="Notes Placeholder 2"/>
+          <p:cNvSpPr>
+            <a:spLocks noGrp="1"/>
+          </p:cNvSpPr>
+          <p:nvPr>
+            <p:ph type="body" idx="1"/>
+          </p:nvPr>
+        </p:nvSpPr>
+        <p:spPr/>
+        <p:txBody>
+          <a:bodyPr/>
+          <a:lstStyle/>
+          <a:p>
+            <a:endParaRPr lang="en-US" dirty="0"/>
+          </a:p>
+        </p:txBody>
+      </p:sp>
+      <p:sp>
+        <p:nvSpPr>
+          <p:cNvPr id="4" name="Slide Number Placeholder 3"/>
+          <p:cNvSpPr>
+            <a:spLocks noGrp="1"/>
+          </p:cNvSpPr>
+          <p:nvPr>
+            <p:ph type="sldNum" sz="quarter" idx="5"/>
+          </p:nvPr>
+        </p:nvSpPr>
+        <p:spPr/>
+        <p:txBody>
+          <a:bodyPr/>
+          <a:lstStyle/>
+          <a:p>
+            <a:fld id="{D06C7275-F3C5-4EE7-8C54-771BE2CF8BB4}" type="slidenum">
+              <a:rPr lang="en-US" smtClean="0"/>
+              <a:t>11</a:t>
+            </a:fld>
+            <a:endParaRPr lang="en-US"/>
+          </a:p>
+        </p:txBody>
+      </p:sp>
+    </p:spTree>
+    <p:extLst>
+      <p:ext uri="{BB962C8B-B14F-4D97-AF65-F5344CB8AC3E}">
+        <p14:creationId xmlns:p14="http://schemas.microsoft.com/office/powerpoint/2010/main" val="191245900"/>
+      </p:ext>
+    </p:extLst>
+  </p:cSld>
+  <p:clrMapOvr>
+    <a:masterClrMapping/>
+  </p:clrMapOvr>
+</p:notes>
+</file>
+
+<file path=ppt/notesSlides/notesSlide8.xml><?xml version="1.0" encoding="utf-8"?>
+<p:notes xmlns:a="http://schemas.openxmlformats.org/drawingml/2006/main" xmlns:r="http://schemas.openxmlformats.org/officeDocument/2006/relationships" xmlns:p="http://schemas.openxmlformats.org/presentationml/2006/main">
+  <p:cSld>
+    <p:spTree>
+      <p:nvGrpSpPr>
+        <p:cNvPr id="1" name=""/>
+        <p:cNvGrpSpPr/>
+        <p:nvPr/>
+      </p:nvGrpSpPr>
+      <p:grpSpPr>
+        <a:xfrm>
+          <a:off x="0" y="0"/>
+          <a:ext cx="0" cy="0"/>
+          <a:chOff x="0" y="0"/>
+          <a:chExt cx="0" cy="0"/>
+        </a:xfrm>
+      </p:grpSpPr>
+      <p:sp>
+        <p:nvSpPr>
+          <p:cNvPr id="2" name="Slide Image Placeholder 1"/>
+          <p:cNvSpPr>
+            <a:spLocks noGrp="1" noRot="1" noChangeAspect="1"/>
+          </p:cNvSpPr>
+          <p:nvPr>
+            <p:ph type="sldImg"/>
+          </p:nvPr>
+        </p:nvSpPr>
+        <p:spPr/>
+      </p:sp>
+      <p:sp>
+        <p:nvSpPr>
+          <p:cNvPr id="3" name="Notes Placeholder 2"/>
+          <p:cNvSpPr>
+            <a:spLocks noGrp="1"/>
+          </p:cNvSpPr>
+          <p:nvPr>
+            <p:ph type="body" idx="1"/>
+          </p:nvPr>
+        </p:nvSpPr>
+        <p:spPr/>
+        <p:txBody>
+          <a:bodyPr/>
+          <a:lstStyle/>
+          <a:p>
+            <a:pPr marL="0" marR="0" lvl="0" indent="0" algn="l" defTabSz="914400" rtl="0" eaLnBrk="1" fontAlgn="auto" latinLnBrk="0" hangingPunct="1">
+              <a:lnSpc>
+                <a:spcPct val="100000"/>
+              </a:lnSpc>
+              <a:spcBef>
+                <a:spcPts val="0"/>
+              </a:spcBef>
+              <a:spcAft>
+                <a:spcPts val="0"/>
+              </a:spcAft>
+              <a:buClrTx/>
+              <a:buSzTx/>
+              <a:buFontTx/>
+              <a:buNone/>
+              <a:tabLst/>
+              <a:defRPr/>
+            </a:pPr>
+            <a:r>
+              <a:rPr lang="en-US" dirty="0"/>
+              <a:t>Finding out why a test failed is a lot easier (pictures, videos, DOM snapshot)</a:t>
+            </a:r>
+          </a:p>
+          <a:p>
+            <a:endParaRPr lang="en-US" dirty="0"/>
+          </a:p>
+        </p:txBody>
+      </p:sp>
+      <p:sp>
+        <p:nvSpPr>
+          <p:cNvPr id="4" name="Slide Number Placeholder 3"/>
+          <p:cNvSpPr>
+            <a:spLocks noGrp="1"/>
+          </p:cNvSpPr>
+          <p:nvPr>
+            <p:ph type="sldNum" sz="quarter" idx="5"/>
+          </p:nvPr>
+        </p:nvSpPr>
+        <p:spPr/>
+        <p:txBody>
+          <a:bodyPr/>
+          <a:lstStyle/>
+          <a:p>
+            <a:fld id="{D06C7275-F3C5-4EE7-8C54-771BE2CF8BB4}" type="slidenum">
+              <a:rPr lang="en-US" smtClean="0"/>
+              <a:t>13</a:t>
+            </a:fld>
+            <a:endParaRPr lang="en-US"/>
+          </a:p>
+        </p:txBody>
+      </p:sp>
+    </p:spTree>
+    <p:extLst>
+      <p:ext uri="{BB962C8B-B14F-4D97-AF65-F5344CB8AC3E}">
+        <p14:creationId xmlns:p14="http://schemas.microsoft.com/office/powerpoint/2010/main" val="128138077"/>
+      </p:ext>
+    </p:extLst>
+  </p:cSld>
+  <p:clrMapOvr>
+    <a:masterClrMapping/>
+  </p:clrMapOvr>
+</p:notes>
+</file>
+
+<file path=ppt/notesSlides/notesSlide9.xml><?xml version="1.0" encoding="utf-8"?>
+<p:notes xmlns:a="http://schemas.openxmlformats.org/drawingml/2006/main" xmlns:r="http://schemas.openxmlformats.org/officeDocument/2006/relationships" xmlns:p="http://schemas.openxmlformats.org/presentationml/2006/main">
+  <p:cSld>
+    <p:spTree>
+      <p:nvGrpSpPr>
+        <p:cNvPr id="1" name=""/>
+        <p:cNvGrpSpPr/>
+        <p:nvPr/>
+      </p:nvGrpSpPr>
+      <p:grpSpPr>
+        <a:xfrm>
+          <a:off x="0" y="0"/>
+          <a:ext cx="0" cy="0"/>
+          <a:chOff x="0" y="0"/>
+          <a:chExt cx="0" cy="0"/>
+        </a:xfrm>
+      </p:grpSpPr>
+      <p:sp>
+        <p:nvSpPr>
+          <p:cNvPr id="2" name="Slide Image Placeholder 1"/>
+          <p:cNvSpPr>
+            <a:spLocks noGrp="1" noRot="1" noChangeAspect="1"/>
+          </p:cNvSpPr>
+          <p:nvPr>
+            <p:ph type="sldImg"/>
+          </p:nvPr>
+        </p:nvSpPr>
+        <p:spPr/>
+      </p:sp>
+      <p:sp>
+        <p:nvSpPr>
+          <p:cNvPr id="3" name="Notes Placeholder 2"/>
+          <p:cNvSpPr>
+            <a:spLocks noGrp="1"/>
+          </p:cNvSpPr>
+          <p:nvPr>
+            <p:ph type="body" idx="1"/>
+          </p:nvPr>
+        </p:nvSpPr>
+        <p:spPr/>
+        <p:txBody>
+          <a:bodyPr/>
+          <a:lstStyle/>
+          <a:p>
+            <a:pPr marL="0" marR="0" lvl="0" indent="0" algn="l" defTabSz="914400" rtl="0" eaLnBrk="1" fontAlgn="auto" latinLnBrk="0" hangingPunct="1">
+              <a:lnSpc>
+                <a:spcPct val="100000"/>
+              </a:lnSpc>
+              <a:spcBef>
+                <a:spcPts val="0"/>
+              </a:spcBef>
+              <a:spcAft>
+                <a:spcPts val="0"/>
+              </a:spcAft>
+              <a:buClrTx/>
+              <a:buSzTx/>
+              <a:buFontTx/>
+              <a:buNone/>
+              <a:tabLst/>
+              <a:defRPr/>
+            </a:pPr>
+            <a:r>
+              <a:rPr lang="en-US" dirty="0"/>
+              <a:t>Much easier to diagnose failures in CI</a:t>
+            </a:r>
+          </a:p>
+          <a:p>
+            <a:endParaRPr lang="en-US" dirty="0"/>
+          </a:p>
+        </p:txBody>
+      </p:sp>
+      <p:sp>
+        <p:nvSpPr>
+          <p:cNvPr id="4" name="Slide Number Placeholder 3"/>
+          <p:cNvSpPr>
+            <a:spLocks noGrp="1"/>
+          </p:cNvSpPr>
+          <p:nvPr>
+            <p:ph type="sldNum" sz="quarter" idx="5"/>
+          </p:nvPr>
+        </p:nvSpPr>
+        <p:spPr/>
+        <p:txBody>
+          <a:bodyPr/>
+          <a:lstStyle/>
+          <a:p>
+            <a:fld id="{D06C7275-F3C5-4EE7-8C54-771BE2CF8BB4}" type="slidenum">
+              <a:rPr lang="en-US" smtClean="0"/>
+              <a:t>14</a:t>
+            </a:fld>
+            <a:endParaRPr lang="en-US"/>
+          </a:p>
+        </p:txBody>
+      </p:sp>
+    </p:spTree>
+    <p:extLst>
+      <p:ext uri="{BB962C8B-B14F-4D97-AF65-F5344CB8AC3E}">
+        <p14:creationId xmlns:p14="http://schemas.microsoft.com/office/powerpoint/2010/main" val="2317088583"/>
       </p:ext>
     </p:extLst>
   </p:cSld>
@@ -3851,10 +4809,10 @@
       </p:grpSpPr>
       <p:sp>
         <p:nvSpPr>
-          <p:cNvPr id="4" name="Title 3">
+          <p:cNvPr id="2" name="Title 1">
             <a:extLst>
               <a:ext uri="{FF2B5EF4-FFF2-40B4-BE49-F238E27FC236}">
-                <a16:creationId xmlns:a16="http://schemas.microsoft.com/office/drawing/2014/main" id="{8F253787-B872-BB4E-BDA5-A814060D59DA}"/>
+                <a16:creationId xmlns:a16="http://schemas.microsoft.com/office/drawing/2014/main" id="{BB68DF0E-C183-4AE6-A001-5A6BFA6787BF}"/>
               </a:ext>
             </a:extLst>
           </p:cNvPr>
@@ -3867,22 +4825,25 @@
         </p:nvSpPr>
         <p:spPr/>
         <p:txBody>
-          <a:bodyPr/>
-          <a:lstStyle/>
-          <a:p>
-            <a:r>
-              <a:rPr lang="en-US" dirty="0"/>
-              <a:t>Project’s Selenium Test Suite</a:t>
-            </a:r>
-          </a:p>
-        </p:txBody>
-      </p:sp>
-      <p:sp>
-        <p:nvSpPr>
-          <p:cNvPr id="5" name="Text Placeholder 4">
+          <a:bodyPr>
+            <a:normAutofit/>
+          </a:bodyPr>
+          <a:lstStyle/>
+          <a:p>
+            <a:r>
+              <a:rPr lang="en-US" baseline="0" dirty="0"/>
+              <a:t>Why Write UI/E2E Tests</a:t>
+            </a:r>
+            <a:endParaRPr lang="en-US" dirty="0"/>
+          </a:p>
+        </p:txBody>
+      </p:sp>
+      <p:sp>
+        <p:nvSpPr>
+          <p:cNvPr id="3" name="Text Placeholder 2">
             <a:extLst>
               <a:ext uri="{FF2B5EF4-FFF2-40B4-BE49-F238E27FC236}">
-                <a16:creationId xmlns:a16="http://schemas.microsoft.com/office/drawing/2014/main" id="{B8F4FBC8-7525-9A41-B436-151A524A45D2}"/>
+                <a16:creationId xmlns:a16="http://schemas.microsoft.com/office/drawing/2014/main" id="{EA099495-3DDC-4597-86F3-962F18F58923}"/>
               </a:ext>
             </a:extLst>
           </p:cNvPr>
@@ -3895,53 +4856,26 @@
         </p:nvSpPr>
         <p:spPr/>
         <p:txBody>
-          <a:bodyPr/>
-          <a:lstStyle/>
-          <a:p>
+          <a:bodyPr>
+            <a:normAutofit/>
+          </a:bodyPr>
+          <a:lstStyle/>
+          <a:p>
+            <a:pPr marL="342900" indent="-342900">
+              <a:buFont typeface="Arial" panose="020B0604020202020204" pitchFamily="34" charset="0"/>
+              <a:buChar char="•"/>
+            </a:pPr>
             <a:r>
               <a:rPr lang="en-US" dirty="0"/>
-              <a:t>Tests were flaky</a:t>
-            </a:r>
-          </a:p>
-          <a:p>
-            <a:r>
-              <a:rPr lang="en-US" dirty="0"/>
-              <a:t>Tests were difficult to debug when they broke</a:t>
-            </a:r>
-          </a:p>
-          <a:p>
-            <a:r>
-              <a:rPr lang="en-US" dirty="0"/>
-              <a:t>Very difficult to discover what went wrong if failed in CI</a:t>
-            </a:r>
-          </a:p>
-          <a:p>
-            <a:r>
-              <a:rPr lang="en-US" dirty="0"/>
-              <a:t>Writing a new test took a fair amount of time</a:t>
-            </a:r>
-          </a:p>
-          <a:p>
-            <a:r>
-              <a:rPr lang="en-US" dirty="0"/>
-              <a:t>UI/E2E Test suite ran in about 18 minutes</a:t>
-            </a:r>
-          </a:p>
-          <a:p>
-            <a:r>
-              <a:rPr lang="en-US" dirty="0"/>
-              <a:t>Could use Port on machine to verify emailed information</a:t>
-            </a:r>
-          </a:p>
-          <a:p>
-            <a:endParaRPr lang="en-US" dirty="0"/>
+              <a:t>Legacy code</a:t>
+            </a:r>
           </a:p>
         </p:txBody>
       </p:sp>
     </p:spTree>
     <p:extLst>
       <p:ext uri="{BB962C8B-B14F-4D97-AF65-F5344CB8AC3E}">
-        <p14:creationId xmlns:p14="http://schemas.microsoft.com/office/powerpoint/2010/main" val="2846291696"/>
+        <p14:creationId xmlns:p14="http://schemas.microsoft.com/office/powerpoint/2010/main" val="1255213758"/>
       </p:ext>
     </p:extLst>
   </p:cSld>
@@ -3974,7 +4908,7 @@
           <p:cNvPr id="4" name="Title 3">
             <a:extLst>
               <a:ext uri="{FF2B5EF4-FFF2-40B4-BE49-F238E27FC236}">
-                <a16:creationId xmlns:a16="http://schemas.microsoft.com/office/drawing/2014/main" id="{8F253787-B872-BB4E-BDA5-A814060D59DA}"/>
+                <a16:creationId xmlns:a16="http://schemas.microsoft.com/office/drawing/2014/main" id="{4C5D81A8-73E3-4C14-847D-8361E3615B88}"/>
               </a:ext>
             </a:extLst>
           </p:cNvPr>
@@ -3992,65 +4926,7 @@
           <a:p>
             <a:r>
               <a:rPr lang="en-US" dirty="0"/>
-              <a:t>Project’s Cypress Test Suite</a:t>
-            </a:r>
-          </a:p>
-        </p:txBody>
-      </p:sp>
-      <p:sp>
-        <p:nvSpPr>
-          <p:cNvPr id="5" name="Text Placeholder 4">
-            <a:extLst>
-              <a:ext uri="{FF2B5EF4-FFF2-40B4-BE49-F238E27FC236}">
-                <a16:creationId xmlns:a16="http://schemas.microsoft.com/office/drawing/2014/main" id="{B8F4FBC8-7525-9A41-B436-151A524A45D2}"/>
-              </a:ext>
-            </a:extLst>
-          </p:cNvPr>
-          <p:cNvSpPr>
-            <a:spLocks noGrp="1"/>
-          </p:cNvSpPr>
-          <p:nvPr>
-            <p:ph type="body" idx="1"/>
-          </p:nvPr>
-        </p:nvSpPr>
-        <p:spPr/>
-        <p:txBody>
-          <a:bodyPr/>
-          <a:lstStyle/>
-          <a:p>
-            <a:r>
-              <a:rPr lang="en-US" dirty="0"/>
-              <a:t>Tests are a lot less flaky </a:t>
-            </a:r>
-          </a:p>
-          <a:p>
-            <a:r>
-              <a:rPr lang="en-US" dirty="0"/>
-              <a:t>Finding out why a test failed is a lot easier (pictures, videos, DOM snapshot)</a:t>
-            </a:r>
-          </a:p>
-          <a:p>
-            <a:r>
-              <a:rPr lang="en-US" dirty="0"/>
-              <a:t>Much easier to diagnose failures in CI</a:t>
-            </a:r>
-          </a:p>
-          <a:p>
-            <a:r>
-              <a:rPr lang="en-US" dirty="0"/>
-              <a:t>Writing new tests did not take as long</a:t>
-            </a:r>
-          </a:p>
-          <a:p>
-            <a:r>
-              <a:rPr lang="en-US" dirty="0"/>
-              <a:t>UI/E2E Test suite ran in about 10 minutes (vs ~18 for Selenium)</a:t>
-            </a:r>
-          </a:p>
-          <a:p>
-            <a:r>
-              <a:rPr lang="en-US" dirty="0"/>
-              <a:t>Could no longer use port to verify information sent over email</a:t>
+              <a:t>Selenium to Cypress in a project</a:t>
             </a:r>
           </a:p>
         </p:txBody>
@@ -4058,7 +4934,7 @@
     </p:spTree>
     <p:extLst>
       <p:ext uri="{BB962C8B-B14F-4D97-AF65-F5344CB8AC3E}">
-        <p14:creationId xmlns:p14="http://schemas.microsoft.com/office/powerpoint/2010/main" val="931449595"/>
+        <p14:creationId xmlns:p14="http://schemas.microsoft.com/office/powerpoint/2010/main" val="3634385763"/>
       </p:ext>
     </p:extLst>
   </p:cSld>
@@ -4091,7 +4967,7 @@
           <p:cNvPr id="2" name="Title 1">
             <a:extLst>
               <a:ext uri="{FF2B5EF4-FFF2-40B4-BE49-F238E27FC236}">
-                <a16:creationId xmlns:a16="http://schemas.microsoft.com/office/drawing/2014/main" id="{E2434B61-3C88-48E2-9F2A-D87C7F5DE3B1}"/>
+                <a16:creationId xmlns:a16="http://schemas.microsoft.com/office/drawing/2014/main" id="{F99E3A0A-C18F-D041-B6FC-DAD6BD99F7E7}"/>
               </a:ext>
             </a:extLst>
           </p:cNvPr>
@@ -4109,15 +4985,40 @@
           <a:p>
             <a:r>
               <a:rPr lang="en-US" dirty="0"/>
-              <a:t>Intro to Cypress</a:t>
-            </a:r>
+              <a:t>Flaky tests</a:t>
+            </a:r>
+          </a:p>
+        </p:txBody>
+      </p:sp>
+      <p:sp>
+        <p:nvSpPr>
+          <p:cNvPr id="3" name="Text Placeholder 2">
+            <a:extLst>
+              <a:ext uri="{FF2B5EF4-FFF2-40B4-BE49-F238E27FC236}">
+                <a16:creationId xmlns:a16="http://schemas.microsoft.com/office/drawing/2014/main" id="{B9880CAC-939A-4042-8982-669417138F8F}"/>
+              </a:ext>
+            </a:extLst>
+          </p:cNvPr>
+          <p:cNvSpPr>
+            <a:spLocks noGrp="1"/>
+          </p:cNvSpPr>
+          <p:nvPr>
+            <p:ph type="body" sz="quarter" idx="1"/>
+          </p:nvPr>
+        </p:nvSpPr>
+        <p:spPr/>
+        <p:txBody>
+          <a:bodyPr/>
+          <a:lstStyle/>
+          <a:p>
+            <a:endParaRPr lang="en-US"/>
           </a:p>
         </p:txBody>
       </p:sp>
     </p:spTree>
     <p:extLst>
       <p:ext uri="{BB962C8B-B14F-4D97-AF65-F5344CB8AC3E}">
-        <p14:creationId xmlns:p14="http://schemas.microsoft.com/office/powerpoint/2010/main" val="2794894354"/>
+        <p14:creationId xmlns:p14="http://schemas.microsoft.com/office/powerpoint/2010/main" val="1262461849"/>
       </p:ext>
     </p:extLst>
   </p:cSld>
@@ -4150,7 +5051,7 @@
           <p:cNvPr id="2" name="Title 1">
             <a:extLst>
               <a:ext uri="{FF2B5EF4-FFF2-40B4-BE49-F238E27FC236}">
-                <a16:creationId xmlns:a16="http://schemas.microsoft.com/office/drawing/2014/main" id="{4F41E0CD-F6EB-49C5-B95B-D275D1C03465}"/>
+                <a16:creationId xmlns:a16="http://schemas.microsoft.com/office/drawing/2014/main" id="{E930962F-8F69-6A43-8ED2-9D3E1571C9BC}"/>
               </a:ext>
             </a:extLst>
           </p:cNvPr>
@@ -4168,17 +5069,17 @@
           <a:p>
             <a:r>
               <a:rPr lang="en-US" dirty="0"/>
-              <a:t>Why not to use Cypress</a:t>
-            </a:r>
-          </a:p>
-        </p:txBody>
-      </p:sp>
-      <p:sp>
-        <p:nvSpPr>
-          <p:cNvPr id="4" name="Text Placeholder 3">
+              <a:t>Debugging</a:t>
+            </a:r>
+          </a:p>
+        </p:txBody>
+      </p:sp>
+      <p:sp>
+        <p:nvSpPr>
+          <p:cNvPr id="3" name="Text Placeholder 2">
             <a:extLst>
               <a:ext uri="{FF2B5EF4-FFF2-40B4-BE49-F238E27FC236}">
-                <a16:creationId xmlns:a16="http://schemas.microsoft.com/office/drawing/2014/main" id="{CDBF154A-3F70-4D8B-85AC-7B0E2F4B3B61}"/>
+                <a16:creationId xmlns:a16="http://schemas.microsoft.com/office/drawing/2014/main" id="{5FA32D4A-7323-4240-AA34-FC83ED86DFDB}"/>
               </a:ext>
             </a:extLst>
           </p:cNvPr>
@@ -4186,7 +5087,7 @@
             <a:spLocks noGrp="1"/>
           </p:cNvSpPr>
           <p:nvPr>
-            <p:ph type="body" idx="1"/>
+            <p:ph type="body" sz="quarter" idx="1"/>
           </p:nvPr>
         </p:nvSpPr>
         <p:spPr/>
@@ -4194,29 +5095,14 @@
           <a:bodyPr/>
           <a:lstStyle/>
           <a:p>
-            <a:r>
-              <a:rPr lang="en-US" dirty="0"/>
-              <a:t>Firefox, Safari, and Edge</a:t>
-            </a:r>
-          </a:p>
-          <a:p>
-            <a:r>
-              <a:rPr lang="en-US" dirty="0"/>
-              <a:t>Use non browser ports on the machine its running on</a:t>
-            </a:r>
-          </a:p>
-          <a:p>
-            <a:r>
-              <a:rPr lang="en-US" dirty="0"/>
-              <a:t>Has been out of beta less than 1 year</a:t>
-            </a:r>
+            <a:endParaRPr lang="en-US"/>
           </a:p>
         </p:txBody>
       </p:sp>
     </p:spTree>
     <p:extLst>
       <p:ext uri="{BB962C8B-B14F-4D97-AF65-F5344CB8AC3E}">
-        <p14:creationId xmlns:p14="http://schemas.microsoft.com/office/powerpoint/2010/main" val="2435944940"/>
+        <p14:creationId xmlns:p14="http://schemas.microsoft.com/office/powerpoint/2010/main" val="652158414"/>
       </p:ext>
     </p:extLst>
   </p:cSld>
@@ -4249,7 +5135,7 @@
           <p:cNvPr id="2" name="Title 1">
             <a:extLst>
               <a:ext uri="{FF2B5EF4-FFF2-40B4-BE49-F238E27FC236}">
-                <a16:creationId xmlns:a16="http://schemas.microsoft.com/office/drawing/2014/main" id="{2A104A68-77E3-4BBB-AE19-2C2FD5F373F7}"/>
+                <a16:creationId xmlns:a16="http://schemas.microsoft.com/office/drawing/2014/main" id="{36DC9EB4-F072-DE47-83CC-287A76496376}"/>
               </a:ext>
             </a:extLst>
           </p:cNvPr>
@@ -4262,22 +5148,45 @@
         </p:nvSpPr>
         <p:spPr/>
         <p:txBody>
-          <a:bodyPr>
-            <a:normAutofit fontScale="90000"/>
-          </a:bodyPr>
+          <a:bodyPr/>
           <a:lstStyle/>
           <a:p>
             <a:r>
               <a:rPr lang="en-US" dirty="0"/>
-              <a:t>Write some tests against code camp website</a:t>
-            </a:r>
+              <a:t>Failures in build pipeline</a:t>
+            </a:r>
+          </a:p>
+        </p:txBody>
+      </p:sp>
+      <p:sp>
+        <p:nvSpPr>
+          <p:cNvPr id="3" name="Text Placeholder 2">
+            <a:extLst>
+              <a:ext uri="{FF2B5EF4-FFF2-40B4-BE49-F238E27FC236}">
+                <a16:creationId xmlns:a16="http://schemas.microsoft.com/office/drawing/2014/main" id="{3C51A10E-3D09-F543-97B4-EAFE67087351}"/>
+              </a:ext>
+            </a:extLst>
+          </p:cNvPr>
+          <p:cNvSpPr>
+            <a:spLocks noGrp="1"/>
+          </p:cNvSpPr>
+          <p:nvPr>
+            <p:ph type="body" sz="quarter" idx="1"/>
+          </p:nvPr>
+        </p:nvSpPr>
+        <p:spPr/>
+        <p:txBody>
+          <a:bodyPr/>
+          <a:lstStyle/>
+          <a:p>
+            <a:endParaRPr lang="en-US"/>
           </a:p>
         </p:txBody>
       </p:sp>
     </p:spTree>
     <p:extLst>
       <p:ext uri="{BB962C8B-B14F-4D97-AF65-F5344CB8AC3E}">
-        <p14:creationId xmlns:p14="http://schemas.microsoft.com/office/powerpoint/2010/main" val="3676571930"/>
+        <p14:creationId xmlns:p14="http://schemas.microsoft.com/office/powerpoint/2010/main" val="2436278206"/>
       </p:ext>
     </p:extLst>
   </p:cSld>
@@ -4310,7 +5219,7 @@
           <p:cNvPr id="2" name="Title 1">
             <a:extLst>
               <a:ext uri="{FF2B5EF4-FFF2-40B4-BE49-F238E27FC236}">
-                <a16:creationId xmlns:a16="http://schemas.microsoft.com/office/drawing/2014/main" id="{76FEB4EF-B74A-4B1C-B2E6-C03667CEEB89}"/>
+                <a16:creationId xmlns:a16="http://schemas.microsoft.com/office/drawing/2014/main" id="{CE8DE3F4-14AA-904E-9BAE-D6174C683412}"/>
               </a:ext>
             </a:extLst>
           </p:cNvPr>
@@ -4328,15 +5237,40 @@
           <a:p>
             <a:r>
               <a:rPr lang="en-US" dirty="0"/>
-              <a:t>Write some tests against Connect Four</a:t>
-            </a:r>
+              <a:t>Test writing</a:t>
+            </a:r>
+          </a:p>
+        </p:txBody>
+      </p:sp>
+      <p:sp>
+        <p:nvSpPr>
+          <p:cNvPr id="3" name="Text Placeholder 2">
+            <a:extLst>
+              <a:ext uri="{FF2B5EF4-FFF2-40B4-BE49-F238E27FC236}">
+                <a16:creationId xmlns:a16="http://schemas.microsoft.com/office/drawing/2014/main" id="{6DB7F40C-88D3-EC48-98C2-87944EC7E426}"/>
+              </a:ext>
+            </a:extLst>
+          </p:cNvPr>
+          <p:cNvSpPr>
+            <a:spLocks noGrp="1"/>
+          </p:cNvSpPr>
+          <p:nvPr>
+            <p:ph type="body" sz="quarter" idx="1"/>
+          </p:nvPr>
+        </p:nvSpPr>
+        <p:spPr/>
+        <p:txBody>
+          <a:bodyPr/>
+          <a:lstStyle/>
+          <a:p>
+            <a:endParaRPr lang="en-US"/>
           </a:p>
         </p:txBody>
       </p:sp>
     </p:spTree>
     <p:extLst>
       <p:ext uri="{BB962C8B-B14F-4D97-AF65-F5344CB8AC3E}">
-        <p14:creationId xmlns:p14="http://schemas.microsoft.com/office/powerpoint/2010/main" val="2652840151"/>
+        <p14:creationId xmlns:p14="http://schemas.microsoft.com/office/powerpoint/2010/main" val="1967319234"/>
       </p:ext>
     </p:extLst>
   </p:cSld>
@@ -4369,7 +5303,7 @@
           <p:cNvPr id="2" name="Title 1">
             <a:extLst>
               <a:ext uri="{FF2B5EF4-FFF2-40B4-BE49-F238E27FC236}">
-                <a16:creationId xmlns:a16="http://schemas.microsoft.com/office/drawing/2014/main" id="{AB138742-26DD-4BE6-AC23-F01062826A85}"/>
+                <a16:creationId xmlns:a16="http://schemas.microsoft.com/office/drawing/2014/main" id="{CDD2969B-0E8B-3244-BF4A-54A46BFE27A7}"/>
               </a:ext>
             </a:extLst>
           </p:cNvPr>
@@ -4387,7 +5321,35 @@
           <a:p>
             <a:r>
               <a:rPr lang="en-US" dirty="0"/>
-              <a:t>Page Object Pattern</a:t>
+              <a:t>Time to execute</a:t>
+            </a:r>
+          </a:p>
+        </p:txBody>
+      </p:sp>
+      <p:sp>
+        <p:nvSpPr>
+          <p:cNvPr id="3" name="Text Placeholder 2">
+            <a:extLst>
+              <a:ext uri="{FF2B5EF4-FFF2-40B4-BE49-F238E27FC236}">
+                <a16:creationId xmlns:a16="http://schemas.microsoft.com/office/drawing/2014/main" id="{FEF92EFB-E3DF-E549-A8A4-D9D2F5CA4508}"/>
+              </a:ext>
+            </a:extLst>
+          </p:cNvPr>
+          <p:cNvSpPr>
+            <a:spLocks noGrp="1"/>
+          </p:cNvSpPr>
+          <p:nvPr>
+            <p:ph type="body" sz="quarter" idx="1"/>
+          </p:nvPr>
+        </p:nvSpPr>
+        <p:spPr/>
+        <p:txBody>
+          <a:bodyPr/>
+          <a:lstStyle/>
+          <a:p>
+            <a:r>
+              <a:rPr lang="en-US" dirty="0"/>
+              <a:t>18 -&gt; 10 minutes</a:t>
             </a:r>
           </a:p>
         </p:txBody>
@@ -4395,7 +5357,7 @@
     </p:spTree>
     <p:extLst>
       <p:ext uri="{BB962C8B-B14F-4D97-AF65-F5344CB8AC3E}">
-        <p14:creationId xmlns:p14="http://schemas.microsoft.com/office/powerpoint/2010/main" val="387887261"/>
+        <p14:creationId xmlns:p14="http://schemas.microsoft.com/office/powerpoint/2010/main" val="3946399119"/>
       </p:ext>
     </p:extLst>
   </p:cSld>
@@ -4428,7 +5390,7 @@
           <p:cNvPr id="2" name="Title 1">
             <a:extLst>
               <a:ext uri="{FF2B5EF4-FFF2-40B4-BE49-F238E27FC236}">
-                <a16:creationId xmlns:a16="http://schemas.microsoft.com/office/drawing/2014/main" id="{0D8488A7-2254-412D-B6DD-D2A9F291C999}"/>
+                <a16:creationId xmlns:a16="http://schemas.microsoft.com/office/drawing/2014/main" id="{5D5C735D-A334-1442-8162-16A9185674AF}"/>
               </a:ext>
             </a:extLst>
           </p:cNvPr>
@@ -4441,27 +5403,45 @@
         </p:nvSpPr>
         <p:spPr/>
         <p:txBody>
-          <a:bodyPr>
-            <a:normAutofit fontScale="90000"/>
-          </a:bodyPr>
+          <a:bodyPr/>
           <a:lstStyle/>
           <a:p>
             <a:r>
               <a:rPr lang="en-US" dirty="0"/>
-              <a:t>Whatever</a:t>
-            </a:r>
-            <a:r>
-              <a:rPr lang="en-US" baseline="0" dirty="0"/>
-              <a:t> you would manually test try and automate</a:t>
-            </a:r>
-            <a:endParaRPr lang="en-US" dirty="0"/>
+              <a:t>Access outside browser</a:t>
+            </a:r>
+          </a:p>
+        </p:txBody>
+      </p:sp>
+      <p:sp>
+        <p:nvSpPr>
+          <p:cNvPr id="3" name="Text Placeholder 2">
+            <a:extLst>
+              <a:ext uri="{FF2B5EF4-FFF2-40B4-BE49-F238E27FC236}">
+                <a16:creationId xmlns:a16="http://schemas.microsoft.com/office/drawing/2014/main" id="{FEBC7ED5-881A-0C40-9C45-EB5E06DA1943}"/>
+              </a:ext>
+            </a:extLst>
+          </p:cNvPr>
+          <p:cNvSpPr>
+            <a:spLocks noGrp="1"/>
+          </p:cNvSpPr>
+          <p:nvPr>
+            <p:ph type="body" sz="quarter" idx="1"/>
+          </p:nvPr>
+        </p:nvSpPr>
+        <p:spPr/>
+        <p:txBody>
+          <a:bodyPr/>
+          <a:lstStyle/>
+          <a:p>
+            <a:endParaRPr lang="en-US"/>
           </a:p>
         </p:txBody>
       </p:sp>
     </p:spTree>
     <p:extLst>
       <p:ext uri="{BB962C8B-B14F-4D97-AF65-F5344CB8AC3E}">
-        <p14:creationId xmlns:p14="http://schemas.microsoft.com/office/powerpoint/2010/main" val="1305281579"/>
+        <p14:creationId xmlns:p14="http://schemas.microsoft.com/office/powerpoint/2010/main" val="3913776274"/>
       </p:ext>
     </p:extLst>
   </p:cSld>
@@ -4494,7 +5474,7 @@
           <p:cNvPr id="2" name="Title 1">
             <a:extLst>
               <a:ext uri="{FF2B5EF4-FFF2-40B4-BE49-F238E27FC236}">
-                <a16:creationId xmlns:a16="http://schemas.microsoft.com/office/drawing/2014/main" id="{0D8488A7-2254-412D-B6DD-D2A9F291C999}"/>
+                <a16:creationId xmlns:a16="http://schemas.microsoft.com/office/drawing/2014/main" id="{E2434B61-3C88-48E2-9F2A-D87C7F5DE3B1}"/>
               </a:ext>
             </a:extLst>
           </p:cNvPr>
@@ -4507,14 +5487,12 @@
         </p:nvSpPr>
         <p:spPr/>
         <p:txBody>
-          <a:bodyPr>
-            <a:normAutofit fontScale="90000"/>
-          </a:bodyPr>
+          <a:bodyPr/>
           <a:lstStyle/>
           <a:p>
             <a:r>
               <a:rPr lang="en-US" dirty="0"/>
-              <a:t>Starting with a failing Acceptance Test focuses your code on value</a:t>
+              <a:t>Intro to Cypress</a:t>
             </a:r>
           </a:p>
         </p:txBody>
@@ -4522,7 +5500,7 @@
     </p:spTree>
     <p:extLst>
       <p:ext uri="{BB962C8B-B14F-4D97-AF65-F5344CB8AC3E}">
-        <p14:creationId xmlns:p14="http://schemas.microsoft.com/office/powerpoint/2010/main" val="2588592990"/>
+        <p14:creationId xmlns:p14="http://schemas.microsoft.com/office/powerpoint/2010/main" val="2794894354"/>
       </p:ext>
     </p:extLst>
   </p:cSld>
@@ -4552,10 +5530,10 @@
       </p:grpSpPr>
       <p:sp>
         <p:nvSpPr>
-          <p:cNvPr id="4" name="Title 3">
+          <p:cNvPr id="2" name="Title 1">
             <a:extLst>
               <a:ext uri="{FF2B5EF4-FFF2-40B4-BE49-F238E27FC236}">
-                <a16:creationId xmlns:a16="http://schemas.microsoft.com/office/drawing/2014/main" id="{BBBD5C05-DC4D-44CE-A7E4-8A907DAA3D0D}"/>
+                <a16:creationId xmlns:a16="http://schemas.microsoft.com/office/drawing/2014/main" id="{4F41E0CD-F6EB-49C5-B95B-D275D1C03465}"/>
               </a:ext>
             </a:extLst>
           </p:cNvPr>
@@ -4573,17 +5551,17 @@
           <a:p>
             <a:r>
               <a:rPr lang="en-US" dirty="0"/>
-              <a:t>Conclusions</a:t>
-            </a:r>
-          </a:p>
-        </p:txBody>
-      </p:sp>
-      <p:sp>
-        <p:nvSpPr>
-          <p:cNvPr id="5" name="Text Placeholder 4">
+              <a:t>Why not to use Cypress</a:t>
+            </a:r>
+          </a:p>
+        </p:txBody>
+      </p:sp>
+      <p:sp>
+        <p:nvSpPr>
+          <p:cNvPr id="4" name="Text Placeholder 3">
             <a:extLst>
               <a:ext uri="{FF2B5EF4-FFF2-40B4-BE49-F238E27FC236}">
-                <a16:creationId xmlns:a16="http://schemas.microsoft.com/office/drawing/2014/main" id="{39968A23-F06C-4E06-98FA-62FD58DB913E}"/>
+                <a16:creationId xmlns:a16="http://schemas.microsoft.com/office/drawing/2014/main" id="{CDBF154A-3F70-4D8B-85AC-7B0E2F4B3B61}"/>
               </a:ext>
             </a:extLst>
           </p:cNvPr>
@@ -4591,7 +5569,7 @@
             <a:spLocks noGrp="1"/>
           </p:cNvSpPr>
           <p:nvPr>
-            <p:ph type="body" sz="quarter" idx="1"/>
+            <p:ph type="body" idx="1"/>
           </p:nvPr>
         </p:nvSpPr>
         <p:spPr/>
@@ -4599,14 +5577,44 @@
           <a:bodyPr/>
           <a:lstStyle/>
           <a:p>
-            <a:endParaRPr lang="en-US"/>
+            <a:r>
+              <a:rPr lang="en-US" dirty="0"/>
+              <a:t>Firefox, Safari, and Edge</a:t>
+            </a:r>
+          </a:p>
+          <a:p>
+            <a:r>
+              <a:rPr lang="en-US" dirty="0"/>
+              <a:t>Access outside the browser</a:t>
+            </a:r>
+          </a:p>
+          <a:p>
+            <a:r>
+              <a:rPr lang="en-US" dirty="0"/>
+              <a:t>Has been out of beta less than 1 year</a:t>
+            </a:r>
+          </a:p>
+          <a:p>
+            <a:endParaRPr lang="en-US" dirty="0"/>
+          </a:p>
+          <a:p>
+            <a:endParaRPr lang="en-US" dirty="0"/>
+          </a:p>
+          <a:p>
+            <a:endParaRPr lang="en-US" dirty="0"/>
+          </a:p>
+          <a:p>
+            <a:r>
+              <a:rPr lang="en-US" dirty="0"/>
+              <a:t>MAKE THESE INDIVIDUAL SLIDES</a:t>
+            </a:r>
           </a:p>
         </p:txBody>
       </p:sp>
     </p:spTree>
     <p:extLst>
       <p:ext uri="{BB962C8B-B14F-4D97-AF65-F5344CB8AC3E}">
-        <p14:creationId xmlns:p14="http://schemas.microsoft.com/office/powerpoint/2010/main" val="3906384395"/>
+        <p14:creationId xmlns:p14="http://schemas.microsoft.com/office/powerpoint/2010/main" val="2435944940"/>
       </p:ext>
     </p:extLst>
   </p:cSld>
@@ -4733,6 +5741,657 @@
 </file>
 
 <file path=ppt/slides/slide20.xml><?xml version="1.0" encoding="utf-8"?>
+<p:sld xmlns:a="http://schemas.openxmlformats.org/drawingml/2006/main" xmlns:r="http://schemas.openxmlformats.org/officeDocument/2006/relationships" xmlns:p="http://schemas.openxmlformats.org/presentationml/2006/main">
+  <p:cSld>
+    <p:spTree>
+      <p:nvGrpSpPr>
+        <p:cNvPr id="1" name=""/>
+        <p:cNvGrpSpPr/>
+        <p:nvPr/>
+      </p:nvGrpSpPr>
+      <p:grpSpPr>
+        <a:xfrm>
+          <a:off x="0" y="0"/>
+          <a:ext cx="0" cy="0"/>
+          <a:chOff x="0" y="0"/>
+          <a:chExt cx="0" cy="0"/>
+        </a:xfrm>
+      </p:grpSpPr>
+      <p:sp>
+        <p:nvSpPr>
+          <p:cNvPr id="4" name="Title 3">
+            <a:extLst>
+              <a:ext uri="{FF2B5EF4-FFF2-40B4-BE49-F238E27FC236}">
+                <a16:creationId xmlns:a16="http://schemas.microsoft.com/office/drawing/2014/main" id="{1C750C0D-E4F7-0040-A862-A916AFD682BC}"/>
+              </a:ext>
+            </a:extLst>
+          </p:cNvPr>
+          <p:cNvSpPr>
+            <a:spLocks noGrp="1"/>
+          </p:cNvSpPr>
+          <p:nvPr>
+            <p:ph type="title"/>
+          </p:nvPr>
+        </p:nvSpPr>
+        <p:spPr/>
+        <p:txBody>
+          <a:bodyPr/>
+          <a:lstStyle/>
+          <a:p>
+            <a:r>
+              <a:rPr lang="en-US" dirty="0"/>
+              <a:t>Cypress Demo	</a:t>
+            </a:r>
+          </a:p>
+        </p:txBody>
+      </p:sp>
+      <p:sp>
+        <p:nvSpPr>
+          <p:cNvPr id="5" name="Text Placeholder 4">
+            <a:extLst>
+              <a:ext uri="{FF2B5EF4-FFF2-40B4-BE49-F238E27FC236}">
+                <a16:creationId xmlns:a16="http://schemas.microsoft.com/office/drawing/2014/main" id="{15197F41-F473-0F4A-A81D-5F91612D18E5}"/>
+              </a:ext>
+            </a:extLst>
+          </p:cNvPr>
+          <p:cNvSpPr>
+            <a:spLocks noGrp="1"/>
+          </p:cNvSpPr>
+          <p:nvPr>
+            <p:ph type="body" sz="quarter" idx="1"/>
+          </p:nvPr>
+        </p:nvSpPr>
+        <p:spPr/>
+        <p:txBody>
+          <a:bodyPr/>
+          <a:lstStyle/>
+          <a:p>
+            <a:r>
+              <a:rPr lang="en-US" dirty="0"/>
+              <a:t>Atlanta Code Camp 2019 Website</a:t>
+            </a:r>
+          </a:p>
+        </p:txBody>
+      </p:sp>
+    </p:spTree>
+    <p:extLst>
+      <p:ext uri="{BB962C8B-B14F-4D97-AF65-F5344CB8AC3E}">
+        <p14:creationId xmlns:p14="http://schemas.microsoft.com/office/powerpoint/2010/main" val="2574845375"/>
+      </p:ext>
+    </p:extLst>
+  </p:cSld>
+  <p:clrMapOvr>
+    <a:masterClrMapping/>
+  </p:clrMapOvr>
+  <p:transition spd="med"/>
+</p:sld>
+</file>
+
+<file path=ppt/slides/slide21.xml><?xml version="1.0" encoding="utf-8"?>
+<p:sld xmlns:a="http://schemas.openxmlformats.org/drawingml/2006/main" xmlns:r="http://schemas.openxmlformats.org/officeDocument/2006/relationships" xmlns:p="http://schemas.openxmlformats.org/presentationml/2006/main">
+  <p:cSld>
+    <p:spTree>
+      <p:nvGrpSpPr>
+        <p:cNvPr id="1" name=""/>
+        <p:cNvGrpSpPr/>
+        <p:nvPr/>
+      </p:nvGrpSpPr>
+      <p:grpSpPr>
+        <a:xfrm>
+          <a:off x="0" y="0"/>
+          <a:ext cx="0" cy="0"/>
+          <a:chOff x="0" y="0"/>
+          <a:chExt cx="0" cy="0"/>
+        </a:xfrm>
+      </p:grpSpPr>
+      <p:sp>
+        <p:nvSpPr>
+          <p:cNvPr id="4" name="Title 3">
+            <a:extLst>
+              <a:ext uri="{FF2B5EF4-FFF2-40B4-BE49-F238E27FC236}">
+                <a16:creationId xmlns:a16="http://schemas.microsoft.com/office/drawing/2014/main" id="{1C750C0D-E4F7-0040-A862-A916AFD682BC}"/>
+              </a:ext>
+            </a:extLst>
+          </p:cNvPr>
+          <p:cNvSpPr>
+            <a:spLocks noGrp="1"/>
+          </p:cNvSpPr>
+          <p:nvPr>
+            <p:ph type="title"/>
+          </p:nvPr>
+        </p:nvSpPr>
+        <p:spPr/>
+        <p:txBody>
+          <a:bodyPr/>
+          <a:lstStyle/>
+          <a:p>
+            <a:r>
+              <a:rPr lang="en-US" dirty="0"/>
+              <a:t>Cypress Demo	</a:t>
+            </a:r>
+          </a:p>
+        </p:txBody>
+      </p:sp>
+      <p:sp>
+        <p:nvSpPr>
+          <p:cNvPr id="5" name="Text Placeholder 4">
+            <a:extLst>
+              <a:ext uri="{FF2B5EF4-FFF2-40B4-BE49-F238E27FC236}">
+                <a16:creationId xmlns:a16="http://schemas.microsoft.com/office/drawing/2014/main" id="{15197F41-F473-0F4A-A81D-5F91612D18E5}"/>
+              </a:ext>
+            </a:extLst>
+          </p:cNvPr>
+          <p:cNvSpPr>
+            <a:spLocks noGrp="1"/>
+          </p:cNvSpPr>
+          <p:nvPr>
+            <p:ph type="body" sz="quarter" idx="1"/>
+          </p:nvPr>
+        </p:nvSpPr>
+        <p:spPr/>
+        <p:txBody>
+          <a:bodyPr/>
+          <a:lstStyle/>
+          <a:p>
+            <a:r>
+              <a:rPr lang="en-US" dirty="0"/>
+              <a:t>Connect Four</a:t>
+            </a:r>
+          </a:p>
+        </p:txBody>
+      </p:sp>
+    </p:spTree>
+    <p:extLst>
+      <p:ext uri="{BB962C8B-B14F-4D97-AF65-F5344CB8AC3E}">
+        <p14:creationId xmlns:p14="http://schemas.microsoft.com/office/powerpoint/2010/main" val="2028249475"/>
+      </p:ext>
+    </p:extLst>
+  </p:cSld>
+  <p:clrMapOvr>
+    <a:masterClrMapping/>
+  </p:clrMapOvr>
+  <p:transition spd="med"/>
+</p:sld>
+</file>
+
+<file path=ppt/slides/slide22.xml><?xml version="1.0" encoding="utf-8"?>
+<p:sld xmlns:a="http://schemas.openxmlformats.org/drawingml/2006/main" xmlns:r="http://schemas.openxmlformats.org/officeDocument/2006/relationships" xmlns:p="http://schemas.openxmlformats.org/presentationml/2006/main">
+  <p:cSld>
+    <p:spTree>
+      <p:nvGrpSpPr>
+        <p:cNvPr id="1" name=""/>
+        <p:cNvGrpSpPr/>
+        <p:nvPr/>
+      </p:nvGrpSpPr>
+      <p:grpSpPr>
+        <a:xfrm>
+          <a:off x="0" y="0"/>
+          <a:ext cx="0" cy="0"/>
+          <a:chOff x="0" y="0"/>
+          <a:chExt cx="0" cy="0"/>
+        </a:xfrm>
+      </p:grpSpPr>
+      <p:sp>
+        <p:nvSpPr>
+          <p:cNvPr id="2" name="Title 1">
+            <a:extLst>
+              <a:ext uri="{FF2B5EF4-FFF2-40B4-BE49-F238E27FC236}">
+                <a16:creationId xmlns:a16="http://schemas.microsoft.com/office/drawing/2014/main" id="{AB138742-26DD-4BE6-AC23-F01062826A85}"/>
+              </a:ext>
+            </a:extLst>
+          </p:cNvPr>
+          <p:cNvSpPr>
+            <a:spLocks noGrp="1"/>
+          </p:cNvSpPr>
+          <p:nvPr>
+            <p:ph type="title"/>
+          </p:nvPr>
+        </p:nvSpPr>
+        <p:spPr/>
+        <p:txBody>
+          <a:bodyPr/>
+          <a:lstStyle/>
+          <a:p>
+            <a:r>
+              <a:rPr lang="en-US"/>
+              <a:t>Page Object Pattern</a:t>
+            </a:r>
+            <a:endParaRPr lang="en-US" dirty="0"/>
+          </a:p>
+        </p:txBody>
+      </p:sp>
+    </p:spTree>
+    <p:extLst>
+      <p:ext uri="{BB962C8B-B14F-4D97-AF65-F5344CB8AC3E}">
+        <p14:creationId xmlns:p14="http://schemas.microsoft.com/office/powerpoint/2010/main" val="387887261"/>
+      </p:ext>
+    </p:extLst>
+  </p:cSld>
+  <p:clrMapOvr>
+    <a:masterClrMapping/>
+  </p:clrMapOvr>
+  <p:transition spd="med"/>
+</p:sld>
+</file>
+
+<file path=ppt/slides/slide23.xml><?xml version="1.0" encoding="utf-8"?>
+<p:sld xmlns:a="http://schemas.openxmlformats.org/drawingml/2006/main" xmlns:r="http://schemas.openxmlformats.org/officeDocument/2006/relationships" xmlns:p="http://schemas.openxmlformats.org/presentationml/2006/main">
+  <p:cSld>
+    <p:spTree>
+      <p:nvGrpSpPr>
+        <p:cNvPr id="1" name=""/>
+        <p:cNvGrpSpPr/>
+        <p:nvPr/>
+      </p:nvGrpSpPr>
+      <p:grpSpPr>
+        <a:xfrm>
+          <a:off x="0" y="0"/>
+          <a:ext cx="0" cy="0"/>
+          <a:chOff x="0" y="0"/>
+          <a:chExt cx="0" cy="0"/>
+        </a:xfrm>
+      </p:grpSpPr>
+      <p:sp>
+        <p:nvSpPr>
+          <p:cNvPr id="4" name="Title 3">
+            <a:extLst>
+              <a:ext uri="{FF2B5EF4-FFF2-40B4-BE49-F238E27FC236}">
+                <a16:creationId xmlns:a16="http://schemas.microsoft.com/office/drawing/2014/main" id="{1C750C0D-E4F7-0040-A862-A916AFD682BC}"/>
+              </a:ext>
+            </a:extLst>
+          </p:cNvPr>
+          <p:cNvSpPr>
+            <a:spLocks noGrp="1"/>
+          </p:cNvSpPr>
+          <p:nvPr>
+            <p:ph type="title"/>
+          </p:nvPr>
+        </p:nvSpPr>
+        <p:spPr/>
+        <p:txBody>
+          <a:bodyPr/>
+          <a:lstStyle/>
+          <a:p>
+            <a:r>
+              <a:rPr lang="en-US" dirty="0"/>
+              <a:t>Cypress Demo	</a:t>
+            </a:r>
+          </a:p>
+        </p:txBody>
+      </p:sp>
+      <p:sp>
+        <p:nvSpPr>
+          <p:cNvPr id="5" name="Text Placeholder 4">
+            <a:extLst>
+              <a:ext uri="{FF2B5EF4-FFF2-40B4-BE49-F238E27FC236}">
+                <a16:creationId xmlns:a16="http://schemas.microsoft.com/office/drawing/2014/main" id="{15197F41-F473-0F4A-A81D-5F91612D18E5}"/>
+              </a:ext>
+            </a:extLst>
+          </p:cNvPr>
+          <p:cNvSpPr>
+            <a:spLocks noGrp="1"/>
+          </p:cNvSpPr>
+          <p:nvPr>
+            <p:ph type="body" sz="quarter" idx="1"/>
+          </p:nvPr>
+        </p:nvSpPr>
+        <p:spPr/>
+        <p:txBody>
+          <a:bodyPr/>
+          <a:lstStyle/>
+          <a:p>
+            <a:r>
+              <a:rPr lang="en-US" dirty="0"/>
+              <a:t>Connect Four with page objects</a:t>
+            </a:r>
+          </a:p>
+        </p:txBody>
+      </p:sp>
+    </p:spTree>
+    <p:extLst>
+      <p:ext uri="{BB962C8B-B14F-4D97-AF65-F5344CB8AC3E}">
+        <p14:creationId xmlns:p14="http://schemas.microsoft.com/office/powerpoint/2010/main" val="866417633"/>
+      </p:ext>
+    </p:extLst>
+  </p:cSld>
+  <p:clrMapOvr>
+    <a:masterClrMapping/>
+  </p:clrMapOvr>
+  <p:transition spd="med"/>
+</p:sld>
+</file>
+
+<file path=ppt/slides/slide24.xml><?xml version="1.0" encoding="utf-8"?>
+<p:sld xmlns:a="http://schemas.openxmlformats.org/drawingml/2006/main" xmlns:r="http://schemas.openxmlformats.org/officeDocument/2006/relationships" xmlns:p="http://schemas.openxmlformats.org/presentationml/2006/main">
+  <p:cSld>
+    <p:spTree>
+      <p:nvGrpSpPr>
+        <p:cNvPr id="1" name=""/>
+        <p:cNvGrpSpPr/>
+        <p:nvPr/>
+      </p:nvGrpSpPr>
+      <p:grpSpPr>
+        <a:xfrm>
+          <a:off x="0" y="0"/>
+          <a:ext cx="0" cy="0"/>
+          <a:chOff x="0" y="0"/>
+          <a:chExt cx="0" cy="0"/>
+        </a:xfrm>
+      </p:grpSpPr>
+      <p:sp>
+        <p:nvSpPr>
+          <p:cNvPr id="2" name="Title 1">
+            <a:extLst>
+              <a:ext uri="{FF2B5EF4-FFF2-40B4-BE49-F238E27FC236}">
+                <a16:creationId xmlns:a16="http://schemas.microsoft.com/office/drawing/2014/main" id="{0D8488A7-2254-412D-B6DD-D2A9F291C999}"/>
+              </a:ext>
+            </a:extLst>
+          </p:cNvPr>
+          <p:cNvSpPr>
+            <a:spLocks noGrp="1"/>
+          </p:cNvSpPr>
+          <p:nvPr>
+            <p:ph type="title"/>
+          </p:nvPr>
+        </p:nvSpPr>
+        <p:spPr/>
+        <p:txBody>
+          <a:bodyPr>
+            <a:normAutofit fontScale="90000"/>
+          </a:bodyPr>
+          <a:lstStyle/>
+          <a:p>
+            <a:r>
+              <a:rPr lang="en-US" dirty="0"/>
+              <a:t>Whatever</a:t>
+            </a:r>
+            <a:r>
+              <a:rPr lang="en-US" baseline="0" dirty="0"/>
+              <a:t> you would manually test try and automate</a:t>
+            </a:r>
+            <a:endParaRPr lang="en-US" dirty="0"/>
+          </a:p>
+        </p:txBody>
+      </p:sp>
+      <p:sp>
+        <p:nvSpPr>
+          <p:cNvPr id="4" name="Text Placeholder 3">
+            <a:extLst>
+              <a:ext uri="{FF2B5EF4-FFF2-40B4-BE49-F238E27FC236}">
+                <a16:creationId xmlns:a16="http://schemas.microsoft.com/office/drawing/2014/main" id="{A50A4FC9-F413-4148-B070-CDF1B569C232}"/>
+              </a:ext>
+            </a:extLst>
+          </p:cNvPr>
+          <p:cNvSpPr>
+            <a:spLocks noGrp="1"/>
+          </p:cNvSpPr>
+          <p:nvPr>
+            <p:ph type="body" sz="quarter" idx="1"/>
+          </p:nvPr>
+        </p:nvSpPr>
+        <p:spPr/>
+        <p:txBody>
+          <a:bodyPr/>
+          <a:lstStyle/>
+          <a:p>
+            <a:endParaRPr lang="en-US"/>
+          </a:p>
+        </p:txBody>
+      </p:sp>
+    </p:spTree>
+    <p:extLst>
+      <p:ext uri="{BB962C8B-B14F-4D97-AF65-F5344CB8AC3E}">
+        <p14:creationId xmlns:p14="http://schemas.microsoft.com/office/powerpoint/2010/main" val="1305281579"/>
+      </p:ext>
+    </p:extLst>
+  </p:cSld>
+  <p:clrMapOvr>
+    <a:masterClrMapping/>
+  </p:clrMapOvr>
+  <p:transition spd="med"/>
+</p:sld>
+</file>
+
+<file path=ppt/slides/slide25.xml><?xml version="1.0" encoding="utf-8"?>
+<p:sld xmlns:a="http://schemas.openxmlformats.org/drawingml/2006/main" xmlns:r="http://schemas.openxmlformats.org/officeDocument/2006/relationships" xmlns:p="http://schemas.openxmlformats.org/presentationml/2006/main">
+  <p:cSld>
+    <p:spTree>
+      <p:nvGrpSpPr>
+        <p:cNvPr id="1" name=""/>
+        <p:cNvGrpSpPr/>
+        <p:nvPr/>
+      </p:nvGrpSpPr>
+      <p:grpSpPr>
+        <a:xfrm>
+          <a:off x="0" y="0"/>
+          <a:ext cx="0" cy="0"/>
+          <a:chOff x="0" y="0"/>
+          <a:chExt cx="0" cy="0"/>
+        </a:xfrm>
+      </p:grpSpPr>
+      <p:sp>
+        <p:nvSpPr>
+          <p:cNvPr id="6" name="TextBox 5">
+            <a:extLst>
+              <a:ext uri="{FF2B5EF4-FFF2-40B4-BE49-F238E27FC236}">
+                <a16:creationId xmlns:a16="http://schemas.microsoft.com/office/drawing/2014/main" id="{4F72577C-69D8-4A20-8D34-854D8C9F70F1}"/>
+              </a:ext>
+            </a:extLst>
+          </p:cNvPr>
+          <p:cNvSpPr txBox="1"/>
+          <p:nvPr/>
+        </p:nvSpPr>
+        <p:spPr>
+          <a:xfrm>
+            <a:off x="156881" y="6394076"/>
+            <a:ext cx="5692590" cy="369330"/>
+          </a:xfrm>
+          <a:prstGeom prst="rect">
+            <a:avLst/>
+          </a:prstGeom>
+          <a:noFill/>
+          <a:ln w="12700" cap="flat">
+            <a:noFill/>
+            <a:miter lim="400000"/>
+          </a:ln>
+          <a:effectLst/>
+          <a:sp3d/>
+        </p:spPr>
+        <p:style>
+          <a:lnRef idx="0">
+            <a:scrgbClr r="0" g="0" b="0"/>
+          </a:lnRef>
+          <a:fillRef idx="0">
+            <a:scrgbClr r="0" g="0" b="0"/>
+          </a:fillRef>
+          <a:effectRef idx="0">
+            <a:scrgbClr r="0" g="0" b="0"/>
+          </a:effectRef>
+          <a:fontRef idx="none"/>
+        </p:style>
+        <p:txBody>
+          <a:bodyPr rot="0" spcFirstLastPara="1" vertOverflow="overflow" horzOverflow="overflow" vert="horz" wrap="square" lIns="45719" tIns="45719" rIns="45719" bIns="45719" numCol="1" spcCol="38100" rtlCol="0" anchor="t">
+            <a:spAutoFit/>
+          </a:bodyPr>
+          <a:lstStyle/>
+          <a:p>
+            <a:r>
+              <a:rPr lang="en-US" dirty="0"/>
+              <a:t>https://martinfowler.com/bliki/TestPyramid.html</a:t>
+            </a:r>
+            <a:endParaRPr kumimoji="0" lang="en-US" sz="1800" b="0" i="0" u="none" strike="noStrike" cap="none" spc="0" normalizeH="0" baseline="0" dirty="0">
+              <a:ln>
+                <a:noFill/>
+              </a:ln>
+              <a:solidFill>
+                <a:srgbClr val="000000"/>
+              </a:solidFill>
+              <a:effectLst/>
+              <a:uFillTx/>
+              <a:latin typeface="+mn-lt"/>
+              <a:ea typeface="+mn-ea"/>
+              <a:cs typeface="+mn-cs"/>
+              <a:sym typeface="Calibri"/>
+            </a:endParaRPr>
+          </a:p>
+        </p:txBody>
+      </p:sp>
+      <p:pic>
+        <p:nvPicPr>
+          <p:cNvPr id="13" name="Picture 12">
+            <a:extLst>
+              <a:ext uri="{FF2B5EF4-FFF2-40B4-BE49-F238E27FC236}">
+                <a16:creationId xmlns:a16="http://schemas.microsoft.com/office/drawing/2014/main" id="{FF298ACB-AC98-40B8-AAC6-766657FCC977}"/>
+              </a:ext>
+            </a:extLst>
+          </p:cNvPr>
+          <p:cNvPicPr>
+            <a:picLocks noChangeAspect="1"/>
+          </p:cNvPicPr>
+          <p:nvPr/>
+        </p:nvPicPr>
+        <p:blipFill>
+          <a:blip r:embed="rId3">
+            <a:extLst>
+              <a:ext uri="{28A0092B-C50C-407E-A947-70E740481C1C}">
+                <a14:useLocalDpi xmlns:a14="http://schemas.microsoft.com/office/drawing/2010/main" val="0"/>
+              </a:ext>
+            </a:extLst>
+          </a:blip>
+          <a:stretch>
+            <a:fillRect/>
+          </a:stretch>
+        </p:blipFill>
+        <p:spPr>
+          <a:xfrm>
+            <a:off x="1093766" y="182014"/>
+            <a:ext cx="10004467" cy="5511347"/>
+          </a:xfrm>
+          <a:prstGeom prst="rect">
+            <a:avLst/>
+          </a:prstGeom>
+        </p:spPr>
+      </p:pic>
+    </p:spTree>
+    <p:extLst>
+      <p:ext uri="{BB962C8B-B14F-4D97-AF65-F5344CB8AC3E}">
+        <p14:creationId xmlns:p14="http://schemas.microsoft.com/office/powerpoint/2010/main" val="4249708715"/>
+      </p:ext>
+    </p:extLst>
+  </p:cSld>
+  <p:clrMapOvr>
+    <a:masterClrMapping/>
+  </p:clrMapOvr>
+  <mc:AlternateContent xmlns:mc="http://schemas.openxmlformats.org/markup-compatibility/2006" xmlns:p14="http://schemas.microsoft.com/office/powerpoint/2010/main">
+    <mc:Choice Requires="p14">
+      <p:transition p14:dur="0"/>
+    </mc:Choice>
+    <mc:Fallback xmlns="">
+      <p:transition/>
+    </mc:Fallback>
+  </mc:AlternateContent>
+</p:sld>
+</file>
+
+<file path=ppt/slides/slide26.xml><?xml version="1.0" encoding="utf-8"?>
+<p:sld xmlns:a="http://schemas.openxmlformats.org/drawingml/2006/main" xmlns:r="http://schemas.openxmlformats.org/officeDocument/2006/relationships" xmlns:p="http://schemas.openxmlformats.org/presentationml/2006/main">
+  <p:cSld>
+    <p:spTree>
+      <p:nvGrpSpPr>
+        <p:cNvPr id="1" name=""/>
+        <p:cNvGrpSpPr/>
+        <p:nvPr/>
+      </p:nvGrpSpPr>
+      <p:grpSpPr>
+        <a:xfrm>
+          <a:off x="0" y="0"/>
+          <a:ext cx="0" cy="0"/>
+          <a:chOff x="0" y="0"/>
+          <a:chExt cx="0" cy="0"/>
+        </a:xfrm>
+      </p:grpSpPr>
+      <p:pic>
+        <p:nvPicPr>
+          <p:cNvPr id="2" name="Picture 1">
+            <a:extLst>
+              <a:ext uri="{FF2B5EF4-FFF2-40B4-BE49-F238E27FC236}">
+                <a16:creationId xmlns:a16="http://schemas.microsoft.com/office/drawing/2014/main" id="{D550273C-71F7-6F41-BE71-E65DC547A9B5}"/>
+              </a:ext>
+            </a:extLst>
+          </p:cNvPr>
+          <p:cNvPicPr>
+            <a:picLocks noChangeAspect="1"/>
+          </p:cNvPicPr>
+          <p:nvPr/>
+        </p:nvPicPr>
+        <p:blipFill>
+          <a:blip r:embed="rId3"/>
+          <a:stretch>
+            <a:fillRect/>
+          </a:stretch>
+        </p:blipFill>
+        <p:spPr>
+          <a:xfrm>
+            <a:off x="990972" y="669366"/>
+            <a:ext cx="3136900" cy="4013200"/>
+          </a:xfrm>
+          <a:prstGeom prst="rect">
+            <a:avLst/>
+          </a:prstGeom>
+        </p:spPr>
+      </p:pic>
+      <p:pic>
+        <p:nvPicPr>
+          <p:cNvPr id="4" name="Picture 3">
+            <a:extLst>
+              <a:ext uri="{FF2B5EF4-FFF2-40B4-BE49-F238E27FC236}">
+                <a16:creationId xmlns:a16="http://schemas.microsoft.com/office/drawing/2014/main" id="{B48F3991-9C88-F64C-B269-8702924E923E}"/>
+              </a:ext>
+            </a:extLst>
+          </p:cNvPr>
+          <p:cNvPicPr>
+            <a:picLocks noChangeAspect="1"/>
+          </p:cNvPicPr>
+          <p:nvPr/>
+        </p:nvPicPr>
+        <p:blipFill>
+          <a:blip r:embed="rId4"/>
+          <a:stretch>
+            <a:fillRect/>
+          </a:stretch>
+        </p:blipFill>
+        <p:spPr>
+          <a:xfrm>
+            <a:off x="5081494" y="669366"/>
+            <a:ext cx="3127766" cy="4013200"/>
+          </a:xfrm>
+          <a:prstGeom prst="rect">
+            <a:avLst/>
+          </a:prstGeom>
+        </p:spPr>
+      </p:pic>
+    </p:spTree>
+    <p:extLst>
+      <p:ext uri="{BB962C8B-B14F-4D97-AF65-F5344CB8AC3E}">
+        <p14:creationId xmlns:p14="http://schemas.microsoft.com/office/powerpoint/2010/main" val="183060678"/>
+      </p:ext>
+    </p:extLst>
+  </p:cSld>
+  <p:clrMapOvr>
+    <a:masterClrMapping/>
+  </p:clrMapOvr>
+  <mc:AlternateContent xmlns:mc="http://schemas.openxmlformats.org/markup-compatibility/2006" xmlns:p14="http://schemas.microsoft.com/office/powerpoint/2010/main">
+    <mc:Choice Requires="p14">
+      <p:transition p14:dur="0"/>
+    </mc:Choice>
+    <mc:Fallback xmlns="">
+      <p:transition/>
+    </mc:Fallback>
+  </mc:AlternateContent>
+</p:sld>
+</file>
+
+<file path=ppt/slides/slide27.xml><?xml version="1.0" encoding="utf-8"?>
 <p:sld xmlns:a="http://schemas.openxmlformats.org/drawingml/2006/main" xmlns:r="http://schemas.openxmlformats.org/officeDocument/2006/relationships" xmlns:p="http://schemas.openxmlformats.org/presentationml/2006/main">
   <p:cSld>
     <p:spTree>
@@ -5725,16 +7384,13 @@
           </a:bodyPr>
           <a:lstStyle/>
           <a:p>
-            <a:endParaRPr lang="en-US" dirty="0"/>
-          </a:p>
-          <a:p>
             <a:pPr marL="342900" indent="-342900">
               <a:buFont typeface="Arial" panose="020B0604020202020204" pitchFamily="34" charset="0"/>
               <a:buChar char="•"/>
             </a:pPr>
             <a:r>
               <a:rPr lang="en-US" dirty="0"/>
-              <a:t>Exercise your code in a live or live like environment</a:t>
+              <a:t>Verify that the critical path works</a:t>
             </a:r>
           </a:p>
           <a:p>
@@ -5744,58 +7400,14 @@
             </a:pPr>
             <a:r>
               <a:rPr lang="en-US" dirty="0"/>
-              <a:t>Verify that all components are connected correctly</a:t>
-            </a:r>
-          </a:p>
-          <a:p>
-            <a:pPr marL="342900" indent="-342900">
-              <a:buFont typeface="Arial" panose="020B0604020202020204" pitchFamily="34" charset="0"/>
-              <a:buChar char="•"/>
+              <a:t>Exercise your code in a live or live like environment</a:t>
+            </a:r>
+          </a:p>
+          <a:p>
+            <a:pPr marL="0" indent="0">
+              <a:buNone/>
             </a:pPr>
-            <a:r>
-              <a:rPr lang="en-US" dirty="0"/>
-              <a:t>Human Readable</a:t>
-            </a:r>
-          </a:p>
-          <a:p>
-            <a:pPr marL="342900" indent="-342900">
-              <a:buFont typeface="Arial" panose="020B0604020202020204" pitchFamily="34" charset="0"/>
-              <a:buChar char="•"/>
-            </a:pPr>
-            <a:r>
-              <a:rPr lang="en-US" dirty="0"/>
-              <a:t>Behavior Driven Development (Dev/Product/Test)</a:t>
-            </a:r>
-          </a:p>
-          <a:p>
-            <a:pPr marL="342900" indent="-342900">
-              <a:buFont typeface="Arial" panose="020B0604020202020204" pitchFamily="34" charset="0"/>
-              <a:buChar char="•"/>
-            </a:pPr>
-            <a:r>
-              <a:rPr lang="en-US" dirty="0"/>
-              <a:t>Acceptance Test</a:t>
-            </a:r>
-          </a:p>
-          <a:p>
-            <a:pPr marL="342900" indent="-342900">
-              <a:buFont typeface="Arial" panose="020B0604020202020204" pitchFamily="34" charset="0"/>
-              <a:buChar char="•"/>
-            </a:pPr>
-            <a:r>
-              <a:rPr lang="en-US" dirty="0"/>
-              <a:t>Signifies completion of a feature</a:t>
-            </a:r>
-          </a:p>
-          <a:p>
-            <a:pPr marL="342900" indent="-342900">
-              <a:buFont typeface="Arial" panose="020B0604020202020204" pitchFamily="34" charset="0"/>
-              <a:buChar char="•"/>
-            </a:pPr>
-            <a:r>
-              <a:rPr lang="en-US" dirty="0"/>
-              <a:t>Legacy code</a:t>
-            </a:r>
+            <a:endParaRPr lang="en-US" dirty="0"/>
           </a:p>
         </p:txBody>
       </p:sp>
@@ -5832,10 +7444,10 @@
       </p:grpSpPr>
       <p:sp>
         <p:nvSpPr>
-          <p:cNvPr id="4" name="Title 3">
+          <p:cNvPr id="2" name="Title 1">
             <a:extLst>
               <a:ext uri="{FF2B5EF4-FFF2-40B4-BE49-F238E27FC236}">
-                <a16:creationId xmlns:a16="http://schemas.microsoft.com/office/drawing/2014/main" id="{4C5D81A8-73E3-4C14-847D-8361E3615B88}"/>
+                <a16:creationId xmlns:a16="http://schemas.microsoft.com/office/drawing/2014/main" id="{BB68DF0E-C183-4AE6-A001-5A6BFA6787BF}"/>
               </a:ext>
             </a:extLst>
           </p:cNvPr>
@@ -5848,12 +7460,69 @@
         </p:nvSpPr>
         <p:spPr/>
         <p:txBody>
-          <a:bodyPr/>
-          <a:lstStyle/>
-          <a:p>
+          <a:bodyPr>
+            <a:normAutofit/>
+          </a:bodyPr>
+          <a:lstStyle/>
+          <a:p>
+            <a:r>
+              <a:rPr lang="en-US" baseline="0" dirty="0"/>
+              <a:t>Why Write UI/E2E Tests</a:t>
+            </a:r>
+            <a:endParaRPr lang="en-US" dirty="0"/>
+          </a:p>
+        </p:txBody>
+      </p:sp>
+      <p:sp>
+        <p:nvSpPr>
+          <p:cNvPr id="3" name="Text Placeholder 2">
+            <a:extLst>
+              <a:ext uri="{FF2B5EF4-FFF2-40B4-BE49-F238E27FC236}">
+                <a16:creationId xmlns:a16="http://schemas.microsoft.com/office/drawing/2014/main" id="{EA099495-3DDC-4597-86F3-962F18F58923}"/>
+              </a:ext>
+            </a:extLst>
+          </p:cNvPr>
+          <p:cNvSpPr>
+            <a:spLocks noGrp="1"/>
+          </p:cNvSpPr>
+          <p:nvPr>
+            <p:ph type="body" idx="1"/>
+          </p:nvPr>
+        </p:nvSpPr>
+        <p:spPr/>
+        <p:txBody>
+          <a:bodyPr>
+            <a:normAutofit/>
+          </a:bodyPr>
+          <a:lstStyle/>
+          <a:p>
+            <a:pPr marL="342900" indent="-342900">
+              <a:buFont typeface="Arial" panose="020B0604020202020204" pitchFamily="34" charset="0"/>
+              <a:buChar char="•"/>
+            </a:pPr>
             <a:r>
               <a:rPr lang="en-US" dirty="0"/>
-              <a:t>Selenium to Cypress in a project</a:t>
+              <a:t>Human Readable</a:t>
+            </a:r>
+          </a:p>
+          <a:p>
+            <a:pPr marL="342900" indent="-342900">
+              <a:buFont typeface="Arial" panose="020B0604020202020204" pitchFamily="34" charset="0"/>
+              <a:buChar char="•"/>
+            </a:pPr>
+            <a:r>
+              <a:rPr lang="en-US" dirty="0"/>
+              <a:t>Behavior Driven Development (Dev/Product/Test)</a:t>
+            </a:r>
+          </a:p>
+          <a:p>
+            <a:pPr marL="342900" indent="-342900">
+              <a:buFont typeface="Arial" panose="020B0604020202020204" pitchFamily="34" charset="0"/>
+              <a:buChar char="•"/>
+            </a:pPr>
+            <a:r>
+              <a:rPr lang="en-US" dirty="0"/>
+              <a:t>Executable specification</a:t>
             </a:r>
           </a:p>
         </p:txBody>
@@ -5861,7 +7530,7 @@
     </p:spTree>
     <p:extLst>
       <p:ext uri="{BB962C8B-B14F-4D97-AF65-F5344CB8AC3E}">
-        <p14:creationId xmlns:p14="http://schemas.microsoft.com/office/powerpoint/2010/main" val="3634385763"/>
+        <p14:creationId xmlns:p14="http://schemas.microsoft.com/office/powerpoint/2010/main" val="31665230"/>
       </p:ext>
     </p:extLst>
   </p:cSld>

</xml_diff>

<commit_message>
Refactored to use page object data-test
</commit_message>
<xml_diff>
--- a/And Now Seleniums Watch is Ended.pptx
+++ b/And Now Seleniums Watch is Ended.pptx
@@ -3438,7 +3438,7 @@
           </a:ln>
           <a:extLst>
             <a:ext uri="{C572A759-6A51-4108-AA02-DFA0A04FC94B}">
-              <ma14:wrappingTextBoxFlag xmlns="" xmlns:ma14="http://schemas.microsoft.com/office/mac/drawingml/2011/main" val="1"/>
+              <ma14:wrappingTextBoxFlag xmlns:ma14="http://schemas.microsoft.com/office/mac/drawingml/2011/main" xmlns="" val="1"/>
             </a:ext>
           </a:extLst>
         </p:spPr>
@@ -3477,7 +3477,7 @@
           </a:ln>
           <a:extLst>
             <a:ext uri="{C572A759-6A51-4108-AA02-DFA0A04FC94B}">
-              <ma14:wrappingTextBoxFlag xmlns="" xmlns:ma14="http://schemas.microsoft.com/office/mac/drawingml/2011/main" val="1"/>
+              <ma14:wrappingTextBoxFlag xmlns:ma14="http://schemas.microsoft.com/office/mac/drawingml/2011/main" xmlns="" val="1"/>
             </a:ext>
           </a:extLst>
         </p:spPr>
@@ -5574,39 +5574,26 @@
         </p:nvSpPr>
         <p:spPr/>
         <p:txBody>
-          <a:bodyPr/>
+          <a:bodyPr>
+            <a:normAutofit/>
+          </a:bodyPr>
           <a:lstStyle/>
           <a:p>
             <a:r>
-              <a:rPr lang="en-US" dirty="0"/>
+              <a:rPr lang="en-US" sz="3200" dirty="0"/>
               <a:t>Firefox, Safari, and Edge</a:t>
             </a:r>
           </a:p>
           <a:p>
             <a:r>
-              <a:rPr lang="en-US" dirty="0"/>
+              <a:rPr lang="en-US" sz="3200" dirty="0"/>
               <a:t>Access outside the browser</a:t>
             </a:r>
           </a:p>
           <a:p>
             <a:r>
-              <a:rPr lang="en-US" dirty="0"/>
+              <a:rPr lang="en-US" sz="3200" dirty="0"/>
               <a:t>Has been out of beta less than 1 year</a:t>
-            </a:r>
-          </a:p>
-          <a:p>
-            <a:endParaRPr lang="en-US" dirty="0"/>
-          </a:p>
-          <a:p>
-            <a:endParaRPr lang="en-US" dirty="0"/>
-          </a:p>
-          <a:p>
-            <a:endParaRPr lang="en-US" dirty="0"/>
-          </a:p>
-          <a:p>
-            <a:r>
-              <a:rPr lang="en-US" dirty="0"/>
-              <a:t>MAKE THESE INDIVIDUAL SLIDES</a:t>
             </a:r>
           </a:p>
         </p:txBody>
@@ -5622,6 +5609,186 @@
     <a:masterClrMapping/>
   </p:clrMapOvr>
   <p:transition spd="med"/>
+  <p:timing>
+    <p:tnLst>
+      <p:par>
+        <p:cTn id="1" dur="indefinite" restart="never" nodeType="tmRoot">
+          <p:childTnLst>
+            <p:seq concurrent="1" nextAc="seek">
+              <p:cTn id="2" dur="indefinite" nodeType="mainSeq">
+                <p:childTnLst>
+                  <p:par>
+                    <p:cTn id="3" fill="hold">
+                      <p:stCondLst>
+                        <p:cond delay="indefinite"/>
+                      </p:stCondLst>
+                      <p:childTnLst>
+                        <p:par>
+                          <p:cTn id="4" fill="hold">
+                            <p:stCondLst>
+                              <p:cond delay="0"/>
+                            </p:stCondLst>
+                            <p:childTnLst>
+                              <p:par>
+                                <p:cTn id="5" presetID="1" presetClass="entr" presetSubtype="0" fill="hold" grpId="0" nodeType="clickEffect">
+                                  <p:stCondLst>
+                                    <p:cond delay="0"/>
+                                  </p:stCondLst>
+                                  <p:childTnLst>
+                                    <p:set>
+                                      <p:cBhvr>
+                                        <p:cTn id="6" dur="1" fill="hold">
+                                          <p:stCondLst>
+                                            <p:cond delay="0"/>
+                                          </p:stCondLst>
+                                        </p:cTn>
+                                        <p:tgtEl>
+                                          <p:spTgt spid="4">
+                                            <p:txEl>
+                                              <p:pRg st="0" end="0"/>
+                                            </p:txEl>
+                                          </p:spTgt>
+                                        </p:tgtEl>
+                                        <p:attrNameLst>
+                                          <p:attrName>style.visibility</p:attrName>
+                                        </p:attrNameLst>
+                                      </p:cBhvr>
+                                      <p:to>
+                                        <p:strVal val="visible"/>
+                                      </p:to>
+                                    </p:set>
+                                  </p:childTnLst>
+                                </p:cTn>
+                              </p:par>
+                            </p:childTnLst>
+                          </p:cTn>
+                        </p:par>
+                      </p:childTnLst>
+                    </p:cTn>
+                  </p:par>
+                  <p:par>
+                    <p:cTn id="7" fill="hold">
+                      <p:stCondLst>
+                        <p:cond delay="indefinite"/>
+                      </p:stCondLst>
+                      <p:childTnLst>
+                        <p:par>
+                          <p:cTn id="8" fill="hold">
+                            <p:stCondLst>
+                              <p:cond delay="0"/>
+                            </p:stCondLst>
+                            <p:childTnLst>
+                              <p:par>
+                                <p:cTn id="9" presetID="1" presetClass="entr" presetSubtype="0" fill="hold" grpId="0" nodeType="clickEffect">
+                                  <p:stCondLst>
+                                    <p:cond delay="0"/>
+                                  </p:stCondLst>
+                                  <p:childTnLst>
+                                    <p:set>
+                                      <p:cBhvr>
+                                        <p:cTn id="10" dur="1" fill="hold">
+                                          <p:stCondLst>
+                                            <p:cond delay="0"/>
+                                          </p:stCondLst>
+                                        </p:cTn>
+                                        <p:tgtEl>
+                                          <p:spTgt spid="4">
+                                            <p:txEl>
+                                              <p:pRg st="1" end="1"/>
+                                            </p:txEl>
+                                          </p:spTgt>
+                                        </p:tgtEl>
+                                        <p:attrNameLst>
+                                          <p:attrName>style.visibility</p:attrName>
+                                        </p:attrNameLst>
+                                      </p:cBhvr>
+                                      <p:to>
+                                        <p:strVal val="visible"/>
+                                      </p:to>
+                                    </p:set>
+                                  </p:childTnLst>
+                                </p:cTn>
+                              </p:par>
+                            </p:childTnLst>
+                          </p:cTn>
+                        </p:par>
+                      </p:childTnLst>
+                    </p:cTn>
+                  </p:par>
+                  <p:par>
+                    <p:cTn id="11" fill="hold">
+                      <p:stCondLst>
+                        <p:cond delay="indefinite"/>
+                      </p:stCondLst>
+                      <p:childTnLst>
+                        <p:par>
+                          <p:cTn id="12" fill="hold">
+                            <p:stCondLst>
+                              <p:cond delay="0"/>
+                            </p:stCondLst>
+                            <p:childTnLst>
+                              <p:par>
+                                <p:cTn id="13" presetID="1" presetClass="entr" presetSubtype="0" fill="hold" grpId="0" nodeType="clickEffect">
+                                  <p:stCondLst>
+                                    <p:cond delay="0"/>
+                                  </p:stCondLst>
+                                  <p:childTnLst>
+                                    <p:set>
+                                      <p:cBhvr>
+                                        <p:cTn id="14" dur="1" fill="hold">
+                                          <p:stCondLst>
+                                            <p:cond delay="0"/>
+                                          </p:stCondLst>
+                                        </p:cTn>
+                                        <p:tgtEl>
+                                          <p:spTgt spid="4">
+                                            <p:txEl>
+                                              <p:pRg st="2" end="2"/>
+                                            </p:txEl>
+                                          </p:spTgt>
+                                        </p:tgtEl>
+                                        <p:attrNameLst>
+                                          <p:attrName>style.visibility</p:attrName>
+                                        </p:attrNameLst>
+                                      </p:cBhvr>
+                                      <p:to>
+                                        <p:strVal val="visible"/>
+                                      </p:to>
+                                    </p:set>
+                                  </p:childTnLst>
+                                </p:cTn>
+                              </p:par>
+                            </p:childTnLst>
+                          </p:cTn>
+                        </p:par>
+                      </p:childTnLst>
+                    </p:cTn>
+                  </p:par>
+                </p:childTnLst>
+              </p:cTn>
+              <p:prevCondLst>
+                <p:cond evt="onPrev" delay="0">
+                  <p:tgtEl>
+                    <p:sldTgt/>
+                  </p:tgtEl>
+                </p:cond>
+              </p:prevCondLst>
+              <p:nextCondLst>
+                <p:cond evt="onNext" delay="0">
+                  <p:tgtEl>
+                    <p:sldTgt/>
+                  </p:tgtEl>
+                </p:cond>
+              </p:nextCondLst>
+            </p:seq>
+          </p:childTnLst>
+        </p:cTn>
+      </p:par>
+    </p:tnLst>
+    <p:bldLst>
+      <p:bldP spid="4" grpId="0" uiExpand="1" build="p"/>
+    </p:bldLst>
+  </p:timing>
 </p:sld>
 </file>
 

</xml_diff>

<commit_message>
refactored to page object pattern
</commit_message>
<xml_diff>
--- a/And Now Seleniums Watch is Ended.pptx
+++ b/And Now Seleniums Watch is Ended.pptx
@@ -5,7 +5,7 @@
     <p:sldMasterId id="2147483648" r:id="rId1"/>
   </p:sldMasterIdLst>
   <p:notesMasterIdLst>
-    <p:notesMasterId r:id="rId29"/>
+    <p:notesMasterId r:id="rId33"/>
   </p:notesMasterIdLst>
   <p:sldIdLst>
     <p:sldId id="276" r:id="rId2"/>
@@ -30,11 +30,15 @@
     <p:sldId id="342" r:id="rId21"/>
     <p:sldId id="343" r:id="rId22"/>
     <p:sldId id="325" r:id="rId23"/>
-    <p:sldId id="344" r:id="rId24"/>
-    <p:sldId id="292" r:id="rId25"/>
-    <p:sldId id="345" r:id="rId26"/>
-    <p:sldId id="346" r:id="rId27"/>
-    <p:sldId id="315" r:id="rId28"/>
+    <p:sldId id="348" r:id="rId24"/>
+    <p:sldId id="347" r:id="rId25"/>
+    <p:sldId id="344" r:id="rId26"/>
+    <p:sldId id="350" r:id="rId27"/>
+    <p:sldId id="349" r:id="rId28"/>
+    <p:sldId id="292" r:id="rId29"/>
+    <p:sldId id="345" r:id="rId30"/>
+    <p:sldId id="346" r:id="rId31"/>
+    <p:sldId id="315" r:id="rId32"/>
   </p:sldIdLst>
   <p:sldSz cx="12192000" cy="6858000"/>
   <p:notesSz cx="6858000" cy="9144000"/>
@@ -440,7 +444,7 @@
           <a:p>
             <a:fld id="{CEC7C4CE-0BA7-46C7-910C-86236A29B096}" type="datetimeFigureOut">
               <a:rPr lang="en-US" smtClean="0"/>
-              <a:t>9/12/19</a:t>
+              <a:t>9/13/19</a:t>
             </a:fld>
             <a:endParaRPr lang="en-US"/>
           </a:p>
@@ -1279,7 +1283,7 @@
           <a:p>
             <a:fld id="{D06C7275-F3C5-4EE7-8C54-771BE2CF8BB4}" type="slidenum">
               <a:rPr lang="en-US" smtClean="0"/>
-              <a:t>24</a:t>
+              <a:t>28</a:t>
             </a:fld>
             <a:endParaRPr lang="en-US"/>
           </a:p>
@@ -1366,7 +1370,7 @@
           <a:p>
             <a:fld id="{D06C7275-F3C5-4EE7-8C54-771BE2CF8BB4}" type="slidenum">
               <a:rPr lang="en-US" smtClean="0"/>
-              <a:t>25</a:t>
+              <a:t>29</a:t>
             </a:fld>
             <a:endParaRPr lang="en-US"/>
           </a:p>
@@ -1453,7 +1457,7 @@
           <a:p>
             <a:fld id="{D06C7275-F3C5-4EE7-8C54-771BE2CF8BB4}" type="slidenum">
               <a:rPr lang="en-US" smtClean="0"/>
-              <a:t>26</a:t>
+              <a:t>30</a:t>
             </a:fld>
             <a:endParaRPr lang="en-US"/>
           </a:p>
@@ -1516,10 +1520,7 @@
           <a:bodyPr/>
           <a:lstStyle/>
           <a:p>
-            <a:r>
-              <a:rPr lang="en-US" dirty="0"/>
-              <a:t>Today I am going to focus on three separate types of tests: UI, Integration (Service), and Unit Tests.  The picture you see is of the automated testing pyramid.  It describes the composition of tests that you would like to have make up your automated test suite.  We will get more into what these different tests mean in a little bit but the important takeaway is that UI tests are extremely slow and expensive while unit tests are very quick and cheap.  Money is a representation of time to write and time to maintain  Some of you might be wondering why is it called a pyramid when it is clearly a triangle?  Well that’s a great question… but googling for testing pyramid will give you a lot of great results on the types and ratios of automated tests you should write.  My guess is they want the ratio to have some depth to it.  Like your unit tests physically support your integration and UI tests.</a:t>
-            </a:r>
+            <a:endParaRPr lang="en-US" dirty="0"/>
           </a:p>
         </p:txBody>
       </p:sp>
@@ -1603,10 +1604,7 @@
           <a:bodyPr/>
           <a:lstStyle/>
           <a:p>
-            <a:r>
-              <a:rPr lang="en-US" dirty="0"/>
-              <a:t>Today I am going to focus on three separate types of tests: UI, Integration (Service), and Unit Tests.  The picture you see is of the automated testing pyramid.  It describes the composition of tests that you would like to have make up your automated test suite.  We will get more into what these different tests mean in a little bit but the important takeaway is that UI tests are extremely slow and expensive while unit tests are very quick and cheap.  Money is a representation of time to write and time to maintain  Some of you might be wondering why is it called a pyramid when it is clearly a triangle?  Well that’s a great question… but googling for testing pyramid will give you a lot of great results on the types and ratios of automated tests you should write.  My guess is they want the ratio to have some depth to it.  Like your unit tests physically support your integration and UI tests.</a:t>
-            </a:r>
+            <a:endParaRPr lang="en-US" dirty="0"/>
           </a:p>
         </p:txBody>
       </p:sp>
@@ -3329,7 +3327,7 @@
           <a:p>
             <a:fld id="{24452B38-B5B8-4C56-ADC3-B86414DDCBC8}" type="datetimeFigureOut">
               <a:rPr lang="en-US" smtClean="0"/>
-              <a:t>9/12/19</a:t>
+              <a:t>9/13/19</a:t>
             </a:fld>
             <a:endParaRPr lang="en-US"/>
           </a:p>
@@ -6120,10 +6118,9 @@
           <a:lstStyle/>
           <a:p>
             <a:r>
-              <a:rPr lang="en-US"/>
-              <a:t>Page Object Pattern</a:t>
-            </a:r>
-            <a:endParaRPr lang="en-US" dirty="0"/>
+              <a:rPr lang="en-US" dirty="0"/>
+              <a:t>HTML Data Attribute</a:t>
+            </a:r>
           </a:p>
         </p:txBody>
       </p:sp>
@@ -6202,14 +6199,21 @@
             <p:ph type="body" sz="quarter" idx="1"/>
           </p:nvPr>
         </p:nvSpPr>
-        <p:spPr/>
-        <p:txBody>
-          <a:bodyPr/>
+        <p:spPr>
+          <a:xfrm>
+            <a:off x="839787" y="3965660"/>
+            <a:ext cx="5636169" cy="533316"/>
+          </a:xfrm>
+        </p:spPr>
+        <p:txBody>
+          <a:bodyPr>
+            <a:normAutofit/>
+          </a:bodyPr>
           <a:lstStyle/>
           <a:p>
             <a:r>
               <a:rPr lang="en-US" dirty="0"/>
-              <a:t>Connect Four with page objects</a:t>
+              <a:t>Connect Four with data attributes</a:t>
             </a:r>
           </a:p>
         </p:txBody>
@@ -6217,7 +6221,7 @@
     </p:spTree>
     <p:extLst>
       <p:ext uri="{BB962C8B-B14F-4D97-AF65-F5344CB8AC3E}">
-        <p14:creationId xmlns:p14="http://schemas.microsoft.com/office/powerpoint/2010/main" val="866417633"/>
+        <p14:creationId xmlns:p14="http://schemas.microsoft.com/office/powerpoint/2010/main" val="1301854833"/>
       </p:ext>
     </p:extLst>
   </p:cSld>
@@ -6250,6 +6254,306 @@
           <p:cNvPr id="2" name="Title 1">
             <a:extLst>
               <a:ext uri="{FF2B5EF4-FFF2-40B4-BE49-F238E27FC236}">
+                <a16:creationId xmlns:a16="http://schemas.microsoft.com/office/drawing/2014/main" id="{AB138742-26DD-4BE6-AC23-F01062826A85}"/>
+              </a:ext>
+            </a:extLst>
+          </p:cNvPr>
+          <p:cNvSpPr>
+            <a:spLocks noGrp="1"/>
+          </p:cNvSpPr>
+          <p:nvPr>
+            <p:ph type="title"/>
+          </p:nvPr>
+        </p:nvSpPr>
+        <p:spPr/>
+        <p:txBody>
+          <a:bodyPr/>
+          <a:lstStyle/>
+          <a:p>
+            <a:r>
+              <a:rPr lang="en-US"/>
+              <a:t>Page Object Pattern</a:t>
+            </a:r>
+            <a:endParaRPr lang="en-US" dirty="0"/>
+          </a:p>
+        </p:txBody>
+      </p:sp>
+    </p:spTree>
+    <p:extLst>
+      <p:ext uri="{BB962C8B-B14F-4D97-AF65-F5344CB8AC3E}">
+        <p14:creationId xmlns:p14="http://schemas.microsoft.com/office/powerpoint/2010/main" val="2873335363"/>
+      </p:ext>
+    </p:extLst>
+  </p:cSld>
+  <p:clrMapOvr>
+    <a:masterClrMapping/>
+  </p:clrMapOvr>
+  <p:transition spd="med"/>
+</p:sld>
+</file>
+
+<file path=ppt/slides/slide25.xml><?xml version="1.0" encoding="utf-8"?>
+<p:sld xmlns:a="http://schemas.openxmlformats.org/drawingml/2006/main" xmlns:r="http://schemas.openxmlformats.org/officeDocument/2006/relationships" xmlns:p="http://schemas.openxmlformats.org/presentationml/2006/main">
+  <p:cSld>
+    <p:spTree>
+      <p:nvGrpSpPr>
+        <p:cNvPr id="1" name=""/>
+        <p:cNvGrpSpPr/>
+        <p:nvPr/>
+      </p:nvGrpSpPr>
+      <p:grpSpPr>
+        <a:xfrm>
+          <a:off x="0" y="0"/>
+          <a:ext cx="0" cy="0"/>
+          <a:chOff x="0" y="0"/>
+          <a:chExt cx="0" cy="0"/>
+        </a:xfrm>
+      </p:grpSpPr>
+      <p:sp>
+        <p:nvSpPr>
+          <p:cNvPr id="4" name="Title 3">
+            <a:extLst>
+              <a:ext uri="{FF2B5EF4-FFF2-40B4-BE49-F238E27FC236}">
+                <a16:creationId xmlns:a16="http://schemas.microsoft.com/office/drawing/2014/main" id="{1C750C0D-E4F7-0040-A862-A916AFD682BC}"/>
+              </a:ext>
+            </a:extLst>
+          </p:cNvPr>
+          <p:cNvSpPr>
+            <a:spLocks noGrp="1"/>
+          </p:cNvSpPr>
+          <p:nvPr>
+            <p:ph type="title"/>
+          </p:nvPr>
+        </p:nvSpPr>
+        <p:spPr/>
+        <p:txBody>
+          <a:bodyPr/>
+          <a:lstStyle/>
+          <a:p>
+            <a:r>
+              <a:rPr lang="en-US" dirty="0"/>
+              <a:t>Cypress Demo	</a:t>
+            </a:r>
+          </a:p>
+        </p:txBody>
+      </p:sp>
+      <p:sp>
+        <p:nvSpPr>
+          <p:cNvPr id="5" name="Text Placeholder 4">
+            <a:extLst>
+              <a:ext uri="{FF2B5EF4-FFF2-40B4-BE49-F238E27FC236}">
+                <a16:creationId xmlns:a16="http://schemas.microsoft.com/office/drawing/2014/main" id="{15197F41-F473-0F4A-A81D-5F91612D18E5}"/>
+              </a:ext>
+            </a:extLst>
+          </p:cNvPr>
+          <p:cNvSpPr>
+            <a:spLocks noGrp="1"/>
+          </p:cNvSpPr>
+          <p:nvPr>
+            <p:ph type="body" sz="quarter" idx="1"/>
+          </p:nvPr>
+        </p:nvSpPr>
+        <p:spPr/>
+        <p:txBody>
+          <a:bodyPr/>
+          <a:lstStyle/>
+          <a:p>
+            <a:r>
+              <a:rPr lang="en-US" dirty="0"/>
+              <a:t>Connect Four with page objects</a:t>
+            </a:r>
+          </a:p>
+        </p:txBody>
+      </p:sp>
+    </p:spTree>
+    <p:extLst>
+      <p:ext uri="{BB962C8B-B14F-4D97-AF65-F5344CB8AC3E}">
+        <p14:creationId xmlns:p14="http://schemas.microsoft.com/office/powerpoint/2010/main" val="866417633"/>
+      </p:ext>
+    </p:extLst>
+  </p:cSld>
+  <p:clrMapOvr>
+    <a:masterClrMapping/>
+  </p:clrMapOvr>
+  <p:transition spd="med"/>
+</p:sld>
+</file>
+
+<file path=ppt/slides/slide26.xml><?xml version="1.0" encoding="utf-8"?>
+<p:sld xmlns:a="http://schemas.openxmlformats.org/drawingml/2006/main" xmlns:r="http://schemas.openxmlformats.org/officeDocument/2006/relationships" xmlns:p="http://schemas.openxmlformats.org/presentationml/2006/main">
+  <p:cSld>
+    <p:spTree>
+      <p:nvGrpSpPr>
+        <p:cNvPr id="1" name=""/>
+        <p:cNvGrpSpPr/>
+        <p:nvPr/>
+      </p:nvGrpSpPr>
+      <p:grpSpPr>
+        <a:xfrm>
+          <a:off x="0" y="0"/>
+          <a:ext cx="0" cy="0"/>
+          <a:chOff x="0" y="0"/>
+          <a:chExt cx="0" cy="0"/>
+        </a:xfrm>
+      </p:grpSpPr>
+      <p:sp>
+        <p:nvSpPr>
+          <p:cNvPr id="2" name="Title 1">
+            <a:extLst>
+              <a:ext uri="{FF2B5EF4-FFF2-40B4-BE49-F238E27FC236}">
+                <a16:creationId xmlns:a16="http://schemas.microsoft.com/office/drawing/2014/main" id="{AB138742-26DD-4BE6-AC23-F01062826A85}"/>
+              </a:ext>
+            </a:extLst>
+          </p:cNvPr>
+          <p:cNvSpPr>
+            <a:spLocks noGrp="1"/>
+          </p:cNvSpPr>
+          <p:nvPr>
+            <p:ph type="title"/>
+          </p:nvPr>
+        </p:nvSpPr>
+        <p:spPr/>
+        <p:txBody>
+          <a:bodyPr/>
+          <a:lstStyle/>
+          <a:p>
+            <a:r>
+              <a:rPr lang="en-US" dirty="0"/>
+              <a:t>Image Comparison</a:t>
+            </a:r>
+          </a:p>
+        </p:txBody>
+      </p:sp>
+    </p:spTree>
+    <p:extLst>
+      <p:ext uri="{BB962C8B-B14F-4D97-AF65-F5344CB8AC3E}">
+        <p14:creationId xmlns:p14="http://schemas.microsoft.com/office/powerpoint/2010/main" val="1094998163"/>
+      </p:ext>
+    </p:extLst>
+  </p:cSld>
+  <p:clrMapOvr>
+    <a:masterClrMapping/>
+  </p:clrMapOvr>
+  <p:transition spd="med"/>
+</p:sld>
+</file>
+
+<file path=ppt/slides/slide27.xml><?xml version="1.0" encoding="utf-8"?>
+<p:sld xmlns:a="http://schemas.openxmlformats.org/drawingml/2006/main" xmlns:r="http://schemas.openxmlformats.org/officeDocument/2006/relationships" xmlns:p="http://schemas.openxmlformats.org/presentationml/2006/main">
+  <p:cSld>
+    <p:spTree>
+      <p:nvGrpSpPr>
+        <p:cNvPr id="1" name=""/>
+        <p:cNvGrpSpPr/>
+        <p:nvPr/>
+      </p:nvGrpSpPr>
+      <p:grpSpPr>
+        <a:xfrm>
+          <a:off x="0" y="0"/>
+          <a:ext cx="0" cy="0"/>
+          <a:chOff x="0" y="0"/>
+          <a:chExt cx="0" cy="0"/>
+        </a:xfrm>
+      </p:grpSpPr>
+      <p:sp>
+        <p:nvSpPr>
+          <p:cNvPr id="4" name="Title 3">
+            <a:extLst>
+              <a:ext uri="{FF2B5EF4-FFF2-40B4-BE49-F238E27FC236}">
+                <a16:creationId xmlns:a16="http://schemas.microsoft.com/office/drawing/2014/main" id="{1C750C0D-E4F7-0040-A862-A916AFD682BC}"/>
+              </a:ext>
+            </a:extLst>
+          </p:cNvPr>
+          <p:cNvSpPr>
+            <a:spLocks noGrp="1"/>
+          </p:cNvSpPr>
+          <p:nvPr>
+            <p:ph type="title"/>
+          </p:nvPr>
+        </p:nvSpPr>
+        <p:spPr/>
+        <p:txBody>
+          <a:bodyPr/>
+          <a:lstStyle/>
+          <a:p>
+            <a:r>
+              <a:rPr lang="en-US" dirty="0"/>
+              <a:t>Cypress Demo	</a:t>
+            </a:r>
+          </a:p>
+        </p:txBody>
+      </p:sp>
+      <p:sp>
+        <p:nvSpPr>
+          <p:cNvPr id="5" name="Text Placeholder 4">
+            <a:extLst>
+              <a:ext uri="{FF2B5EF4-FFF2-40B4-BE49-F238E27FC236}">
+                <a16:creationId xmlns:a16="http://schemas.microsoft.com/office/drawing/2014/main" id="{15197F41-F473-0F4A-A81D-5F91612D18E5}"/>
+              </a:ext>
+            </a:extLst>
+          </p:cNvPr>
+          <p:cNvSpPr>
+            <a:spLocks noGrp="1"/>
+          </p:cNvSpPr>
+          <p:nvPr>
+            <p:ph type="body" sz="quarter" idx="1"/>
+          </p:nvPr>
+        </p:nvSpPr>
+        <p:spPr>
+          <a:xfrm>
+            <a:off x="839786" y="3965660"/>
+            <a:ext cx="5912705" cy="533316"/>
+          </a:xfrm>
+        </p:spPr>
+        <p:txBody>
+          <a:bodyPr>
+            <a:normAutofit/>
+          </a:bodyPr>
+          <a:lstStyle/>
+          <a:p>
+            <a:r>
+              <a:rPr lang="en-US" dirty="0"/>
+              <a:t>Connect Four with image comparison</a:t>
+            </a:r>
+          </a:p>
+        </p:txBody>
+      </p:sp>
+    </p:spTree>
+    <p:extLst>
+      <p:ext uri="{BB962C8B-B14F-4D97-AF65-F5344CB8AC3E}">
+        <p14:creationId xmlns:p14="http://schemas.microsoft.com/office/powerpoint/2010/main" val="3846350716"/>
+      </p:ext>
+    </p:extLst>
+  </p:cSld>
+  <p:clrMapOvr>
+    <a:masterClrMapping/>
+  </p:clrMapOvr>
+  <p:transition spd="med"/>
+</p:sld>
+</file>
+
+<file path=ppt/slides/slide28.xml><?xml version="1.0" encoding="utf-8"?>
+<p:sld xmlns:a="http://schemas.openxmlformats.org/drawingml/2006/main" xmlns:r="http://schemas.openxmlformats.org/officeDocument/2006/relationships" xmlns:p="http://schemas.openxmlformats.org/presentationml/2006/main">
+  <p:cSld>
+    <p:spTree>
+      <p:nvGrpSpPr>
+        <p:cNvPr id="1" name=""/>
+        <p:cNvGrpSpPr/>
+        <p:nvPr/>
+      </p:nvGrpSpPr>
+      <p:grpSpPr>
+        <a:xfrm>
+          <a:off x="0" y="0"/>
+          <a:ext cx="0" cy="0"/>
+          <a:chOff x="0" y="0"/>
+          <a:chExt cx="0" cy="0"/>
+        </a:xfrm>
+      </p:grpSpPr>
+      <p:sp>
+        <p:nvSpPr>
+          <p:cNvPr id="2" name="Title 1">
+            <a:extLst>
+              <a:ext uri="{FF2B5EF4-FFF2-40B4-BE49-F238E27FC236}">
                 <a16:creationId xmlns:a16="http://schemas.microsoft.com/office/drawing/2014/main" id="{0D8488A7-2254-412D-B6DD-D2A9F291C999}"/>
               </a:ext>
             </a:extLst>
@@ -6277,31 +6581,6 @@
               <a:t> you would manually test try and automate</a:t>
             </a:r>
             <a:endParaRPr lang="en-US" dirty="0"/>
-          </a:p>
-        </p:txBody>
-      </p:sp>
-      <p:sp>
-        <p:nvSpPr>
-          <p:cNvPr id="4" name="Text Placeholder 3">
-            <a:extLst>
-              <a:ext uri="{FF2B5EF4-FFF2-40B4-BE49-F238E27FC236}">
-                <a16:creationId xmlns:a16="http://schemas.microsoft.com/office/drawing/2014/main" id="{A50A4FC9-F413-4148-B070-CDF1B569C232}"/>
-              </a:ext>
-            </a:extLst>
-          </p:cNvPr>
-          <p:cNvSpPr>
-            <a:spLocks noGrp="1"/>
-          </p:cNvSpPr>
-          <p:nvPr>
-            <p:ph type="body" sz="quarter" idx="1"/>
-          </p:nvPr>
-        </p:nvSpPr>
-        <p:spPr/>
-        <p:txBody>
-          <a:bodyPr/>
-          <a:lstStyle/>
-          <a:p>
-            <a:endParaRPr lang="en-US"/>
           </a:p>
         </p:txBody>
       </p:sp>
@@ -6319,7 +6598,7 @@
 </p:sld>
 </file>
 
-<file path=ppt/slides/slide25.xml><?xml version="1.0" encoding="utf-8"?>
+<file path=ppt/slides/slide29.xml><?xml version="1.0" encoding="utf-8"?>
 <p:sld xmlns:a="http://schemas.openxmlformats.org/drawingml/2006/main" xmlns:r="http://schemas.openxmlformats.org/officeDocument/2006/relationships" xmlns:p="http://schemas.openxmlformats.org/presentationml/2006/main">
   <p:cSld>
     <p:spTree>
@@ -6460,7 +6739,118 @@
 </p:sld>
 </file>
 
-<file path=ppt/slides/slide26.xml><?xml version="1.0" encoding="utf-8"?>
+<file path=ppt/slides/slide3.xml><?xml version="1.0" encoding="utf-8"?>
+<p:sld xmlns:a="http://schemas.openxmlformats.org/drawingml/2006/main" xmlns:r="http://schemas.openxmlformats.org/officeDocument/2006/relationships" xmlns:p="http://schemas.openxmlformats.org/presentationml/2006/main">
+  <p:cSld>
+    <p:spTree>
+      <p:nvGrpSpPr>
+        <p:cNvPr id="1" name=""/>
+        <p:cNvGrpSpPr/>
+        <p:nvPr/>
+      </p:nvGrpSpPr>
+      <p:grpSpPr>
+        <a:xfrm>
+          <a:off x="0" y="0"/>
+          <a:ext cx="0" cy="0"/>
+          <a:chOff x="0" y="0"/>
+          <a:chExt cx="0" cy="0"/>
+        </a:xfrm>
+      </p:grpSpPr>
+      <p:sp>
+        <p:nvSpPr>
+          <p:cNvPr id="2" name="Title 1">
+            <a:extLst>
+              <a:ext uri="{FF2B5EF4-FFF2-40B4-BE49-F238E27FC236}">
+                <a16:creationId xmlns:a16="http://schemas.microsoft.com/office/drawing/2014/main" id="{16CDB2E9-63A8-4EB6-8400-FEEF53223FE8}"/>
+              </a:ext>
+            </a:extLst>
+          </p:cNvPr>
+          <p:cNvSpPr>
+            <a:spLocks noGrp="1"/>
+          </p:cNvSpPr>
+          <p:nvPr>
+            <p:ph type="title"/>
+          </p:nvPr>
+        </p:nvSpPr>
+        <p:spPr/>
+        <p:txBody>
+          <a:bodyPr/>
+          <a:lstStyle/>
+          <a:p>
+            <a:r>
+              <a:rPr lang="en-US" dirty="0"/>
+              <a:t>What we will talk about</a:t>
+            </a:r>
+          </a:p>
+        </p:txBody>
+      </p:sp>
+      <p:sp>
+        <p:nvSpPr>
+          <p:cNvPr id="3" name="Text Placeholder 2">
+            <a:extLst>
+              <a:ext uri="{FF2B5EF4-FFF2-40B4-BE49-F238E27FC236}">
+                <a16:creationId xmlns:a16="http://schemas.microsoft.com/office/drawing/2014/main" id="{161A629B-1043-4D85-8B71-0A7DCE426132}"/>
+              </a:ext>
+            </a:extLst>
+          </p:cNvPr>
+          <p:cNvSpPr>
+            <a:spLocks noGrp="1"/>
+          </p:cNvSpPr>
+          <p:nvPr>
+            <p:ph type="body" idx="1"/>
+          </p:nvPr>
+        </p:nvSpPr>
+        <p:spPr/>
+        <p:txBody>
+          <a:bodyPr/>
+          <a:lstStyle/>
+          <a:p>
+            <a:r>
+              <a:rPr lang="en-US" dirty="0"/>
+              <a:t>Tests</a:t>
+            </a:r>
+          </a:p>
+          <a:p>
+            <a:r>
+              <a:rPr lang="en-US" dirty="0"/>
+              <a:t>Testing with Selenium </a:t>
+            </a:r>
+          </a:p>
+          <a:p>
+            <a:r>
+              <a:rPr lang="en-US" dirty="0"/>
+              <a:t>Testing with Cypress</a:t>
+            </a:r>
+          </a:p>
+          <a:p>
+            <a:r>
+              <a:rPr lang="en-US" dirty="0"/>
+              <a:t>Live coding Cypress tests</a:t>
+            </a:r>
+          </a:p>
+          <a:p>
+            <a:r>
+              <a:rPr lang="en-US" dirty="0"/>
+              <a:t>Advanced UI testing techniques</a:t>
+            </a:r>
+          </a:p>
+        </p:txBody>
+      </p:sp>
+    </p:spTree>
+    <p:extLst>
+      <p:ext uri="{BB962C8B-B14F-4D97-AF65-F5344CB8AC3E}">
+        <p14:creationId xmlns:p14="http://schemas.microsoft.com/office/powerpoint/2010/main" val="2942252436"/>
+      </p:ext>
+    </p:extLst>
+  </p:cSld>
+  <p:clrMapOvr>
+    <a:masterClrMapping/>
+  </p:clrMapOvr>
+  <p:transition spd="med"/>
+</p:sld>
+</file>
+
+<file path=ppt/slides/slide30.xml><?xml version="1.0" encoding="utf-8"?>
 <p:sld xmlns:a="http://schemas.openxmlformats.org/drawingml/2006/main" xmlns:r="http://schemas.openxmlformats.org/officeDocument/2006/relationships" xmlns:p="http://schemas.openxmlformats.org/presentationml/2006/main">
   <p:cSld>
     <p:spTree>
@@ -6499,7 +6889,7 @@
         </p:blipFill>
         <p:spPr>
           <a:xfrm>
-            <a:off x="990972" y="669366"/>
+            <a:off x="794309" y="2479675"/>
             <a:ext cx="3136900" cy="4013200"/>
           </a:xfrm>
           <a:prstGeom prst="rect">
@@ -6529,8 +6919,66 @@
         </p:blipFill>
         <p:spPr>
           <a:xfrm>
-            <a:off x="5081494" y="669366"/>
+            <a:off x="3931209" y="2479675"/>
             <a:ext cx="3127766" cy="4013200"/>
+          </a:xfrm>
+          <a:prstGeom prst="rect">
+            <a:avLst/>
+          </a:prstGeom>
+        </p:spPr>
+      </p:pic>
+      <p:sp>
+        <p:nvSpPr>
+          <p:cNvPr id="3" name="Title 2">
+            <a:extLst>
+              <a:ext uri="{FF2B5EF4-FFF2-40B4-BE49-F238E27FC236}">
+                <a16:creationId xmlns:a16="http://schemas.microsoft.com/office/drawing/2014/main" id="{F379D927-0BBB-D442-AF10-6A1E66B31DA9}"/>
+              </a:ext>
+            </a:extLst>
+          </p:cNvPr>
+          <p:cNvSpPr>
+            <a:spLocks noGrp="1"/>
+          </p:cNvSpPr>
+          <p:nvPr>
+            <p:ph type="title"/>
+          </p:nvPr>
+        </p:nvSpPr>
+        <p:spPr/>
+        <p:txBody>
+          <a:bodyPr/>
+          <a:lstStyle/>
+          <a:p>
+            <a:r>
+              <a:rPr lang="en-US" dirty="0"/>
+              <a:t>Resources</a:t>
+            </a:r>
+          </a:p>
+        </p:txBody>
+      </p:sp>
+      <p:pic>
+        <p:nvPicPr>
+          <p:cNvPr id="5" name="Picture 4">
+            <a:extLst>
+              <a:ext uri="{FF2B5EF4-FFF2-40B4-BE49-F238E27FC236}">
+                <a16:creationId xmlns:a16="http://schemas.microsoft.com/office/drawing/2014/main" id="{44019298-ECAA-1D46-8A14-79DC0AEE6152}"/>
+              </a:ext>
+            </a:extLst>
+          </p:cNvPr>
+          <p:cNvPicPr>
+            <a:picLocks noChangeAspect="1"/>
+          </p:cNvPicPr>
+          <p:nvPr/>
+        </p:nvPicPr>
+        <p:blipFill>
+          <a:blip r:embed="rId5"/>
+          <a:stretch>
+            <a:fillRect/>
+          </a:stretch>
+        </p:blipFill>
+        <p:spPr>
+          <a:xfrm>
+            <a:off x="7058975" y="2479675"/>
+            <a:ext cx="3229558" cy="4013201"/>
           </a:xfrm>
           <a:prstGeom prst="rect">
             <a:avLst/>
@@ -6558,7 +7006,7 @@
 </p:sld>
 </file>
 
-<file path=ppt/slides/slide27.xml><?xml version="1.0" encoding="utf-8"?>
+<file path=ppt/slides/slide31.xml><?xml version="1.0" encoding="utf-8"?>
 <p:sld xmlns:a="http://schemas.openxmlformats.org/drawingml/2006/main" xmlns:r="http://schemas.openxmlformats.org/officeDocument/2006/relationships" xmlns:p="http://schemas.openxmlformats.org/presentationml/2006/main">
   <p:cSld>
     <p:spTree>
@@ -6655,117 +7103,6 @@
     <p:extLst>
       <p:ext uri="{BB962C8B-B14F-4D97-AF65-F5344CB8AC3E}">
         <p14:creationId xmlns:p14="http://schemas.microsoft.com/office/powerpoint/2010/main" val="3231659830"/>
-      </p:ext>
-    </p:extLst>
-  </p:cSld>
-  <p:clrMapOvr>
-    <a:masterClrMapping/>
-  </p:clrMapOvr>
-  <p:transition spd="med"/>
-</p:sld>
-</file>
-
-<file path=ppt/slides/slide3.xml><?xml version="1.0" encoding="utf-8"?>
-<p:sld xmlns:a="http://schemas.openxmlformats.org/drawingml/2006/main" xmlns:r="http://schemas.openxmlformats.org/officeDocument/2006/relationships" xmlns:p="http://schemas.openxmlformats.org/presentationml/2006/main">
-  <p:cSld>
-    <p:spTree>
-      <p:nvGrpSpPr>
-        <p:cNvPr id="1" name=""/>
-        <p:cNvGrpSpPr/>
-        <p:nvPr/>
-      </p:nvGrpSpPr>
-      <p:grpSpPr>
-        <a:xfrm>
-          <a:off x="0" y="0"/>
-          <a:ext cx="0" cy="0"/>
-          <a:chOff x="0" y="0"/>
-          <a:chExt cx="0" cy="0"/>
-        </a:xfrm>
-      </p:grpSpPr>
-      <p:sp>
-        <p:nvSpPr>
-          <p:cNvPr id="2" name="Title 1">
-            <a:extLst>
-              <a:ext uri="{FF2B5EF4-FFF2-40B4-BE49-F238E27FC236}">
-                <a16:creationId xmlns:a16="http://schemas.microsoft.com/office/drawing/2014/main" id="{16CDB2E9-63A8-4EB6-8400-FEEF53223FE8}"/>
-              </a:ext>
-            </a:extLst>
-          </p:cNvPr>
-          <p:cNvSpPr>
-            <a:spLocks noGrp="1"/>
-          </p:cNvSpPr>
-          <p:nvPr>
-            <p:ph type="title"/>
-          </p:nvPr>
-        </p:nvSpPr>
-        <p:spPr/>
-        <p:txBody>
-          <a:bodyPr/>
-          <a:lstStyle/>
-          <a:p>
-            <a:r>
-              <a:rPr lang="en-US" dirty="0"/>
-              <a:t>What we will talk about</a:t>
-            </a:r>
-          </a:p>
-        </p:txBody>
-      </p:sp>
-      <p:sp>
-        <p:nvSpPr>
-          <p:cNvPr id="3" name="Text Placeholder 2">
-            <a:extLst>
-              <a:ext uri="{FF2B5EF4-FFF2-40B4-BE49-F238E27FC236}">
-                <a16:creationId xmlns:a16="http://schemas.microsoft.com/office/drawing/2014/main" id="{161A629B-1043-4D85-8B71-0A7DCE426132}"/>
-              </a:ext>
-            </a:extLst>
-          </p:cNvPr>
-          <p:cNvSpPr>
-            <a:spLocks noGrp="1"/>
-          </p:cNvSpPr>
-          <p:nvPr>
-            <p:ph type="body" idx="1"/>
-          </p:nvPr>
-        </p:nvSpPr>
-        <p:spPr/>
-        <p:txBody>
-          <a:bodyPr/>
-          <a:lstStyle/>
-          <a:p>
-            <a:r>
-              <a:rPr lang="en-US" dirty="0"/>
-              <a:t>Tests</a:t>
-            </a:r>
-          </a:p>
-          <a:p>
-            <a:r>
-              <a:rPr lang="en-US" dirty="0"/>
-              <a:t>Testing with Selenium </a:t>
-            </a:r>
-          </a:p>
-          <a:p>
-            <a:r>
-              <a:rPr lang="en-US" dirty="0"/>
-              <a:t>Testing with Cypress</a:t>
-            </a:r>
-          </a:p>
-          <a:p>
-            <a:r>
-              <a:rPr lang="en-US" dirty="0"/>
-              <a:t>Live coding Cypress tests</a:t>
-            </a:r>
-          </a:p>
-          <a:p>
-            <a:r>
-              <a:rPr lang="en-US" dirty="0"/>
-              <a:t>Advanced UI testing techniques</a:t>
-            </a:r>
-          </a:p>
-        </p:txBody>
-      </p:sp>
-    </p:spTree>
-    <p:extLst>
-      <p:ext uri="{BB962C8B-B14F-4D97-AF65-F5344CB8AC3E}">
-        <p14:creationId xmlns:p14="http://schemas.microsoft.com/office/powerpoint/2010/main" val="2942252436"/>
       </p:ext>
     </p:extLst>
   </p:cSld>

</xml_diff>